<commit_message>
Deployed 93fc630 to 0.7 with MkDocs 1.1 and mike 1.0.1
</commit_message>
<xml_diff>
--- a/0.7/images/src/illustration.pptx
+++ b/0.7/images/src/illustration.pptx
@@ -197,7 +197,7 @@
           <a:p>
             <a:fld id="{38B78CBE-37FA-D241-BB4C-CAC5D3B25F49}" type="datetimeFigureOut">
               <a:rPr lang="en-US" smtClean="0"/>
-              <a:t>6/21/21</a:t>
+              <a:t>7/21/21</a:t>
             </a:fld>
             <a:endParaRPr lang="en-US"/>
           </a:p>
@@ -695,7 +695,7 @@
           <a:p>
             <a:fld id="{708812C5-0212-FD42-A0D4-E2E8FF4E3AF5}" type="datetime1">
               <a:rPr lang="en-US" smtClean="0"/>
-              <a:t>6/21/21</a:t>
+              <a:t>7/21/21</a:t>
             </a:fld>
             <a:endParaRPr lang="en-US"/>
           </a:p>
@@ -896,7 +896,7 @@
           <a:p>
             <a:fld id="{D232AC6F-41C3-B34B-9BAA-03ED2F3BC0F6}" type="datetime1">
               <a:rPr lang="en-US" smtClean="0"/>
-              <a:t>6/21/21</a:t>
+              <a:t>7/21/21</a:t>
             </a:fld>
             <a:endParaRPr lang="en-US"/>
           </a:p>
@@ -1107,7 +1107,7 @@
           <a:p>
             <a:fld id="{BEE140C2-F440-9D49-95CB-5965D64CC4A2}" type="datetime1">
               <a:rPr lang="en-US" smtClean="0"/>
-              <a:t>6/21/21</a:t>
+              <a:t>7/21/21</a:t>
             </a:fld>
             <a:endParaRPr lang="en-US"/>
           </a:p>
@@ -1308,7 +1308,7 @@
           <a:p>
             <a:fld id="{CC99F980-FB29-FD47-8508-150F73F1E8B0}" type="datetime1">
               <a:rPr lang="en-US" smtClean="0"/>
-              <a:t>6/21/21</a:t>
+              <a:t>7/21/21</a:t>
             </a:fld>
             <a:endParaRPr lang="en-US"/>
           </a:p>
@@ -1586,7 +1586,7 @@
           <a:p>
             <a:fld id="{D4510983-EA22-9643-8AC0-B3C6499B643B}" type="datetime1">
               <a:rPr lang="en-US" smtClean="0"/>
-              <a:t>6/21/21</a:t>
+              <a:t>7/21/21</a:t>
             </a:fld>
             <a:endParaRPr lang="en-US"/>
           </a:p>
@@ -1854,7 +1854,7 @@
           <a:p>
             <a:fld id="{D5A39195-967D-5D4E-8C6A-C99866996458}" type="datetime1">
               <a:rPr lang="en-US" smtClean="0"/>
-              <a:t>6/21/21</a:t>
+              <a:t>7/21/21</a:t>
             </a:fld>
             <a:endParaRPr lang="en-US"/>
           </a:p>
@@ -2269,7 +2269,7 @@
           <a:p>
             <a:fld id="{5AD771E9-C79D-684D-A158-5EB6E92DE947}" type="datetime1">
               <a:rPr lang="en-US" smtClean="0"/>
-              <a:t>6/21/21</a:t>
+              <a:t>7/21/21</a:t>
             </a:fld>
             <a:endParaRPr lang="en-US"/>
           </a:p>
@@ -2413,7 +2413,7 @@
           <a:p>
             <a:fld id="{693CA161-7E4C-5C4B-B799-DB602A0B9806}" type="datetime1">
               <a:rPr lang="en-US" smtClean="0"/>
-              <a:t>6/21/21</a:t>
+              <a:t>7/21/21</a:t>
             </a:fld>
             <a:endParaRPr lang="en-US"/>
           </a:p>
@@ -2529,7 +2529,7 @@
           <a:p>
             <a:fld id="{6D55FDF3-8BB2-6349-A5FA-057F3D78953D}" type="datetime1">
               <a:rPr lang="en-US" smtClean="0"/>
-              <a:t>6/21/21</a:t>
+              <a:t>7/21/21</a:t>
             </a:fld>
             <a:endParaRPr lang="en-US"/>
           </a:p>
@@ -2843,7 +2843,7 @@
           <a:p>
             <a:fld id="{EEDFACC0-3228-BA4B-942E-CEF38B0101FD}" type="datetime1">
               <a:rPr lang="en-US" smtClean="0"/>
-              <a:t>6/21/21</a:t>
+              <a:t>7/21/21</a:t>
             </a:fld>
             <a:endParaRPr lang="en-US"/>
           </a:p>
@@ -3134,7 +3134,7 @@
           <a:p>
             <a:fld id="{07EEEDBE-E24C-D140-B419-6D8D592D0F1C}" type="datetime1">
               <a:rPr lang="en-US" smtClean="0"/>
-              <a:t>6/21/21</a:t>
+              <a:t>7/21/21</a:t>
             </a:fld>
             <a:endParaRPr lang="en-US"/>
           </a:p>
@@ -3378,7 +3378,7 @@
           <a:p>
             <a:fld id="{E05781A2-A5EF-C54C-A3EF-F62483D37EDC}" type="datetime1">
               <a:rPr lang="en-US" smtClean="0"/>
-              <a:t>6/21/21</a:t>
+              <a:t>7/21/21</a:t>
             </a:fld>
             <a:endParaRPr lang="en-US"/>
           </a:p>
@@ -3814,7 +3814,7 @@
         <p:spPr>
           <a:xfrm>
             <a:off x="4581297" y="3522338"/>
-            <a:ext cx="5992110" cy="1470073"/>
+            <a:ext cx="5992110" cy="1869469"/>
           </a:xfrm>
           <a:prstGeom prst="roundRect">
             <a:avLst/>
@@ -3857,7 +3857,7 @@
               </a:spcBef>
             </a:pPr>
             <a:r>
-              <a:rPr lang="en-US" sz="2000">
+              <a:rPr lang="en-US" sz="2000" dirty="0">
                 <a:solidFill>
                   <a:schemeClr val="tx1"/>
                 </a:solidFill>
@@ -3865,49 +3865,18 @@
               <a:t>Use in </a:t>
             </a:r>
             <a:r>
-              <a:rPr lang="en-US" sz="2000" b="1">
-                <a:solidFill>
-                  <a:srgbClr val="7A004A"/>
-                </a:solidFill>
-              </a:rPr>
-              <a:t>any </a:t>
-            </a:r>
-            <a:r>
               <a:rPr lang="en-US" sz="2000" b="1" dirty="0">
                 <a:solidFill>
                   <a:srgbClr val="7A004A"/>
                 </a:solidFill>
               </a:rPr>
-              <a:t>K8s environment</a:t>
+              <a:t>any K8s environment</a:t>
             </a:r>
             <a:endParaRPr lang="en-US" sz="2000" b="1" dirty="0">
               <a:solidFill>
                 <a:schemeClr val="tx1"/>
               </a:solidFill>
             </a:endParaRPr>
-          </a:p>
-          <a:p>
-            <a:pPr algn="ctr">
-              <a:spcBef>
-                <a:spcPts val="600"/>
-              </a:spcBef>
-            </a:pPr>
-            <a:r>
-              <a:rPr lang="en-US" sz="2000" dirty="0" err="1">
-                <a:solidFill>
-                  <a:schemeClr val="tx1"/>
-                </a:solidFill>
-              </a:rPr>
-              <a:t>KFServing</a:t>
-            </a:r>
-            <a:r>
-              <a:rPr lang="en-US" sz="2000" dirty="0">
-                <a:solidFill>
-                  <a:schemeClr val="tx1"/>
-                </a:solidFill>
-              </a:rPr>
-              <a:t>, Seldon, Knative, Istio, …</a:t>
-            </a:r>
           </a:p>
         </p:txBody>
       </p:sp>
@@ -3969,12 +3938,20 @@
               </a:spcBef>
             </a:pPr>
             <a:r>
+              <a:rPr lang="en-US" sz="2000">
+                <a:solidFill>
+                  <a:schemeClr val="tx1"/>
+                </a:solidFill>
+              </a:rPr>
+              <a:t>Safely </a:t>
+            </a:r>
+            <a:r>
               <a:rPr lang="en-US" sz="2000" dirty="0">
                 <a:solidFill>
                   <a:schemeClr val="tx1"/>
                 </a:solidFill>
               </a:rPr>
-              <a:t>Find &amp; safely rollout </a:t>
+              <a:t>rollout </a:t>
             </a:r>
             <a:r>
               <a:rPr lang="en-US" sz="2000" b="1" dirty="0">
@@ -4123,7 +4100,7 @@
         </p:blipFill>
         <p:spPr>
           <a:xfrm>
-            <a:off x="3352195" y="3838425"/>
+            <a:off x="3350988" y="4028150"/>
             <a:ext cx="837897" cy="837897"/>
           </a:xfrm>
           <a:prstGeom prst="rect">
@@ -4159,8 +4136,8 @@
         </p:nvCxnSpPr>
         <p:spPr>
           <a:xfrm>
-            <a:off x="4190092" y="4257374"/>
-            <a:ext cx="391205" cy="1"/>
+            <a:off x="4188885" y="4447099"/>
+            <a:ext cx="392412" cy="9974"/>
           </a:xfrm>
           <a:prstGeom prst="straightConnector1">
             <a:avLst/>
@@ -4192,147 +4169,6 @@
       </p:cxnSp>
       <p:pic>
         <p:nvPicPr>
-          <p:cNvPr id="61" name="Picture 2" descr="Kubeflow">
-            <a:extLst>
-              <a:ext uri="{FF2B5EF4-FFF2-40B4-BE49-F238E27FC236}">
-                <a16:creationId xmlns:a16="http://schemas.microsoft.com/office/drawing/2014/main" id="{ADBABAB8-A9EB-384F-8573-8D94CEDA98EF}"/>
-              </a:ext>
-            </a:extLst>
-          </p:cNvPr>
-          <p:cNvPicPr>
-            <a:picLocks noChangeAspect="1" noChangeArrowheads="1"/>
-          </p:cNvPicPr>
-          <p:nvPr/>
-        </p:nvPicPr>
-        <p:blipFill>
-          <a:blip r:embed="rId11">
-            <a:extLst>
-              <a:ext uri="{28A0092B-C50C-407E-A947-70E740481C1C}">
-                <a14:useLocalDpi xmlns:a14="http://schemas.microsoft.com/office/drawing/2010/main" val="0"/>
-              </a:ext>
-            </a:extLst>
-          </a:blip>
-          <a:srcRect/>
-          <a:stretch>
-            <a:fillRect/>
-          </a:stretch>
-        </p:blipFill>
-        <p:spPr bwMode="auto">
-          <a:xfrm flipH="1">
-            <a:off x="5319922" y="3622140"/>
-            <a:ext cx="505667" cy="498513"/>
-          </a:xfrm>
-          <a:prstGeom prst="rect">
-            <a:avLst/>
-          </a:prstGeom>
-          <a:noFill/>
-          <a:extLst>
-            <a:ext uri="{909E8E84-426E-40DD-AFC4-6F175D3DCCD1}">
-              <a14:hiddenFill xmlns:a14="http://schemas.microsoft.com/office/drawing/2010/main">
-                <a:solidFill>
-                  <a:srgbClr val="FFFFFF"/>
-                </a:solidFill>
-              </a14:hiddenFill>
-            </a:ext>
-          </a:extLst>
-        </p:spPr>
-      </p:pic>
-      <p:pic>
-        <p:nvPicPr>
-          <p:cNvPr id="62" name="Picture 8" descr="Istio">
-            <a:extLst>
-              <a:ext uri="{FF2B5EF4-FFF2-40B4-BE49-F238E27FC236}">
-                <a16:creationId xmlns:a16="http://schemas.microsoft.com/office/drawing/2014/main" id="{09ECD64D-CBA4-2F41-82E1-F2C2D1DF2A2A}"/>
-              </a:ext>
-            </a:extLst>
-          </p:cNvPr>
-          <p:cNvPicPr>
-            <a:picLocks noChangeAspect="1" noChangeArrowheads="1"/>
-          </p:cNvPicPr>
-          <p:nvPr/>
-        </p:nvPicPr>
-        <p:blipFill>
-          <a:blip r:embed="rId12">
-            <a:extLst>
-              <a:ext uri="{28A0092B-C50C-407E-A947-70E740481C1C}">
-                <a14:useLocalDpi xmlns:a14="http://schemas.microsoft.com/office/drawing/2010/main" val="0"/>
-              </a:ext>
-            </a:extLst>
-          </a:blip>
-          <a:srcRect/>
-          <a:stretch>
-            <a:fillRect/>
-          </a:stretch>
-        </p:blipFill>
-        <p:spPr bwMode="auto">
-          <a:xfrm>
-            <a:off x="4726868" y="3622140"/>
-            <a:ext cx="494256" cy="494256"/>
-          </a:xfrm>
-          <a:prstGeom prst="rect">
-            <a:avLst/>
-          </a:prstGeom>
-          <a:noFill/>
-          <a:extLst>
-            <a:ext uri="{909E8E84-426E-40DD-AFC4-6F175D3DCCD1}">
-              <a14:hiddenFill xmlns:a14="http://schemas.microsoft.com/office/drawing/2010/main">
-                <a:solidFill>
-                  <a:srgbClr val="FFFFFF"/>
-                </a:solidFill>
-              </a14:hiddenFill>
-            </a:ext>
-          </a:extLst>
-        </p:spPr>
-      </p:pic>
-      <p:pic>
-        <p:nvPicPr>
-          <p:cNvPr id="63" name="Picture 2" descr="Use Ambassador Gateway with Knative Serving | by Justin Brûlotte |  Ambassador Labs">
-            <a:extLst>
-              <a:ext uri="{FF2B5EF4-FFF2-40B4-BE49-F238E27FC236}">
-                <a16:creationId xmlns:a16="http://schemas.microsoft.com/office/drawing/2014/main" id="{82AEA840-CD57-0F4C-8A47-B5939021D40D}"/>
-              </a:ext>
-            </a:extLst>
-          </p:cNvPr>
-          <p:cNvPicPr>
-            <a:picLocks noChangeAspect="1" noChangeArrowheads="1"/>
-          </p:cNvPicPr>
-          <p:nvPr/>
-        </p:nvPicPr>
-        <p:blipFill>
-          <a:blip r:embed="rId13">
-            <a:extLst>
-              <a:ext uri="{28A0092B-C50C-407E-A947-70E740481C1C}">
-                <a14:useLocalDpi xmlns:a14="http://schemas.microsoft.com/office/drawing/2010/main" val="0"/>
-              </a:ext>
-            </a:extLst>
-          </a:blip>
-          <a:srcRect/>
-          <a:stretch>
-            <a:fillRect/>
-          </a:stretch>
-        </p:blipFill>
-        <p:spPr bwMode="auto">
-          <a:xfrm>
-            <a:off x="5905620" y="3634659"/>
-            <a:ext cx="611528" cy="494256"/>
-          </a:xfrm>
-          <a:prstGeom prst="rect">
-            <a:avLst/>
-          </a:prstGeom>
-          <a:noFill/>
-          <a:extLst>
-            <a:ext uri="{909E8E84-426E-40DD-AFC4-6F175D3DCCD1}">
-              <a14:hiddenFill xmlns:a14="http://schemas.microsoft.com/office/drawing/2010/main">
-                <a:solidFill>
-                  <a:srgbClr val="FFFFFF"/>
-                </a:solidFill>
-              </a14:hiddenFill>
-            </a:ext>
-          </a:extLst>
-        </p:spPr>
-      </p:pic>
-      <p:pic>
-        <p:nvPicPr>
           <p:cNvPr id="64" name="Graphic 63" descr="Thumbs up sign with solid fill">
             <a:extLst>
               <a:ext uri="{FF2B5EF4-FFF2-40B4-BE49-F238E27FC236}">
@@ -4346,10 +4182,10 @@
           <p:nvPr/>
         </p:nvPicPr>
         <p:blipFill>
-          <a:blip r:embed="rId14">
+          <a:blip r:embed="rId11">
             <a:extLst>
               <a:ext uri="{96DAC541-7B7A-43D3-8B79-37D633B846F1}">
-                <asvg:svgBlip xmlns:asvg="http://schemas.microsoft.com/office/drawing/2016/SVG/main" r:embed="rId15"/>
+                <asvg:svgBlip xmlns:asvg="http://schemas.microsoft.com/office/drawing/2016/SVG/main" r:embed="rId12"/>
               </a:ext>
             </a:extLst>
           </a:blip>
@@ -4365,49 +4201,6 @@
           <a:prstGeom prst="rect">
             <a:avLst/>
           </a:prstGeom>
-        </p:spPr>
-      </p:pic>
-      <p:pic>
-        <p:nvPicPr>
-          <p:cNvPr id="65" name="Graphic 64">
-            <a:extLst>
-              <a:ext uri="{FF2B5EF4-FFF2-40B4-BE49-F238E27FC236}">
-                <a16:creationId xmlns:a16="http://schemas.microsoft.com/office/drawing/2014/main" id="{E8A0C088-C2CD-7F40-BD73-5EFA0B8CCBE4}"/>
-              </a:ext>
-            </a:extLst>
-          </p:cNvPr>
-          <p:cNvPicPr>
-            <a:picLocks noChangeAspect="1"/>
-          </p:cNvPicPr>
-          <p:nvPr/>
-        </p:nvPicPr>
-        <p:blipFill>
-          <a:blip r:embed="rId16">
-            <a:extLst>
-              <a:ext uri="{96DAC541-7B7A-43D3-8B79-37D633B846F1}">
-                <asvg:svgBlip xmlns:asvg="http://schemas.microsoft.com/office/drawing/2016/SVG/main" r:embed="rId17"/>
-              </a:ext>
-            </a:extLst>
-          </a:blip>
-          <a:stretch>
-            <a:fillRect/>
-          </a:stretch>
-        </p:blipFill>
-        <p:spPr>
-          <a:xfrm>
-            <a:off x="9679340" y="3705463"/>
-            <a:ext cx="681704" cy="681704"/>
-          </a:xfrm>
-          <a:prstGeom prst="rect">
-            <a:avLst/>
-          </a:prstGeom>
-          <a:effectLst>
-            <a:outerShdw blurRad="50800" dist="50800" dir="5400000" algn="ctr" rotWithShape="0">
-              <a:srgbClr val="000000">
-                <a:alpha val="93000"/>
-              </a:srgbClr>
-            </a:outerShdw>
-          </a:effectLst>
         </p:spPr>
       </p:pic>
       <p:sp>
@@ -4616,18 +4409,21 @@
           </p:cNvPr>
           <p:cNvCxnSpPr>
             <a:cxnSpLocks/>
-            <a:stCxn id="54" idx="0"/>
+            <a:stCxn id="28" idx="2"/>
             <a:endCxn id="55" idx="2"/>
           </p:cNvCxnSpPr>
           <p:nvPr/>
         </p:nvCxnSpPr>
         <p:spPr>
-          <a:xfrm rot="16200000" flipV="1">
-            <a:off x="6043883" y="1988868"/>
-            <a:ext cx="461390" cy="2605549"/>
-          </a:xfrm>
-          <a:prstGeom prst="bentConnector3">
-            <a:avLst/>
+          <a:xfrm rot="10800000" flipH="1">
+            <a:off x="4843151" y="3060948"/>
+            <a:ext cx="128652" cy="1293906"/>
+          </a:xfrm>
+          <a:prstGeom prst="bentConnector4">
+            <a:avLst>
+              <a:gd name="adj1" fmla="val -112332"/>
+              <a:gd name="adj2" fmla="val 78931"/>
+            </a:avLst>
           </a:prstGeom>
           <a:ln w="25400">
             <a:solidFill>
@@ -4667,18 +4463,18 @@
           <p:cNvCxnSpPr>
             <a:cxnSpLocks/>
             <a:stCxn id="66" idx="2"/>
-            <a:endCxn id="65" idx="0"/>
+            <a:endCxn id="28" idx="0"/>
           </p:cNvCxnSpPr>
           <p:nvPr/>
         </p:nvCxnSpPr>
         <p:spPr>
-          <a:xfrm rot="16200000" flipH="1">
-            <a:off x="9077034" y="2762304"/>
-            <a:ext cx="644513" cy="1241803"/>
+          <a:xfrm rot="5400000">
+            <a:off x="6717416" y="1734405"/>
+            <a:ext cx="734429" cy="3387519"/>
           </a:xfrm>
           <a:prstGeom prst="bentConnector3">
             <a:avLst>
-              <a:gd name="adj1" fmla="val 50000"/>
+              <a:gd name="adj1" fmla="val 32827"/>
             </a:avLst>
           </a:prstGeom>
           <a:ln w="25400">
@@ -4722,10 +4518,10 @@
           <p:nvPr/>
         </p:nvPicPr>
         <p:blipFill>
-          <a:blip r:embed="rId18">
+          <a:blip r:embed="rId13">
             <a:extLst>
               <a:ext uri="{837473B0-CC2E-450A-ABE3-18F120FF3D39}">
-                <a1611:picAttrSrcUrl xmlns:a1611="http://schemas.microsoft.com/office/drawing/2016/11/main" r:id="rId19"/>
+                <a1611:picAttrSrcUrl xmlns:a1611="http://schemas.microsoft.com/office/drawing/2016/11/main" r:id="rId14"/>
               </a:ext>
             </a:extLst>
           </a:blip>
@@ -4758,10 +4554,10 @@
           <p:nvPr/>
         </p:nvPicPr>
         <p:blipFill>
-          <a:blip r:embed="rId20">
+          <a:blip r:embed="rId15">
             <a:extLst>
               <a:ext uri="{837473B0-CC2E-450A-ABE3-18F120FF3D39}">
-                <a1611:picAttrSrcUrl xmlns:a1611="http://schemas.microsoft.com/office/drawing/2016/11/main" r:id="rId21"/>
+                <a1611:picAttrSrcUrl xmlns:a1611="http://schemas.microsoft.com/office/drawing/2016/11/main" r:id="rId16"/>
               </a:ext>
             </a:extLst>
           </a:blip>
@@ -4794,10 +4590,10 @@
           <p:nvPr/>
         </p:nvPicPr>
         <p:blipFill>
-          <a:blip r:embed="rId22">
+          <a:blip r:embed="rId17">
             <a:extLst>
               <a:ext uri="{837473B0-CC2E-450A-ABE3-18F120FF3D39}">
-                <a1611:picAttrSrcUrl xmlns:a1611="http://schemas.microsoft.com/office/drawing/2016/11/main" r:id="rId23"/>
+                <a1611:picAttrSrcUrl xmlns:a1611="http://schemas.microsoft.com/office/drawing/2016/11/main" r:id="rId18"/>
               </a:ext>
             </a:extLst>
           </a:blip>
@@ -4830,10 +4626,10 @@
           <p:nvPr/>
         </p:nvPicPr>
         <p:blipFill>
-          <a:blip r:embed="rId24">
+          <a:blip r:embed="rId19">
             <a:extLst>
               <a:ext uri="{837473B0-CC2E-450A-ABE3-18F120FF3D39}">
-                <a1611:picAttrSrcUrl xmlns:a1611="http://schemas.microsoft.com/office/drawing/2016/11/main" r:id="rId25"/>
+                <a1611:picAttrSrcUrl xmlns:a1611="http://schemas.microsoft.com/office/drawing/2016/11/main" r:id="rId20"/>
               </a:ext>
             </a:extLst>
           </a:blip>
@@ -4851,54 +4647,6 @@
           </a:prstGeom>
         </p:spPr>
       </p:pic>
-      <p:cxnSp>
-        <p:nvCxnSpPr>
-          <p:cNvPr id="75" name="Straight Arrow Connector 74">
-            <a:extLst>
-              <a:ext uri="{FF2B5EF4-FFF2-40B4-BE49-F238E27FC236}">
-                <a16:creationId xmlns:a16="http://schemas.microsoft.com/office/drawing/2014/main" id="{B1C1D28E-399B-8049-A351-3B1A7088141E}"/>
-              </a:ext>
-            </a:extLst>
-          </p:cNvPr>
-          <p:cNvCxnSpPr>
-            <a:cxnSpLocks/>
-          </p:cNvCxnSpPr>
-          <p:nvPr/>
-        </p:nvCxnSpPr>
-        <p:spPr>
-          <a:xfrm flipH="1">
-            <a:off x="7724498" y="3914957"/>
-            <a:ext cx="1316865" cy="0"/>
-          </a:xfrm>
-          <a:prstGeom prst="straightConnector1">
-            <a:avLst/>
-          </a:prstGeom>
-          <a:ln w="25400">
-            <a:solidFill>
-              <a:schemeClr val="bg2">
-                <a:lumMod val="75000"/>
-              </a:schemeClr>
-            </a:solidFill>
-            <a:prstDash val="sysDot"/>
-            <a:tailEnd type="stealth" w="lg" len="lg"/>
-          </a:ln>
-          <a:effectLst/>
-        </p:spPr>
-        <p:style>
-          <a:lnRef idx="1">
-            <a:schemeClr val="accent1"/>
-          </a:lnRef>
-          <a:fillRef idx="0">
-            <a:schemeClr val="accent1"/>
-          </a:fillRef>
-          <a:effectRef idx="0">
-            <a:schemeClr val="accent1"/>
-          </a:effectRef>
-          <a:fontRef idx="minor">
-            <a:schemeClr val="tx1"/>
-          </a:fontRef>
-        </p:style>
-      </p:cxnSp>
       <p:pic>
         <p:nvPicPr>
           <p:cNvPr id="27" name="Graphic 26">
@@ -4914,10 +4662,10 @@
           <p:nvPr/>
         </p:nvPicPr>
         <p:blipFill>
-          <a:blip r:embed="rId16">
+          <a:blip r:embed="rId21">
             <a:extLst>
               <a:ext uri="{96DAC541-7B7A-43D3-8B79-37D633B846F1}">
-                <asvg:svgBlip xmlns:asvg="http://schemas.microsoft.com/office/drawing/2016/SVG/main" r:embed="rId17"/>
+                <asvg:svgBlip xmlns:asvg="http://schemas.microsoft.com/office/drawing/2016/SVG/main" r:embed="rId22"/>
               </a:ext>
             </a:extLst>
           </a:blip>
@@ -4942,12 +4690,116 @@
           </a:effectLst>
         </p:spPr>
       </p:pic>
+      <p:sp>
+        <p:nvSpPr>
+          <p:cNvPr id="28" name="Oval 27">
+            <a:extLst>
+              <a:ext uri="{FF2B5EF4-FFF2-40B4-BE49-F238E27FC236}">
+                <a16:creationId xmlns:a16="http://schemas.microsoft.com/office/drawing/2014/main" id="{760714DE-F902-934F-9D24-F564BEA9B8C9}"/>
+              </a:ext>
+            </a:extLst>
+          </p:cNvPr>
+          <p:cNvSpPr/>
+          <p:nvPr/>
+        </p:nvSpPr>
+        <p:spPr>
+          <a:xfrm>
+            <a:off x="4843151" y="3795379"/>
+            <a:ext cx="1095437" cy="1118950"/>
+          </a:xfrm>
+          <a:prstGeom prst="ellipse">
+            <a:avLst/>
+          </a:prstGeom>
+          <a:solidFill>
+            <a:schemeClr val="bg1"/>
+          </a:solidFill>
+          <a:ln>
+            <a:solidFill>
+              <a:srgbClr val="C00000"/>
+            </a:solidFill>
+          </a:ln>
+          <a:effectLst>
+            <a:outerShdw blurRad="50800" dist="38100" dir="2700000" algn="tl" rotWithShape="0">
+              <a:prstClr val="black">
+                <a:alpha val="40000"/>
+              </a:prstClr>
+            </a:outerShdw>
+          </a:effectLst>
+        </p:spPr>
+        <p:style>
+          <a:lnRef idx="2">
+            <a:schemeClr val="accent1">
+              <a:shade val="50000"/>
+            </a:schemeClr>
+          </a:lnRef>
+          <a:fillRef idx="1">
+            <a:schemeClr val="accent1"/>
+          </a:fillRef>
+          <a:effectRef idx="0">
+            <a:schemeClr val="accent1"/>
+          </a:effectRef>
+          <a:fontRef idx="minor">
+            <a:schemeClr val="lt1"/>
+          </a:fontRef>
+        </p:style>
+        <p:txBody>
+          <a:bodyPr rtlCol="0" anchor="ctr"/>
+          <a:lstStyle/>
+          <a:p>
+            <a:pPr algn="ctr"/>
+            <a:endParaRPr lang="en-US" dirty="0"/>
+          </a:p>
+        </p:txBody>
+      </p:sp>
       <p:pic>
         <p:nvPicPr>
-          <p:cNvPr id="1026" name="Picture 2" descr="Seldon · GitHub">
-            <a:extLst>
-              <a:ext uri="{FF2B5EF4-FFF2-40B4-BE49-F238E27FC236}">
-                <a16:creationId xmlns:a16="http://schemas.microsoft.com/office/drawing/2014/main" id="{8B164542-4273-A246-B250-41186A1F5144}"/>
+          <p:cNvPr id="29" name="Graphic 28">
+            <a:extLst>
+              <a:ext uri="{FF2B5EF4-FFF2-40B4-BE49-F238E27FC236}">
+                <a16:creationId xmlns:a16="http://schemas.microsoft.com/office/drawing/2014/main" id="{2EC83D33-A883-6E42-B7C9-AD9CBF19AF7D}"/>
+              </a:ext>
+            </a:extLst>
+          </p:cNvPr>
+          <p:cNvPicPr>
+            <a:picLocks noChangeAspect="1"/>
+          </p:cNvPicPr>
+          <p:nvPr/>
+        </p:nvPicPr>
+        <p:blipFill>
+          <a:blip r:embed="rId21">
+            <a:extLst>
+              <a:ext uri="{96DAC541-7B7A-43D3-8B79-37D633B846F1}">
+                <asvg:svgBlip xmlns:asvg="http://schemas.microsoft.com/office/drawing/2016/SVG/main" r:embed="rId22"/>
+              </a:ext>
+            </a:extLst>
+          </a:blip>
+          <a:stretch>
+            <a:fillRect/>
+          </a:stretch>
+        </p:blipFill>
+        <p:spPr>
+          <a:xfrm>
+            <a:off x="5020061" y="3969923"/>
+            <a:ext cx="733592" cy="733592"/>
+          </a:xfrm>
+          <a:prstGeom prst="rect">
+            <a:avLst/>
+          </a:prstGeom>
+          <a:effectLst>
+            <a:outerShdw blurRad="50800" dist="50800" dir="5400000" algn="ctr" rotWithShape="0">
+              <a:srgbClr val="000000">
+                <a:alpha val="93000"/>
+              </a:srgbClr>
+            </a:outerShdw>
+          </a:effectLst>
+        </p:spPr>
+      </p:pic>
+      <p:pic>
+        <p:nvPicPr>
+          <p:cNvPr id="30" name="Picture 2" descr="Kubeflow">
+            <a:extLst>
+              <a:ext uri="{FF2B5EF4-FFF2-40B4-BE49-F238E27FC236}">
+                <a16:creationId xmlns:a16="http://schemas.microsoft.com/office/drawing/2014/main" id="{1DD22CAA-516E-3447-9F26-DDD4B8A5A3CD}"/>
               </a:ext>
             </a:extLst>
           </p:cNvPr>
@@ -4957,7 +4809,7 @@
           <p:nvPr/>
         </p:nvPicPr>
         <p:blipFill>
-          <a:blip r:embed="rId26">
+          <a:blip r:embed="rId23">
             <a:extLst>
               <a:ext uri="{28A0092B-C50C-407E-A947-70E740481C1C}">
                 <a14:useLocalDpi xmlns:a14="http://schemas.microsoft.com/office/drawing/2010/main" val="0"/>
@@ -4971,8 +4823,8 @@
         </p:blipFill>
         <p:spPr bwMode="auto">
           <a:xfrm flipH="1">
-            <a:off x="6592136" y="3652913"/>
-            <a:ext cx="494255" cy="494255"/>
+            <a:off x="6657341" y="4249854"/>
+            <a:ext cx="505667" cy="498513"/>
           </a:xfrm>
           <a:prstGeom prst="rect">
             <a:avLst/>
@@ -4989,54 +4841,471 @@
           </a:extLst>
         </p:spPr>
       </p:pic>
-      <p:cxnSp>
-        <p:nvCxnSpPr>
-          <p:cNvPr id="32" name="Straight Arrow Connector 31">
-            <a:extLst>
-              <a:ext uri="{FF2B5EF4-FFF2-40B4-BE49-F238E27FC236}">
-                <a16:creationId xmlns:a16="http://schemas.microsoft.com/office/drawing/2014/main" id="{E3A94DA0-3EA9-F444-863D-126ED6AD265A}"/>
-              </a:ext>
-            </a:extLst>
-          </p:cNvPr>
-          <p:cNvCxnSpPr>
-            <a:cxnSpLocks/>
-          </p:cNvCxnSpPr>
+      <p:pic>
+        <p:nvPicPr>
+          <p:cNvPr id="31" name="Picture 8" descr="Istio">
+            <a:extLst>
+              <a:ext uri="{FF2B5EF4-FFF2-40B4-BE49-F238E27FC236}">
+                <a16:creationId xmlns:a16="http://schemas.microsoft.com/office/drawing/2014/main" id="{4B11D518-E7AF-5B44-B739-17B053225676}"/>
+              </a:ext>
+            </a:extLst>
+          </p:cNvPr>
+          <p:cNvPicPr>
+            <a:picLocks noChangeAspect="1" noChangeArrowheads="1"/>
+          </p:cNvPicPr>
           <p:nvPr/>
-        </p:nvCxnSpPr>
-        <p:spPr>
-          <a:xfrm flipH="1">
-            <a:off x="5707117" y="4546257"/>
-            <a:ext cx="3692173" cy="0"/>
-          </a:xfrm>
-          <a:prstGeom prst="straightConnector1">
+        </p:nvPicPr>
+        <p:blipFill>
+          <a:blip r:embed="rId24">
+            <a:extLst>
+              <a:ext uri="{28A0092B-C50C-407E-A947-70E740481C1C}">
+                <a14:useLocalDpi xmlns:a14="http://schemas.microsoft.com/office/drawing/2010/main" val="0"/>
+              </a:ext>
+            </a:extLst>
+          </a:blip>
+          <a:srcRect/>
+          <a:stretch>
+            <a:fillRect/>
+          </a:stretch>
+        </p:blipFill>
+        <p:spPr bwMode="auto">
+          <a:xfrm>
+            <a:off x="7996805" y="4392129"/>
+            <a:ext cx="494256" cy="494256"/>
+          </a:xfrm>
+          <a:prstGeom prst="rect">
             <a:avLst/>
           </a:prstGeom>
-          <a:ln w="25400">
-            <a:solidFill>
-              <a:schemeClr val="bg2">
-                <a:lumMod val="75000"/>
-              </a:schemeClr>
-            </a:solidFill>
-            <a:prstDash val="sysDot"/>
-            <a:tailEnd type="none" w="lg" len="lg"/>
-          </a:ln>
-          <a:effectLst/>
-        </p:spPr>
-        <p:style>
-          <a:lnRef idx="1">
-            <a:schemeClr val="accent1"/>
-          </a:lnRef>
-          <a:fillRef idx="0">
-            <a:schemeClr val="accent1"/>
-          </a:fillRef>
-          <a:effectRef idx="0">
-            <a:schemeClr val="accent1"/>
-          </a:effectRef>
-          <a:fontRef idx="minor">
-            <a:schemeClr val="tx1"/>
-          </a:fontRef>
-        </p:style>
-      </p:cxnSp>
+          <a:noFill/>
+          <a:extLst>
+            <a:ext uri="{909E8E84-426E-40DD-AFC4-6F175D3DCCD1}">
+              <a14:hiddenFill xmlns:a14="http://schemas.microsoft.com/office/drawing/2010/main">
+                <a:solidFill>
+                  <a:srgbClr val="FFFFFF"/>
+                </a:solidFill>
+              </a14:hiddenFill>
+            </a:ext>
+          </a:extLst>
+        </p:spPr>
+      </p:pic>
+      <p:pic>
+        <p:nvPicPr>
+          <p:cNvPr id="33" name="Picture 2" descr="Use Ambassador Gateway with Knative Serving | by Justin Brûlotte |  Ambassador Labs">
+            <a:extLst>
+              <a:ext uri="{FF2B5EF4-FFF2-40B4-BE49-F238E27FC236}">
+                <a16:creationId xmlns:a16="http://schemas.microsoft.com/office/drawing/2014/main" id="{C5BE5090-33F9-B048-B72B-948FC05BB519}"/>
+              </a:ext>
+            </a:extLst>
+          </p:cNvPr>
+          <p:cNvPicPr>
+            <a:picLocks noChangeAspect="1" noChangeArrowheads="1"/>
+          </p:cNvPicPr>
+          <p:nvPr/>
+        </p:nvPicPr>
+        <p:blipFill>
+          <a:blip r:embed="rId25">
+            <a:extLst>
+              <a:ext uri="{28A0092B-C50C-407E-A947-70E740481C1C}">
+                <a14:useLocalDpi xmlns:a14="http://schemas.microsoft.com/office/drawing/2010/main" val="0"/>
+              </a:ext>
+            </a:extLst>
+          </a:blip>
+          <a:srcRect/>
+          <a:stretch>
+            <a:fillRect/>
+          </a:stretch>
+        </p:blipFill>
+        <p:spPr bwMode="auto">
+          <a:xfrm>
+            <a:off x="6881524" y="3613469"/>
+            <a:ext cx="611528" cy="494256"/>
+          </a:xfrm>
+          <a:prstGeom prst="rect">
+            <a:avLst/>
+          </a:prstGeom>
+          <a:noFill/>
+          <a:extLst>
+            <a:ext uri="{909E8E84-426E-40DD-AFC4-6F175D3DCCD1}">
+              <a14:hiddenFill xmlns:a14="http://schemas.microsoft.com/office/drawing/2010/main">
+                <a:solidFill>
+                  <a:srgbClr val="FFFFFF"/>
+                </a:solidFill>
+              </a14:hiddenFill>
+            </a:ext>
+          </a:extLst>
+        </p:spPr>
+      </p:pic>
+      <p:pic>
+        <p:nvPicPr>
+          <p:cNvPr id="34" name="Picture 2" descr="Seldon · GitHub">
+            <a:extLst>
+              <a:ext uri="{FF2B5EF4-FFF2-40B4-BE49-F238E27FC236}">
+                <a16:creationId xmlns:a16="http://schemas.microsoft.com/office/drawing/2014/main" id="{B83EC9B4-3C72-5A44-8F69-66DD58B9D3EC}"/>
+              </a:ext>
+            </a:extLst>
+          </p:cNvPr>
+          <p:cNvPicPr>
+            <a:picLocks noChangeAspect="1" noChangeArrowheads="1"/>
+          </p:cNvPicPr>
+          <p:nvPr/>
+        </p:nvPicPr>
+        <p:blipFill>
+          <a:blip r:embed="rId26">
+            <a:extLst>
+              <a:ext uri="{28A0092B-C50C-407E-A947-70E740481C1C}">
+                <a14:useLocalDpi xmlns:a14="http://schemas.microsoft.com/office/drawing/2010/main" val="0"/>
+              </a:ext>
+            </a:extLst>
+          </a:blip>
+          <a:srcRect/>
+          <a:stretch>
+            <a:fillRect/>
+          </a:stretch>
+        </p:blipFill>
+        <p:spPr bwMode="auto">
+          <a:xfrm flipH="1">
+            <a:off x="7599706" y="3806542"/>
+            <a:ext cx="494255" cy="494255"/>
+          </a:xfrm>
+          <a:prstGeom prst="rect">
+            <a:avLst/>
+          </a:prstGeom>
+          <a:noFill/>
+          <a:extLst>
+            <a:ext uri="{909E8E84-426E-40DD-AFC4-6F175D3DCCD1}">
+              <a14:hiddenFill xmlns:a14="http://schemas.microsoft.com/office/drawing/2010/main">
+                <a:solidFill>
+                  <a:srgbClr val="FFFFFF"/>
+                </a:solidFill>
+              </a14:hiddenFill>
+            </a:ext>
+          </a:extLst>
+        </p:spPr>
+      </p:pic>
+      <p:pic>
+        <p:nvPicPr>
+          <p:cNvPr id="35" name="Picture 34" descr="A picture containing icon&#10;&#10;Description automatically generated">
+            <a:extLst>
+              <a:ext uri="{FF2B5EF4-FFF2-40B4-BE49-F238E27FC236}">
+                <a16:creationId xmlns:a16="http://schemas.microsoft.com/office/drawing/2014/main" id="{DD09B5F6-2D05-144B-A336-7DD4AC5C278B}"/>
+              </a:ext>
+            </a:extLst>
+          </p:cNvPr>
+          <p:cNvPicPr>
+            <a:picLocks noChangeAspect="1"/>
+          </p:cNvPicPr>
+          <p:nvPr/>
+        </p:nvPicPr>
+        <p:blipFill>
+          <a:blip r:embed="rId27">
+            <a:extLst>
+              <a:ext uri="{837473B0-CC2E-450A-ABE3-18F120FF3D39}">
+                <a1611:picAttrSrcUrl xmlns:a1611="http://schemas.microsoft.com/office/drawing/2016/11/main" r:id="rId28"/>
+              </a:ext>
+            </a:extLst>
+          </a:blip>
+          <a:stretch>
+            <a:fillRect/>
+          </a:stretch>
+        </p:blipFill>
+        <p:spPr>
+          <a:xfrm>
+            <a:off x="8294067" y="3572047"/>
+            <a:ext cx="552673" cy="527803"/>
+          </a:xfrm>
+          <a:prstGeom prst="rect">
+            <a:avLst/>
+          </a:prstGeom>
+        </p:spPr>
+      </p:pic>
+      <p:pic>
+        <p:nvPicPr>
+          <p:cNvPr id="36" name="Picture 35" descr="Logo, icon&#10;&#10;Description automatically generated">
+            <a:extLst>
+              <a:ext uri="{FF2B5EF4-FFF2-40B4-BE49-F238E27FC236}">
+                <a16:creationId xmlns:a16="http://schemas.microsoft.com/office/drawing/2014/main" id="{0C8F6387-D0FE-2349-A54C-58FC9CBA38C7}"/>
+              </a:ext>
+            </a:extLst>
+          </p:cNvPr>
+          <p:cNvPicPr>
+            <a:picLocks noChangeAspect="1"/>
+          </p:cNvPicPr>
+          <p:nvPr/>
+        </p:nvPicPr>
+        <p:blipFill>
+          <a:blip r:embed="rId13">
+            <a:extLst>
+              <a:ext uri="{837473B0-CC2E-450A-ABE3-18F120FF3D39}">
+                <a1611:picAttrSrcUrl xmlns:a1611="http://schemas.microsoft.com/office/drawing/2016/11/main" r:id="rId14"/>
+              </a:ext>
+            </a:extLst>
+          </a:blip>
+          <a:stretch>
+            <a:fillRect/>
+          </a:stretch>
+        </p:blipFill>
+        <p:spPr>
+          <a:xfrm>
+            <a:off x="6002221" y="4392129"/>
+            <a:ext cx="469190" cy="485240"/>
+          </a:xfrm>
+          <a:prstGeom prst="rect">
+            <a:avLst/>
+          </a:prstGeom>
+        </p:spPr>
+      </p:pic>
+      <p:pic>
+        <p:nvPicPr>
+          <p:cNvPr id="37" name="Picture 36" descr="Icon&#10;&#10;Description automatically generated">
+            <a:extLst>
+              <a:ext uri="{FF2B5EF4-FFF2-40B4-BE49-F238E27FC236}">
+                <a16:creationId xmlns:a16="http://schemas.microsoft.com/office/drawing/2014/main" id="{117C7499-9318-9449-81D3-B38B3DB9B588}"/>
+              </a:ext>
+            </a:extLst>
+          </p:cNvPr>
+          <p:cNvPicPr>
+            <a:picLocks noChangeAspect="1"/>
+          </p:cNvPicPr>
+          <p:nvPr/>
+        </p:nvPicPr>
+        <p:blipFill>
+          <a:blip r:embed="rId15">
+            <a:extLst>
+              <a:ext uri="{837473B0-CC2E-450A-ABE3-18F120FF3D39}">
+                <a1611:picAttrSrcUrl xmlns:a1611="http://schemas.microsoft.com/office/drawing/2016/11/main" r:id="rId16"/>
+              </a:ext>
+            </a:extLst>
+          </a:blip>
+          <a:stretch>
+            <a:fillRect/>
+          </a:stretch>
+        </p:blipFill>
+        <p:spPr>
+          <a:xfrm>
+            <a:off x="7294349" y="4429658"/>
+            <a:ext cx="576312" cy="485240"/>
+          </a:xfrm>
+          <a:prstGeom prst="rect">
+            <a:avLst/>
+          </a:prstGeom>
+        </p:spPr>
+      </p:pic>
+      <p:pic>
+        <p:nvPicPr>
+          <p:cNvPr id="38" name="Picture 37" descr="Icon&#10;&#10;Description automatically generated">
+            <a:extLst>
+              <a:ext uri="{FF2B5EF4-FFF2-40B4-BE49-F238E27FC236}">
+                <a16:creationId xmlns:a16="http://schemas.microsoft.com/office/drawing/2014/main" id="{76095F62-9E7B-D34D-97B9-CC09A1EAB6D8}"/>
+              </a:ext>
+            </a:extLst>
+          </p:cNvPr>
+          <p:cNvPicPr>
+            <a:picLocks noChangeAspect="1"/>
+          </p:cNvPicPr>
+          <p:nvPr/>
+        </p:nvPicPr>
+        <p:blipFill>
+          <a:blip r:embed="rId17">
+            <a:extLst>
+              <a:ext uri="{837473B0-CC2E-450A-ABE3-18F120FF3D39}">
+                <a1611:picAttrSrcUrl xmlns:a1611="http://schemas.microsoft.com/office/drawing/2016/11/main" r:id="rId18"/>
+              </a:ext>
+            </a:extLst>
+          </a:blip>
+          <a:stretch>
+            <a:fillRect/>
+          </a:stretch>
+        </p:blipFill>
+        <p:spPr>
+          <a:xfrm>
+            <a:off x="9068269" y="3622486"/>
+            <a:ext cx="465279" cy="485239"/>
+          </a:xfrm>
+          <a:prstGeom prst="rect">
+            <a:avLst/>
+          </a:prstGeom>
+        </p:spPr>
+      </p:pic>
+      <p:pic>
+        <p:nvPicPr>
+          <p:cNvPr id="39" name="Picture 38" descr="Shape&#10;&#10;Description automatically generated">
+            <a:extLst>
+              <a:ext uri="{FF2B5EF4-FFF2-40B4-BE49-F238E27FC236}">
+                <a16:creationId xmlns:a16="http://schemas.microsoft.com/office/drawing/2014/main" id="{FBDBDB67-E0CA-9047-9369-1E2DC2890287}"/>
+              </a:ext>
+            </a:extLst>
+          </p:cNvPr>
+          <p:cNvPicPr>
+            <a:picLocks noChangeAspect="1"/>
+          </p:cNvPicPr>
+          <p:nvPr/>
+        </p:nvPicPr>
+        <p:blipFill>
+          <a:blip r:embed="rId19">
+            <a:extLst>
+              <a:ext uri="{837473B0-CC2E-450A-ABE3-18F120FF3D39}">
+                <a1611:picAttrSrcUrl xmlns:a1611="http://schemas.microsoft.com/office/drawing/2016/11/main" r:id="rId20"/>
+              </a:ext>
+            </a:extLst>
+          </a:blip>
+          <a:stretch>
+            <a:fillRect/>
+          </a:stretch>
+        </p:blipFill>
+        <p:spPr>
+          <a:xfrm>
+            <a:off x="8655171" y="4249854"/>
+            <a:ext cx="467334" cy="485240"/>
+          </a:xfrm>
+          <a:prstGeom prst="rect">
+            <a:avLst/>
+          </a:prstGeom>
+        </p:spPr>
+      </p:pic>
+      <p:pic>
+        <p:nvPicPr>
+          <p:cNvPr id="40" name="Picture 39" descr="Icon&#10;&#10;Description automatically generated">
+            <a:extLst>
+              <a:ext uri="{FF2B5EF4-FFF2-40B4-BE49-F238E27FC236}">
+                <a16:creationId xmlns:a16="http://schemas.microsoft.com/office/drawing/2014/main" id="{58BE6B85-B041-C94C-9A16-27153563724D}"/>
+              </a:ext>
+            </a:extLst>
+          </p:cNvPr>
+          <p:cNvPicPr>
+            <a:picLocks noChangeAspect="1"/>
+          </p:cNvPicPr>
+          <p:nvPr/>
+        </p:nvPicPr>
+        <p:blipFill>
+          <a:blip r:embed="rId29">
+            <a:extLst>
+              <a:ext uri="{837473B0-CC2E-450A-ABE3-18F120FF3D39}">
+                <a1611:picAttrSrcUrl xmlns:a1611="http://schemas.microsoft.com/office/drawing/2016/11/main" r:id="rId30"/>
+              </a:ext>
+            </a:extLst>
+          </a:blip>
+          <a:stretch>
+            <a:fillRect/>
+          </a:stretch>
+        </p:blipFill>
+        <p:spPr>
+          <a:xfrm>
+            <a:off x="6001993" y="3748122"/>
+            <a:ext cx="552675" cy="552675"/>
+          </a:xfrm>
+          <a:prstGeom prst="rect">
+            <a:avLst/>
+          </a:prstGeom>
+        </p:spPr>
+      </p:pic>
+      <p:pic>
+        <p:nvPicPr>
+          <p:cNvPr id="41" name="Picture 40" descr="Icon&#10;&#10;Description automatically generated">
+            <a:extLst>
+              <a:ext uri="{FF2B5EF4-FFF2-40B4-BE49-F238E27FC236}">
+                <a16:creationId xmlns:a16="http://schemas.microsoft.com/office/drawing/2014/main" id="{4BE906FC-F761-7D42-A413-5B9C99D4AA9D}"/>
+              </a:ext>
+            </a:extLst>
+          </p:cNvPr>
+          <p:cNvPicPr>
+            <a:picLocks noChangeAspect="1"/>
+          </p:cNvPicPr>
+          <p:nvPr/>
+        </p:nvPicPr>
+        <p:blipFill>
+          <a:blip r:embed="rId31">
+            <a:extLst>
+              <a:ext uri="{837473B0-CC2E-450A-ABE3-18F120FF3D39}">
+                <a1611:picAttrSrcUrl xmlns:a1611="http://schemas.microsoft.com/office/drawing/2016/11/main" r:id="rId32"/>
+              </a:ext>
+            </a:extLst>
+          </a:blip>
+          <a:stretch>
+            <a:fillRect/>
+          </a:stretch>
+        </p:blipFill>
+        <p:spPr>
+          <a:xfrm>
+            <a:off x="9884910" y="4447592"/>
+            <a:ext cx="426623" cy="491178"/>
+          </a:xfrm>
+          <a:prstGeom prst="rect">
+            <a:avLst/>
+          </a:prstGeom>
+        </p:spPr>
+      </p:pic>
+      <p:pic>
+        <p:nvPicPr>
+          <p:cNvPr id="42" name="Picture 41" descr="Icon&#10;&#10;Description automatically generated">
+            <a:extLst>
+              <a:ext uri="{FF2B5EF4-FFF2-40B4-BE49-F238E27FC236}">
+                <a16:creationId xmlns:a16="http://schemas.microsoft.com/office/drawing/2014/main" id="{E6F53F2C-F939-A24E-A40D-482A87A2C6DD}"/>
+              </a:ext>
+            </a:extLst>
+          </p:cNvPr>
+          <p:cNvPicPr>
+            <a:picLocks noChangeAspect="1"/>
+          </p:cNvPicPr>
+          <p:nvPr/>
+        </p:nvPicPr>
+        <p:blipFill>
+          <a:blip r:embed="rId33">
+            <a:extLst>
+              <a:ext uri="{837473B0-CC2E-450A-ABE3-18F120FF3D39}">
+                <a1611:picAttrSrcUrl xmlns:a1611="http://schemas.microsoft.com/office/drawing/2016/11/main" r:id="rId34"/>
+              </a:ext>
+            </a:extLst>
+          </a:blip>
+          <a:stretch>
+            <a:fillRect/>
+          </a:stretch>
+        </p:blipFill>
+        <p:spPr>
+          <a:xfrm>
+            <a:off x="9267720" y="4240838"/>
+            <a:ext cx="494256" cy="494256"/>
+          </a:xfrm>
+          <a:prstGeom prst="rect">
+            <a:avLst/>
+          </a:prstGeom>
+        </p:spPr>
+      </p:pic>
+      <p:pic>
+        <p:nvPicPr>
+          <p:cNvPr id="43" name="Picture 42" descr="Shape, icon&#10;&#10;Description automatically generated">
+            <a:extLst>
+              <a:ext uri="{FF2B5EF4-FFF2-40B4-BE49-F238E27FC236}">
+                <a16:creationId xmlns:a16="http://schemas.microsoft.com/office/drawing/2014/main" id="{F434F5C4-EA86-EF40-B054-7B604CA76974}"/>
+              </a:ext>
+            </a:extLst>
+          </p:cNvPr>
+          <p:cNvPicPr>
+            <a:picLocks noChangeAspect="1"/>
+          </p:cNvPicPr>
+          <p:nvPr/>
+        </p:nvPicPr>
+        <p:blipFill>
+          <a:blip r:embed="rId35">
+            <a:extLst>
+              <a:ext uri="{837473B0-CC2E-450A-ABE3-18F120FF3D39}">
+                <a1611:picAttrSrcUrl xmlns:a1611="http://schemas.microsoft.com/office/drawing/2016/11/main" r:id="rId36"/>
+              </a:ext>
+            </a:extLst>
+          </a:blip>
+          <a:stretch>
+            <a:fillRect/>
+          </a:stretch>
+        </p:blipFill>
+        <p:spPr>
+          <a:xfrm>
+            <a:off x="9790635" y="3678943"/>
+            <a:ext cx="333302" cy="494255"/>
+          </a:xfrm>
+          <a:prstGeom prst="rect">
+            <a:avLst/>
+          </a:prstGeom>
+        </p:spPr>
+      </p:pic>
     </p:spTree>
     <p:extLst>
       <p:ext uri="{BB962C8B-B14F-4D97-AF65-F5344CB8AC3E}">

</xml_diff>

<commit_message>
Deployed 0f3585b to 0.7 with MkDocs 1.2.2 and mike 1.1.1
</commit_message>
<xml_diff>
--- a/0.7/images/src/illustration.pptx
+++ b/0.7/images/src/illustration.pptx
@@ -197,7 +197,7 @@
           <a:p>
             <a:fld id="{38B78CBE-37FA-D241-BB4C-CAC5D3B25F49}" type="datetimeFigureOut">
               <a:rPr lang="en-US" smtClean="0"/>
-              <a:t>7/28/21</a:t>
+              <a:t>9/24/21</a:t>
             </a:fld>
             <a:endParaRPr lang="en-US"/>
           </a:p>
@@ -695,7 +695,7 @@
           <a:p>
             <a:fld id="{708812C5-0212-FD42-A0D4-E2E8FF4E3AF5}" type="datetime1">
               <a:rPr lang="en-US" smtClean="0"/>
-              <a:t>7/28/21</a:t>
+              <a:t>9/24/21</a:t>
             </a:fld>
             <a:endParaRPr lang="en-US"/>
           </a:p>
@@ -896,7 +896,7 @@
           <a:p>
             <a:fld id="{D232AC6F-41C3-B34B-9BAA-03ED2F3BC0F6}" type="datetime1">
               <a:rPr lang="en-US" smtClean="0"/>
-              <a:t>7/28/21</a:t>
+              <a:t>9/24/21</a:t>
             </a:fld>
             <a:endParaRPr lang="en-US"/>
           </a:p>
@@ -1107,7 +1107,7 @@
           <a:p>
             <a:fld id="{BEE140C2-F440-9D49-95CB-5965D64CC4A2}" type="datetime1">
               <a:rPr lang="en-US" smtClean="0"/>
-              <a:t>7/28/21</a:t>
+              <a:t>9/24/21</a:t>
             </a:fld>
             <a:endParaRPr lang="en-US"/>
           </a:p>
@@ -1308,7 +1308,7 @@
           <a:p>
             <a:fld id="{CC99F980-FB29-FD47-8508-150F73F1E8B0}" type="datetime1">
               <a:rPr lang="en-US" smtClean="0"/>
-              <a:t>7/28/21</a:t>
+              <a:t>9/24/21</a:t>
             </a:fld>
             <a:endParaRPr lang="en-US"/>
           </a:p>
@@ -1586,7 +1586,7 @@
           <a:p>
             <a:fld id="{D4510983-EA22-9643-8AC0-B3C6499B643B}" type="datetime1">
               <a:rPr lang="en-US" smtClean="0"/>
-              <a:t>7/28/21</a:t>
+              <a:t>9/24/21</a:t>
             </a:fld>
             <a:endParaRPr lang="en-US"/>
           </a:p>
@@ -1854,7 +1854,7 @@
           <a:p>
             <a:fld id="{D5A39195-967D-5D4E-8C6A-C99866996458}" type="datetime1">
               <a:rPr lang="en-US" smtClean="0"/>
-              <a:t>7/28/21</a:t>
+              <a:t>9/24/21</a:t>
             </a:fld>
             <a:endParaRPr lang="en-US"/>
           </a:p>
@@ -2269,7 +2269,7 @@
           <a:p>
             <a:fld id="{5AD771E9-C79D-684D-A158-5EB6E92DE947}" type="datetime1">
               <a:rPr lang="en-US" smtClean="0"/>
-              <a:t>7/28/21</a:t>
+              <a:t>9/24/21</a:t>
             </a:fld>
             <a:endParaRPr lang="en-US"/>
           </a:p>
@@ -2413,7 +2413,7 @@
           <a:p>
             <a:fld id="{693CA161-7E4C-5C4B-B799-DB602A0B9806}" type="datetime1">
               <a:rPr lang="en-US" smtClean="0"/>
-              <a:t>7/28/21</a:t>
+              <a:t>9/24/21</a:t>
             </a:fld>
             <a:endParaRPr lang="en-US"/>
           </a:p>
@@ -2529,7 +2529,7 @@
           <a:p>
             <a:fld id="{6D55FDF3-8BB2-6349-A5FA-057F3D78953D}" type="datetime1">
               <a:rPr lang="en-US" smtClean="0"/>
-              <a:t>7/28/21</a:t>
+              <a:t>9/24/21</a:t>
             </a:fld>
             <a:endParaRPr lang="en-US"/>
           </a:p>
@@ -2843,7 +2843,7 @@
           <a:p>
             <a:fld id="{EEDFACC0-3228-BA4B-942E-CEF38B0101FD}" type="datetime1">
               <a:rPr lang="en-US" smtClean="0"/>
-              <a:t>7/28/21</a:t>
+              <a:t>9/24/21</a:t>
             </a:fld>
             <a:endParaRPr lang="en-US"/>
           </a:p>
@@ -3134,7 +3134,7 @@
           <a:p>
             <a:fld id="{07EEEDBE-E24C-D140-B419-6D8D592D0F1C}" type="datetime1">
               <a:rPr lang="en-US" smtClean="0"/>
-              <a:t>7/28/21</a:t>
+              <a:t>9/24/21</a:t>
             </a:fld>
             <a:endParaRPr lang="en-US"/>
           </a:p>
@@ -3378,7 +3378,7 @@
           <a:p>
             <a:fld id="{E05781A2-A5EF-C54C-A3EF-F62483D37EDC}" type="datetime1">
               <a:rPr lang="en-US" smtClean="0"/>
-              <a:t>7/28/21</a:t>
+              <a:t>9/24/21</a:t>
             </a:fld>
             <a:endParaRPr lang="en-US"/>
           </a:p>
@@ -3814,7 +3814,7 @@
         <p:spPr>
           <a:xfrm>
             <a:off x="4581297" y="3522338"/>
-            <a:ext cx="5992110" cy="1869469"/>
+            <a:ext cx="5992110" cy="1960534"/>
           </a:xfrm>
           <a:prstGeom prst="roundRect">
             <a:avLst/>
@@ -3870,7 +3870,23 @@
                   <a:srgbClr val="7A004A"/>
                 </a:solidFill>
               </a:rPr>
-              <a:t>any K8s environment</a:t>
+              <a:t>any K8s environment. </a:t>
+            </a:r>
+            <a:r>
+              <a:rPr lang="en-US" sz="2000" dirty="0">
+                <a:solidFill>
+                  <a:schemeClr val="tx1"/>
+                </a:solidFill>
+              </a:rPr>
+              <a:t>Use within </a:t>
+            </a:r>
+            <a:r>
+              <a:rPr lang="en-US" sz="2000" b="1" dirty="0">
+                <a:solidFill>
+                  <a:srgbClr val="7A004A"/>
+                </a:solidFill>
+              </a:rPr>
+              <a:t>any CI/CD/GitOps process. </a:t>
             </a:r>
             <a:endParaRPr lang="en-US" sz="2000" b="1" dirty="0">
               <a:solidFill>
@@ -4092,7 +4108,7 @@
         </p:blipFill>
         <p:spPr>
           <a:xfrm>
-            <a:off x="3350988" y="4028150"/>
+            <a:off x="3351213" y="4082036"/>
             <a:ext cx="837897" cy="837897"/>
           </a:xfrm>
           <a:prstGeom prst="rect">
@@ -4128,8 +4144,8 @@
         </p:nvCxnSpPr>
         <p:spPr>
           <a:xfrm>
-            <a:off x="4188885" y="4447099"/>
-            <a:ext cx="392412" cy="9974"/>
+            <a:off x="4189110" y="4500985"/>
+            <a:ext cx="392187" cy="1620"/>
           </a:xfrm>
           <a:prstGeom prst="straightConnector1">
             <a:avLst/>
@@ -4269,12 +4285,12 @@
               <a:t> built-in </a:t>
             </a:r>
             <a:r>
-              <a:rPr lang="en-US" sz="2000" dirty="0">
+              <a:rPr lang="en-US" sz="2000">
                 <a:solidFill>
                   <a:schemeClr val="tx1"/>
                 </a:solidFill>
               </a:rPr>
-              <a:t>metrics collector or </a:t>
+              <a:t>metrics or </a:t>
             </a:r>
             <a:r>
               <a:rPr lang="en-US" sz="2000" b="1" dirty="0">
@@ -4385,20 +4401,19 @@
           </p:cNvPr>
           <p:cNvCxnSpPr>
             <a:cxnSpLocks/>
-            <a:stCxn id="28" idx="2"/>
+            <a:stCxn id="45" idx="0"/>
             <a:endCxn id="55" idx="2"/>
           </p:cNvCxnSpPr>
           <p:nvPr/>
         </p:nvCxnSpPr>
         <p:spPr>
-          <a:xfrm rot="10800000" flipH="1">
-            <a:off x="4843151" y="3060948"/>
-            <a:ext cx="128652" cy="1293906"/>
-          </a:xfrm>
-          <a:prstGeom prst="bentConnector4">
+          <a:xfrm rot="16200000" flipV="1">
+            <a:off x="6003496" y="2029256"/>
+            <a:ext cx="538975" cy="2602359"/>
+          </a:xfrm>
+          <a:prstGeom prst="bentConnector3">
             <a:avLst>
-              <a:gd name="adj1" fmla="val -112332"/>
-              <a:gd name="adj2" fmla="val 78931"/>
+              <a:gd name="adj1" fmla="val 50000"/>
             </a:avLst>
           </a:prstGeom>
           <a:ln w="25400">
@@ -4439,18 +4454,18 @@
           <p:cNvCxnSpPr>
             <a:cxnSpLocks/>
             <a:stCxn id="66" idx="2"/>
-            <a:endCxn id="28" idx="0"/>
+            <a:endCxn id="45" idx="0"/>
           </p:cNvCxnSpPr>
           <p:nvPr/>
         </p:nvCxnSpPr>
         <p:spPr>
           <a:xfrm rot="5400000">
-            <a:off x="6717416" y="1734405"/>
-            <a:ext cx="734429" cy="3387519"/>
+            <a:off x="7906790" y="2728323"/>
+            <a:ext cx="538973" cy="1204227"/>
           </a:xfrm>
           <a:prstGeom prst="bentConnector3">
             <a:avLst>
-              <a:gd name="adj1" fmla="val 32827"/>
+              <a:gd name="adj1" fmla="val 50000"/>
             </a:avLst>
           </a:prstGeom>
           <a:ln w="25400">
@@ -4668,10 +4683,10 @@
       </p:pic>
       <p:sp>
         <p:nvSpPr>
-          <p:cNvPr id="28" name="Oval 27">
-            <a:extLst>
-              <a:ext uri="{FF2B5EF4-FFF2-40B4-BE49-F238E27FC236}">
-                <a16:creationId xmlns:a16="http://schemas.microsoft.com/office/drawing/2014/main" id="{760714DE-F902-934F-9D24-F564BEA9B8C9}"/>
+          <p:cNvPr id="44" name="Rounded Rectangle 43">
+            <a:extLst>
+              <a:ext uri="{FF2B5EF4-FFF2-40B4-BE49-F238E27FC236}">
+                <a16:creationId xmlns:a16="http://schemas.microsoft.com/office/drawing/2014/main" id="{CCF2FE35-FD73-F240-96B7-60934C6C3CDD}"/>
               </a:ext>
             </a:extLst>
           </p:cNvPr>
@@ -4680,8 +4695,60 @@
         </p:nvSpPr>
         <p:spPr>
           <a:xfrm>
-            <a:off x="4843151" y="3795379"/>
-            <a:ext cx="1095437" cy="1118950"/>
+            <a:off x="5123254" y="3176259"/>
+            <a:ext cx="4908331" cy="1960534"/>
+          </a:xfrm>
+          <a:prstGeom prst="roundRect">
+            <a:avLst/>
+          </a:prstGeom>
+          <a:noFill/>
+          <a:ln>
+            <a:noFill/>
+          </a:ln>
+        </p:spPr>
+        <p:style>
+          <a:lnRef idx="2">
+            <a:schemeClr val="accent1">
+              <a:shade val="50000"/>
+            </a:schemeClr>
+          </a:lnRef>
+          <a:fillRef idx="1">
+            <a:schemeClr val="accent1"/>
+          </a:fillRef>
+          <a:effectRef idx="0">
+            <a:schemeClr val="accent1"/>
+          </a:effectRef>
+          <a:fontRef idx="minor">
+            <a:schemeClr val="lt1"/>
+          </a:fontRef>
+        </p:style>
+        <p:txBody>
+          <a:bodyPr rtlCol="0" anchor="ctr"/>
+          <a:lstStyle/>
+          <a:p>
+            <a:pPr algn="ctr"/>
+            <a:endParaRPr lang="en-US" dirty="0"/>
+          </a:p>
+        </p:txBody>
+      </p:sp>
+      <p:sp>
+        <p:nvSpPr>
+          <p:cNvPr id="45" name="Oval 44">
+            <a:extLst>
+              <a:ext uri="{FF2B5EF4-FFF2-40B4-BE49-F238E27FC236}">
+                <a16:creationId xmlns:a16="http://schemas.microsoft.com/office/drawing/2014/main" id="{7EA7BD02-DB63-9548-B6A6-786AF358FC92}"/>
+              </a:ext>
+            </a:extLst>
+          </p:cNvPr>
+          <p:cNvSpPr>
+            <a:spLocks noChangeAspect="1"/>
+          </p:cNvSpPr>
+          <p:nvPr/>
+        </p:nvSpPr>
+        <p:spPr>
+          <a:xfrm>
+            <a:off x="7016378" y="3599923"/>
+            <a:ext cx="1115568" cy="1118950"/>
           </a:xfrm>
           <a:prstGeom prst="ellipse">
             <a:avLst/>
@@ -4729,10 +4796,10 @@
       </p:sp>
       <p:pic>
         <p:nvPicPr>
-          <p:cNvPr id="29" name="Graphic 28">
-            <a:extLst>
-              <a:ext uri="{FF2B5EF4-FFF2-40B4-BE49-F238E27FC236}">
-                <a16:creationId xmlns:a16="http://schemas.microsoft.com/office/drawing/2014/main" id="{2EC83D33-A883-6E42-B7C9-AD9CBF19AF7D}"/>
+          <p:cNvPr id="46" name="Graphic 45">
+            <a:extLst>
+              <a:ext uri="{FF2B5EF4-FFF2-40B4-BE49-F238E27FC236}">
+                <a16:creationId xmlns:a16="http://schemas.microsoft.com/office/drawing/2014/main" id="{DB0AF4BA-07A2-6344-A68F-2AF45ACD2045}"/>
               </a:ext>
             </a:extLst>
           </p:cNvPr>
@@ -4755,8 +4822,8 @@
         </p:blipFill>
         <p:spPr>
           <a:xfrm>
-            <a:off x="5020061" y="3969923"/>
-            <a:ext cx="733592" cy="733592"/>
+            <a:off x="7199575" y="3772808"/>
+            <a:ext cx="746070" cy="746070"/>
           </a:xfrm>
           <a:prstGeom prst="rect">
             <a:avLst/>
@@ -4772,10 +4839,10 @@
       </p:pic>
       <p:pic>
         <p:nvPicPr>
-          <p:cNvPr id="30" name="Picture 2" descr="Kubeflow">
-            <a:extLst>
-              <a:ext uri="{FF2B5EF4-FFF2-40B4-BE49-F238E27FC236}">
-                <a16:creationId xmlns:a16="http://schemas.microsoft.com/office/drawing/2014/main" id="{1DD22CAA-516E-3447-9F26-DDD4B8A5A3CD}"/>
+          <p:cNvPr id="47" name="Picture 2" descr="Kubeflow">
+            <a:extLst>
+              <a:ext uri="{FF2B5EF4-FFF2-40B4-BE49-F238E27FC236}">
+                <a16:creationId xmlns:a16="http://schemas.microsoft.com/office/drawing/2014/main" id="{389C2893-5019-984C-AF25-A80B1A987175}"/>
               </a:ext>
             </a:extLst>
           </p:cNvPr>
@@ -4799,8 +4866,8 @@
         </p:blipFill>
         <p:spPr bwMode="auto">
           <a:xfrm flipH="1">
-            <a:off x="6657341" y="4249854"/>
-            <a:ext cx="505667" cy="498513"/>
+            <a:off x="6439994" y="3642541"/>
+            <a:ext cx="379046" cy="373683"/>
           </a:xfrm>
           <a:prstGeom prst="rect">
             <a:avLst/>
@@ -4819,10 +4886,10 @@
       </p:pic>
       <p:pic>
         <p:nvPicPr>
-          <p:cNvPr id="31" name="Picture 8" descr="Istio">
-            <a:extLst>
-              <a:ext uri="{FF2B5EF4-FFF2-40B4-BE49-F238E27FC236}">
-                <a16:creationId xmlns:a16="http://schemas.microsoft.com/office/drawing/2014/main" id="{4B11D518-E7AF-5B44-B739-17B053225676}"/>
+          <p:cNvPr id="48" name="Picture 8" descr="Istio">
+            <a:extLst>
+              <a:ext uri="{FF2B5EF4-FFF2-40B4-BE49-F238E27FC236}">
+                <a16:creationId xmlns:a16="http://schemas.microsoft.com/office/drawing/2014/main" id="{785E82C4-48FF-1446-A29D-E156749F2C55}"/>
               </a:ext>
             </a:extLst>
           </p:cNvPr>
@@ -4846,8 +4913,8 @@
         </p:blipFill>
         <p:spPr bwMode="auto">
           <a:xfrm>
-            <a:off x="7996805" y="4392129"/>
-            <a:ext cx="494256" cy="494256"/>
+            <a:off x="5123254" y="4145843"/>
+            <a:ext cx="364659" cy="364659"/>
           </a:xfrm>
           <a:prstGeom prst="rect">
             <a:avLst/>
@@ -4866,10 +4933,10 @@
       </p:pic>
       <p:pic>
         <p:nvPicPr>
-          <p:cNvPr id="33" name="Picture 2" descr="Use Ambassador Gateway with Knative Serving | by Justin Brûlotte |  Ambassador Labs">
-            <a:extLst>
-              <a:ext uri="{FF2B5EF4-FFF2-40B4-BE49-F238E27FC236}">
-                <a16:creationId xmlns:a16="http://schemas.microsoft.com/office/drawing/2014/main" id="{C5BE5090-33F9-B048-B72B-948FC05BB519}"/>
+          <p:cNvPr id="49" name="Picture 2" descr="Use Ambassador Gateway with Knative Serving | by Justin Brûlotte |  Ambassador Labs">
+            <a:extLst>
+              <a:ext uri="{FF2B5EF4-FFF2-40B4-BE49-F238E27FC236}">
+                <a16:creationId xmlns:a16="http://schemas.microsoft.com/office/drawing/2014/main" id="{2CB49637-1FF7-3948-808E-4B44687FC126}"/>
               </a:ext>
             </a:extLst>
           </p:cNvPr>
@@ -4893,8 +4960,8 @@
         </p:blipFill>
         <p:spPr bwMode="auto">
           <a:xfrm>
-            <a:off x="6881524" y="3613469"/>
-            <a:ext cx="611528" cy="494256"/>
+            <a:off x="6261697" y="4209134"/>
+            <a:ext cx="458399" cy="370492"/>
           </a:xfrm>
           <a:prstGeom prst="rect">
             <a:avLst/>
@@ -4913,10 +4980,10 @@
       </p:pic>
       <p:pic>
         <p:nvPicPr>
-          <p:cNvPr id="34" name="Picture 2" descr="Seldon · GitHub">
-            <a:extLst>
-              <a:ext uri="{FF2B5EF4-FFF2-40B4-BE49-F238E27FC236}">
-                <a16:creationId xmlns:a16="http://schemas.microsoft.com/office/drawing/2014/main" id="{B83EC9B4-3C72-5A44-8F69-66DD58B9D3EC}"/>
+          <p:cNvPr id="50" name="Picture 2" descr="Seldon · GitHub">
+            <a:extLst>
+              <a:ext uri="{FF2B5EF4-FFF2-40B4-BE49-F238E27FC236}">
+                <a16:creationId xmlns:a16="http://schemas.microsoft.com/office/drawing/2014/main" id="{2DBAFBF3-8B27-B64F-8434-B41E33480A18}"/>
               </a:ext>
             </a:extLst>
           </p:cNvPr>
@@ -4940,8 +5007,8 @@
         </p:blipFill>
         <p:spPr bwMode="auto">
           <a:xfrm flipH="1">
-            <a:off x="7599706" y="3806542"/>
-            <a:ext cx="494255" cy="494255"/>
+            <a:off x="8255394" y="3635646"/>
+            <a:ext cx="370492" cy="370492"/>
           </a:xfrm>
           <a:prstGeom prst="rect">
             <a:avLst/>
@@ -4960,10 +5027,10 @@
       </p:pic>
       <p:pic>
         <p:nvPicPr>
-          <p:cNvPr id="35" name="Picture 34" descr="A picture containing icon&#10;&#10;Description automatically generated">
-            <a:extLst>
-              <a:ext uri="{FF2B5EF4-FFF2-40B4-BE49-F238E27FC236}">
-                <a16:creationId xmlns:a16="http://schemas.microsoft.com/office/drawing/2014/main" id="{DD09B5F6-2D05-144B-A336-7DD4AC5C278B}"/>
+          <p:cNvPr id="51" name="Picture 50" descr="A picture containing icon&#10;&#10;Description automatically generated">
+            <a:extLst>
+              <a:ext uri="{FF2B5EF4-FFF2-40B4-BE49-F238E27FC236}">
+                <a16:creationId xmlns:a16="http://schemas.microsoft.com/office/drawing/2014/main" id="{D4361B31-6C12-754F-A56E-4EE7668AA9C9}"/>
               </a:ext>
             </a:extLst>
           </p:cNvPr>
@@ -4986,8 +5053,8 @@
         </p:blipFill>
         <p:spPr>
           <a:xfrm>
-            <a:off x="8294067" y="3572047"/>
-            <a:ext cx="552673" cy="527803"/>
+            <a:off x="8787103" y="4164162"/>
+            <a:ext cx="414281" cy="395639"/>
           </a:xfrm>
           <a:prstGeom prst="rect">
             <a:avLst/>
@@ -4996,10 +5063,10 @@
       </p:pic>
       <p:pic>
         <p:nvPicPr>
-          <p:cNvPr id="36" name="Picture 35" descr="Logo, icon&#10;&#10;Description automatically generated">
-            <a:extLst>
-              <a:ext uri="{FF2B5EF4-FFF2-40B4-BE49-F238E27FC236}">
-                <a16:creationId xmlns:a16="http://schemas.microsoft.com/office/drawing/2014/main" id="{0C8F6387-D0FE-2349-A54C-58FC9CBA38C7}"/>
+          <p:cNvPr id="52" name="Picture 51" descr="Logo, icon&#10;&#10;Description automatically generated">
+            <a:extLst>
+              <a:ext uri="{FF2B5EF4-FFF2-40B4-BE49-F238E27FC236}">
+                <a16:creationId xmlns:a16="http://schemas.microsoft.com/office/drawing/2014/main" id="{59F85DE6-DD4B-7A40-89DD-AF1EBB426103}"/>
               </a:ext>
             </a:extLst>
           </p:cNvPr>
@@ -5022,8 +5089,8 @@
         </p:blipFill>
         <p:spPr>
           <a:xfrm>
-            <a:off x="6002221" y="4392129"/>
-            <a:ext cx="469190" cy="485240"/>
+            <a:off x="5698068" y="4266050"/>
+            <a:ext cx="351703" cy="363734"/>
           </a:xfrm>
           <a:prstGeom prst="rect">
             <a:avLst/>
@@ -5032,10 +5099,10 @@
       </p:pic>
       <p:pic>
         <p:nvPicPr>
-          <p:cNvPr id="37" name="Picture 36" descr="Icon&#10;&#10;Description automatically generated">
-            <a:extLst>
-              <a:ext uri="{FF2B5EF4-FFF2-40B4-BE49-F238E27FC236}">
-                <a16:creationId xmlns:a16="http://schemas.microsoft.com/office/drawing/2014/main" id="{117C7499-9318-9449-81D3-B38B3DB9B588}"/>
+          <p:cNvPr id="53" name="Picture 52" descr="Icon&#10;&#10;Description automatically generated">
+            <a:extLst>
+              <a:ext uri="{FF2B5EF4-FFF2-40B4-BE49-F238E27FC236}">
+                <a16:creationId xmlns:a16="http://schemas.microsoft.com/office/drawing/2014/main" id="{A73C011B-41FE-664C-AB74-8CC00AF7D57C}"/>
               </a:ext>
             </a:extLst>
           </p:cNvPr>
@@ -5058,8 +5125,8 @@
         </p:blipFill>
         <p:spPr>
           <a:xfrm>
-            <a:off x="7294349" y="4429658"/>
-            <a:ext cx="576312" cy="485240"/>
+            <a:off x="4746086" y="3638688"/>
+            <a:ext cx="432001" cy="363734"/>
           </a:xfrm>
           <a:prstGeom prst="rect">
             <a:avLst/>
@@ -5068,10 +5135,10 @@
       </p:pic>
       <p:pic>
         <p:nvPicPr>
-          <p:cNvPr id="38" name="Picture 37" descr="Icon&#10;&#10;Description automatically generated">
-            <a:extLst>
-              <a:ext uri="{FF2B5EF4-FFF2-40B4-BE49-F238E27FC236}">
-                <a16:creationId xmlns:a16="http://schemas.microsoft.com/office/drawing/2014/main" id="{76095F62-9E7B-D34D-97B9-CC09A1EAB6D8}"/>
+          <p:cNvPr id="61" name="Picture 60" descr="Icon&#10;&#10;Description automatically generated">
+            <a:extLst>
+              <a:ext uri="{FF2B5EF4-FFF2-40B4-BE49-F238E27FC236}">
+                <a16:creationId xmlns:a16="http://schemas.microsoft.com/office/drawing/2014/main" id="{9B15B0F3-8B0E-C449-9A45-A621AB30DEBB}"/>
               </a:ext>
             </a:extLst>
           </p:cNvPr>
@@ -5094,8 +5161,8 @@
         </p:blipFill>
         <p:spPr>
           <a:xfrm>
-            <a:off x="9068269" y="3622486"/>
-            <a:ext cx="465279" cy="485239"/>
+            <a:off x="8233080" y="4186491"/>
+            <a:ext cx="348771" cy="363733"/>
           </a:xfrm>
           <a:prstGeom prst="rect">
             <a:avLst/>
@@ -5104,10 +5171,10 @@
       </p:pic>
       <p:pic>
         <p:nvPicPr>
-          <p:cNvPr id="39" name="Picture 38" descr="Shape&#10;&#10;Description automatically generated">
-            <a:extLst>
-              <a:ext uri="{FF2B5EF4-FFF2-40B4-BE49-F238E27FC236}">
-                <a16:creationId xmlns:a16="http://schemas.microsoft.com/office/drawing/2014/main" id="{FBDBDB67-E0CA-9047-9369-1E2DC2890287}"/>
+          <p:cNvPr id="62" name="Picture 61" descr="Shape&#10;&#10;Description automatically generated">
+            <a:extLst>
+              <a:ext uri="{FF2B5EF4-FFF2-40B4-BE49-F238E27FC236}">
+                <a16:creationId xmlns:a16="http://schemas.microsoft.com/office/drawing/2014/main" id="{9357B8D7-BF10-E441-9448-631B776C286F}"/>
               </a:ext>
             </a:extLst>
           </p:cNvPr>
@@ -5130,8 +5197,8 @@
         </p:blipFill>
         <p:spPr>
           <a:xfrm>
-            <a:off x="8655171" y="4249854"/>
-            <a:ext cx="467334" cy="485240"/>
+            <a:off x="9418415" y="4113038"/>
+            <a:ext cx="350312" cy="363734"/>
           </a:xfrm>
           <a:prstGeom prst="rect">
             <a:avLst/>
@@ -5140,10 +5207,10 @@
       </p:pic>
       <p:pic>
         <p:nvPicPr>
-          <p:cNvPr id="40" name="Picture 39" descr="Icon&#10;&#10;Description automatically generated">
-            <a:extLst>
-              <a:ext uri="{FF2B5EF4-FFF2-40B4-BE49-F238E27FC236}">
-                <a16:creationId xmlns:a16="http://schemas.microsoft.com/office/drawing/2014/main" id="{58BE6B85-B041-C94C-9A16-27153563724D}"/>
+          <p:cNvPr id="63" name="Picture 62" descr="Icon&#10;&#10;Description automatically generated">
+            <a:extLst>
+              <a:ext uri="{FF2B5EF4-FFF2-40B4-BE49-F238E27FC236}">
+                <a16:creationId xmlns:a16="http://schemas.microsoft.com/office/drawing/2014/main" id="{A82BE2EE-B831-1548-81BF-41D3ABF4BA3A}"/>
               </a:ext>
             </a:extLst>
           </p:cNvPr>
@@ -5166,8 +5233,8 @@
         </p:blipFill>
         <p:spPr>
           <a:xfrm>
-            <a:off x="6001993" y="3748122"/>
-            <a:ext cx="552675" cy="552675"/>
+            <a:off x="5884641" y="3708492"/>
+            <a:ext cx="414283" cy="414283"/>
           </a:xfrm>
           <a:prstGeom prst="rect">
             <a:avLst/>
@@ -5176,10 +5243,10 @@
       </p:pic>
       <p:pic>
         <p:nvPicPr>
-          <p:cNvPr id="41" name="Picture 40" descr="Icon&#10;&#10;Description automatically generated">
-            <a:extLst>
-              <a:ext uri="{FF2B5EF4-FFF2-40B4-BE49-F238E27FC236}">
-                <a16:creationId xmlns:a16="http://schemas.microsoft.com/office/drawing/2014/main" id="{4BE906FC-F761-7D42-A413-5B9C99D4AA9D}"/>
+          <p:cNvPr id="65" name="Picture 64" descr="Icon&#10;&#10;Description automatically generated">
+            <a:extLst>
+              <a:ext uri="{FF2B5EF4-FFF2-40B4-BE49-F238E27FC236}">
+                <a16:creationId xmlns:a16="http://schemas.microsoft.com/office/drawing/2014/main" id="{9CC186A5-C19E-C94C-B1CB-021EE7C62866}"/>
               </a:ext>
             </a:extLst>
           </p:cNvPr>
@@ -5202,8 +5269,8 @@
         </p:blipFill>
         <p:spPr>
           <a:xfrm>
-            <a:off x="9884910" y="4447592"/>
-            <a:ext cx="426623" cy="491178"/>
+            <a:off x="5429486" y="3665895"/>
+            <a:ext cx="319795" cy="368185"/>
           </a:xfrm>
           <a:prstGeom prst="rect">
             <a:avLst/>
@@ -5212,10 +5279,10 @@
       </p:pic>
       <p:pic>
         <p:nvPicPr>
-          <p:cNvPr id="42" name="Picture 41" descr="Icon&#10;&#10;Description automatically generated">
-            <a:extLst>
-              <a:ext uri="{FF2B5EF4-FFF2-40B4-BE49-F238E27FC236}">
-                <a16:creationId xmlns:a16="http://schemas.microsoft.com/office/drawing/2014/main" id="{E6F53F2C-F939-A24E-A40D-482A87A2C6DD}"/>
+          <p:cNvPr id="69" name="Picture 68" descr="Icon&#10;&#10;Description automatically generated">
+            <a:extLst>
+              <a:ext uri="{FF2B5EF4-FFF2-40B4-BE49-F238E27FC236}">
+                <a16:creationId xmlns:a16="http://schemas.microsoft.com/office/drawing/2014/main" id="{09B185C1-B8F3-494B-8C88-DD5A9CB11587}"/>
               </a:ext>
             </a:extLst>
           </p:cNvPr>
@@ -5238,8 +5305,8 @@
         </p:blipFill>
         <p:spPr>
           <a:xfrm>
-            <a:off x="9267720" y="4240838"/>
-            <a:ext cx="494256" cy="494256"/>
+            <a:off x="8934253" y="3620631"/>
+            <a:ext cx="370492" cy="370492"/>
           </a:xfrm>
           <a:prstGeom prst="rect">
             <a:avLst/>
@@ -5248,10 +5315,10 @@
       </p:pic>
       <p:pic>
         <p:nvPicPr>
-          <p:cNvPr id="43" name="Picture 42" descr="Shape, icon&#10;&#10;Description automatically generated">
-            <a:extLst>
-              <a:ext uri="{FF2B5EF4-FFF2-40B4-BE49-F238E27FC236}">
-                <a16:creationId xmlns:a16="http://schemas.microsoft.com/office/drawing/2014/main" id="{F434F5C4-EA86-EF40-B054-7B604CA76974}"/>
+          <p:cNvPr id="75" name="Picture 74" descr="Shape, icon&#10;&#10;Description automatically generated">
+            <a:extLst>
+              <a:ext uri="{FF2B5EF4-FFF2-40B4-BE49-F238E27FC236}">
+                <a16:creationId xmlns:a16="http://schemas.microsoft.com/office/drawing/2014/main" id="{750D57E5-CFCC-D845-9302-FAFBC2046000}"/>
               </a:ext>
             </a:extLst>
           </p:cNvPr>
@@ -5274,12 +5341,59 @@
         </p:blipFill>
         <p:spPr>
           <a:xfrm>
-            <a:off x="9790635" y="3678943"/>
-            <a:ext cx="333302" cy="494255"/>
+            <a:off x="9975926" y="4006138"/>
+            <a:ext cx="249842" cy="370492"/>
           </a:xfrm>
           <a:prstGeom prst="rect">
             <a:avLst/>
           </a:prstGeom>
+        </p:spPr>
+      </p:pic>
+      <p:pic>
+        <p:nvPicPr>
+          <p:cNvPr id="76" name="Picture 4" descr="Litmus Chaos · GitHub">
+            <a:extLst>
+              <a:ext uri="{FF2B5EF4-FFF2-40B4-BE49-F238E27FC236}">
+                <a16:creationId xmlns:a16="http://schemas.microsoft.com/office/drawing/2014/main" id="{65923218-1257-E143-A4F2-798E8F479729}"/>
+              </a:ext>
+            </a:extLst>
+          </p:cNvPr>
+          <p:cNvPicPr>
+            <a:picLocks noChangeAspect="1" noChangeArrowheads="1"/>
+          </p:cNvPicPr>
+          <p:nvPr/>
+        </p:nvPicPr>
+        <p:blipFill>
+          <a:blip r:embed="rId37">
+            <a:extLst>
+              <a:ext uri="{28A0092B-C50C-407E-A947-70E740481C1C}">
+                <a14:useLocalDpi xmlns:a14="http://schemas.microsoft.com/office/drawing/2010/main" val="0"/>
+              </a:ext>
+            </a:extLst>
+          </a:blip>
+          <a:srcRect/>
+          <a:stretch>
+            <a:fillRect/>
+          </a:stretch>
+        </p:blipFill>
+        <p:spPr bwMode="auto">
+          <a:xfrm>
+            <a:off x="9507562" y="3668778"/>
+            <a:ext cx="321206" cy="321206"/>
+          </a:xfrm>
+          <a:prstGeom prst="rect">
+            <a:avLst/>
+          </a:prstGeom>
+          <a:noFill/>
+          <a:extLst>
+            <a:ext uri="{909E8E84-426E-40DD-AFC4-6F175D3DCCD1}">
+              <a14:hiddenFill xmlns:a14="http://schemas.microsoft.com/office/drawing/2010/main">
+                <a:solidFill>
+                  <a:srgbClr val="FFFFFF"/>
+                </a:solidFill>
+              </a14:hiddenFill>
+            </a:ext>
+          </a:extLst>
         </p:spPr>
       </p:pic>
     </p:spTree>

</xml_diff>

<commit_message>
Deployed 71e97b0 to 0.7 with MkDocs 1.2.2 and mike 1.1.1
</commit_message>
<xml_diff>
--- a/0.7/images/src/illustration.pptx
+++ b/0.7/images/src/illustration.pptx
@@ -5,10 +5,11 @@
     <p:sldMasterId id="2147483648" r:id="rId1"/>
   </p:sldMasterIdLst>
   <p:notesMasterIdLst>
-    <p:notesMasterId r:id="rId3"/>
+    <p:notesMasterId r:id="rId4"/>
   </p:notesMasterIdLst>
   <p:sldIdLst>
     <p:sldId id="374" r:id="rId2"/>
+    <p:sldId id="375" r:id="rId3"/>
   </p:sldIdLst>
   <p:sldSz cx="12192000" cy="6858000"/>
   <p:notesSz cx="6858000" cy="9144000"/>
@@ -197,7 +198,7 @@
           <a:p>
             <a:fld id="{38B78CBE-37FA-D241-BB4C-CAC5D3B25F49}" type="datetimeFigureOut">
               <a:rPr lang="en-US" smtClean="0"/>
-              <a:t>9/24/21</a:t>
+              <a:t>9/26/21</a:t>
             </a:fld>
             <a:endParaRPr lang="en-US"/>
           </a:p>
@@ -548,6 +549,90 @@
 </p:notes>
 </file>
 
+<file path=ppt/notesSlides/notesSlide2.xml><?xml version="1.0" encoding="utf-8"?>
+<p:notes xmlns:a="http://schemas.openxmlformats.org/drawingml/2006/main" xmlns:r="http://schemas.openxmlformats.org/officeDocument/2006/relationships" xmlns:p="http://schemas.openxmlformats.org/presentationml/2006/main">
+  <p:cSld>
+    <p:spTree>
+      <p:nvGrpSpPr>
+        <p:cNvPr id="1" name=""/>
+        <p:cNvGrpSpPr/>
+        <p:nvPr/>
+      </p:nvGrpSpPr>
+      <p:grpSpPr>
+        <a:xfrm>
+          <a:off x="0" y="0"/>
+          <a:ext cx="0" cy="0"/>
+          <a:chOff x="0" y="0"/>
+          <a:chExt cx="0" cy="0"/>
+        </a:xfrm>
+      </p:grpSpPr>
+      <p:sp>
+        <p:nvSpPr>
+          <p:cNvPr id="2" name="Slide Image Placeholder 1"/>
+          <p:cNvSpPr>
+            <a:spLocks noGrp="1" noRot="1" noChangeAspect="1"/>
+          </p:cNvSpPr>
+          <p:nvPr>
+            <p:ph type="sldImg"/>
+          </p:nvPr>
+        </p:nvSpPr>
+        <p:spPr/>
+      </p:sp>
+      <p:sp>
+        <p:nvSpPr>
+          <p:cNvPr id="3" name="Notes Placeholder 2"/>
+          <p:cNvSpPr>
+            <a:spLocks noGrp="1"/>
+          </p:cNvSpPr>
+          <p:nvPr>
+            <p:ph type="body" idx="1"/>
+          </p:nvPr>
+        </p:nvSpPr>
+        <p:spPr/>
+        <p:txBody>
+          <a:bodyPr/>
+          <a:lstStyle/>
+          <a:p>
+            <a:endParaRPr lang="en-US" dirty="0"/>
+          </a:p>
+        </p:txBody>
+      </p:sp>
+      <p:sp>
+        <p:nvSpPr>
+          <p:cNvPr id="4" name="Slide Number Placeholder 3"/>
+          <p:cNvSpPr>
+            <a:spLocks noGrp="1"/>
+          </p:cNvSpPr>
+          <p:nvPr>
+            <p:ph type="sldNum" sz="quarter" idx="5"/>
+          </p:nvPr>
+        </p:nvSpPr>
+        <p:spPr/>
+        <p:txBody>
+          <a:bodyPr/>
+          <a:lstStyle/>
+          <a:p>
+            <a:fld id="{38344E6D-279C-6147-976F-4BE3F315D9D6}" type="slidenum">
+              <a:rPr lang="en-US" smtClean="0"/>
+              <a:t>2</a:t>
+            </a:fld>
+            <a:endParaRPr lang="en-US"/>
+          </a:p>
+        </p:txBody>
+      </p:sp>
+    </p:spTree>
+    <p:extLst>
+      <p:ext uri="{BB962C8B-B14F-4D97-AF65-F5344CB8AC3E}">
+        <p14:creationId xmlns:p14="http://schemas.microsoft.com/office/powerpoint/2010/main" val="490124040"/>
+      </p:ext>
+    </p:extLst>
+  </p:cSld>
+  <p:clrMapOvr>
+    <a:masterClrMapping/>
+  </p:clrMapOvr>
+</p:notes>
+</file>
+
 <file path=ppt/slideLayouts/slideLayout1.xml><?xml version="1.0" encoding="utf-8"?>
 <p:sldLayout xmlns:a="http://schemas.openxmlformats.org/drawingml/2006/main" xmlns:r="http://schemas.openxmlformats.org/officeDocument/2006/relationships" xmlns:p="http://schemas.openxmlformats.org/presentationml/2006/main" type="title" preserve="1">
   <p:cSld name="Title Slide">
@@ -695,7 +780,7 @@
           <a:p>
             <a:fld id="{708812C5-0212-FD42-A0D4-E2E8FF4E3AF5}" type="datetime1">
               <a:rPr lang="en-US" smtClean="0"/>
-              <a:t>9/24/21</a:t>
+              <a:t>9/26/21</a:t>
             </a:fld>
             <a:endParaRPr lang="en-US"/>
           </a:p>
@@ -896,7 +981,7 @@
           <a:p>
             <a:fld id="{D232AC6F-41C3-B34B-9BAA-03ED2F3BC0F6}" type="datetime1">
               <a:rPr lang="en-US" smtClean="0"/>
-              <a:t>9/24/21</a:t>
+              <a:t>9/26/21</a:t>
             </a:fld>
             <a:endParaRPr lang="en-US"/>
           </a:p>
@@ -1107,7 +1192,7 @@
           <a:p>
             <a:fld id="{BEE140C2-F440-9D49-95CB-5965D64CC4A2}" type="datetime1">
               <a:rPr lang="en-US" smtClean="0"/>
-              <a:t>9/24/21</a:t>
+              <a:t>9/26/21</a:t>
             </a:fld>
             <a:endParaRPr lang="en-US"/>
           </a:p>
@@ -1308,7 +1393,7 @@
           <a:p>
             <a:fld id="{CC99F980-FB29-FD47-8508-150F73F1E8B0}" type="datetime1">
               <a:rPr lang="en-US" smtClean="0"/>
-              <a:t>9/24/21</a:t>
+              <a:t>9/26/21</a:t>
             </a:fld>
             <a:endParaRPr lang="en-US"/>
           </a:p>
@@ -1586,7 +1671,7 @@
           <a:p>
             <a:fld id="{D4510983-EA22-9643-8AC0-B3C6499B643B}" type="datetime1">
               <a:rPr lang="en-US" smtClean="0"/>
-              <a:t>9/24/21</a:t>
+              <a:t>9/26/21</a:t>
             </a:fld>
             <a:endParaRPr lang="en-US"/>
           </a:p>
@@ -1854,7 +1939,7 @@
           <a:p>
             <a:fld id="{D5A39195-967D-5D4E-8C6A-C99866996458}" type="datetime1">
               <a:rPr lang="en-US" smtClean="0"/>
-              <a:t>9/24/21</a:t>
+              <a:t>9/26/21</a:t>
             </a:fld>
             <a:endParaRPr lang="en-US"/>
           </a:p>
@@ -2269,7 +2354,7 @@
           <a:p>
             <a:fld id="{5AD771E9-C79D-684D-A158-5EB6E92DE947}" type="datetime1">
               <a:rPr lang="en-US" smtClean="0"/>
-              <a:t>9/24/21</a:t>
+              <a:t>9/26/21</a:t>
             </a:fld>
             <a:endParaRPr lang="en-US"/>
           </a:p>
@@ -2413,7 +2498,7 @@
           <a:p>
             <a:fld id="{693CA161-7E4C-5C4B-B799-DB602A0B9806}" type="datetime1">
               <a:rPr lang="en-US" smtClean="0"/>
-              <a:t>9/24/21</a:t>
+              <a:t>9/26/21</a:t>
             </a:fld>
             <a:endParaRPr lang="en-US"/>
           </a:p>
@@ -2529,7 +2614,7 @@
           <a:p>
             <a:fld id="{6D55FDF3-8BB2-6349-A5FA-057F3D78953D}" type="datetime1">
               <a:rPr lang="en-US" smtClean="0"/>
-              <a:t>9/24/21</a:t>
+              <a:t>9/26/21</a:t>
             </a:fld>
             <a:endParaRPr lang="en-US"/>
           </a:p>
@@ -2843,7 +2928,7 @@
           <a:p>
             <a:fld id="{EEDFACC0-3228-BA4B-942E-CEF38B0101FD}" type="datetime1">
               <a:rPr lang="en-US" smtClean="0"/>
-              <a:t>9/24/21</a:t>
+              <a:t>9/26/21</a:t>
             </a:fld>
             <a:endParaRPr lang="en-US"/>
           </a:p>
@@ -3134,7 +3219,7 @@
           <a:p>
             <a:fld id="{07EEEDBE-E24C-D140-B419-6D8D592D0F1C}" type="datetime1">
               <a:rPr lang="en-US" smtClean="0"/>
-              <a:t>9/24/21</a:t>
+              <a:t>9/26/21</a:t>
             </a:fld>
             <a:endParaRPr lang="en-US"/>
           </a:p>
@@ -3378,7 +3463,7 @@
           <a:p>
             <a:fld id="{E05781A2-A5EF-C54C-A3EF-F62483D37EDC}" type="datetime1">
               <a:rPr lang="en-US" smtClean="0"/>
-              <a:t>9/24/21</a:t>
+              <a:t>9/26/21</a:t>
             </a:fld>
             <a:endParaRPr lang="en-US"/>
           </a:p>
@@ -3801,10 +3886,10 @@
       </p:grpSpPr>
       <p:sp>
         <p:nvSpPr>
-          <p:cNvPr id="54" name="Rounded Rectangle 53">
-            <a:extLst>
-              <a:ext uri="{FF2B5EF4-FFF2-40B4-BE49-F238E27FC236}">
-                <a16:creationId xmlns:a16="http://schemas.microsoft.com/office/drawing/2014/main" id="{3B9AEFA8-F71F-8A4E-BBBE-9DDA3C809592}"/>
+          <p:cNvPr id="9" name="Rounded Rectangle 8">
+            <a:extLst>
+              <a:ext uri="{FF2B5EF4-FFF2-40B4-BE49-F238E27FC236}">
+                <a16:creationId xmlns:a16="http://schemas.microsoft.com/office/drawing/2014/main" id="{319D71A4-FD5D-BD48-844B-435B16760232}"/>
               </a:ext>
             </a:extLst>
           </p:cNvPr>
@@ -3813,23 +3898,35 @@
         </p:nvSpPr>
         <p:spPr>
           <a:xfrm>
-            <a:off x="4581297" y="3522338"/>
-            <a:ext cx="5992110" cy="1960534"/>
+            <a:off x="2371061" y="1829777"/>
+            <a:ext cx="7315200" cy="2690649"/>
           </a:xfrm>
           <a:prstGeom prst="roundRect">
             <a:avLst/>
           </a:prstGeom>
-          <a:solidFill>
-            <a:schemeClr val="bg1">
-              <a:lumMod val="95000"/>
-            </a:schemeClr>
-          </a:solidFill>
-          <a:ln w="3175">
-            <a:solidFill>
-              <a:srgbClr val="002060"/>
-            </a:solidFill>
-            <a:prstDash val="dashDot"/>
-          </a:ln>
+          <a:gradFill>
+            <a:gsLst>
+              <a:gs pos="0">
+                <a:srgbClr val="C00000"/>
+              </a:gs>
+              <a:gs pos="100000">
+                <a:schemeClr val="accent1">
+                  <a:lumMod val="45000"/>
+                  <a:lumOff val="55000"/>
+                </a:schemeClr>
+              </a:gs>
+              <a:gs pos="100000">
+                <a:schemeClr val="accent1">
+                  <a:lumMod val="45000"/>
+                  <a:lumOff val="55000"/>
+                </a:schemeClr>
+              </a:gs>
+              <a:gs pos="100000">
+                <a:schemeClr val="tx2"/>
+              </a:gs>
+            </a:gsLst>
+            <a:lin ang="5400000" scaled="1"/>
+          </a:gradFill>
         </p:spPr>
         <p:style>
           <a:lnRef idx="2">
@@ -3848,906 +3945,31 @@
           </a:fontRef>
         </p:style>
         <p:txBody>
-          <a:bodyPr rtlCol="0" anchor="b"/>
-          <a:lstStyle/>
-          <a:p>
-            <a:pPr algn="ctr">
-              <a:spcBef>
-                <a:spcPts val="600"/>
-              </a:spcBef>
-            </a:pPr>
-            <a:r>
-              <a:rPr lang="en-US" sz="2000" dirty="0">
-                <a:solidFill>
-                  <a:schemeClr val="tx1"/>
-                </a:solidFill>
-              </a:rPr>
-              <a:t>Use in </a:t>
-            </a:r>
-            <a:r>
-              <a:rPr lang="en-US" sz="2000" b="1" dirty="0">
-                <a:solidFill>
-                  <a:srgbClr val="7A004A"/>
-                </a:solidFill>
-              </a:rPr>
-              <a:t>any K8s environment. </a:t>
-            </a:r>
-            <a:r>
-              <a:rPr lang="en-US" sz="2000" dirty="0">
-                <a:solidFill>
-                  <a:schemeClr val="tx1"/>
-                </a:solidFill>
-              </a:rPr>
-              <a:t>Use within </a:t>
-            </a:r>
-            <a:r>
-              <a:rPr lang="en-US" sz="2000" b="1" dirty="0">
-                <a:solidFill>
-                  <a:srgbClr val="7A004A"/>
-                </a:solidFill>
-              </a:rPr>
-              <a:t>any CI/CD/GitOps process. </a:t>
-            </a:r>
-            <a:endParaRPr lang="en-US" sz="2000" b="1" dirty="0">
-              <a:solidFill>
-                <a:schemeClr val="tx1"/>
-              </a:solidFill>
-            </a:endParaRPr>
-          </a:p>
-        </p:txBody>
-      </p:sp>
-      <p:sp>
-        <p:nvSpPr>
-          <p:cNvPr id="55" name="Rounded Rectangle 54">
-            <a:extLst>
-              <a:ext uri="{FF2B5EF4-FFF2-40B4-BE49-F238E27FC236}">
-                <a16:creationId xmlns:a16="http://schemas.microsoft.com/office/drawing/2014/main" id="{72E85CC1-DA98-DB42-9B50-F9C1447BA10C}"/>
-              </a:ext>
-            </a:extLst>
-          </p:cNvPr>
-          <p:cNvSpPr/>
+          <a:bodyPr rtlCol="0" anchor="ctr"/>
+          <a:lstStyle/>
+          <a:p>
+            <a:pPr algn="ctr"/>
+            <a:endParaRPr lang="en-US"/>
+          </a:p>
+        </p:txBody>
+      </p:sp>
+      <p:sp>
+        <p:nvSpPr>
+          <p:cNvPr id="45" name="Oval 44">
+            <a:extLst>
+              <a:ext uri="{FF2B5EF4-FFF2-40B4-BE49-F238E27FC236}">
+                <a16:creationId xmlns:a16="http://schemas.microsoft.com/office/drawing/2014/main" id="{7EA7BD02-DB63-9548-B6A6-786AF358FC92}"/>
+              </a:ext>
+            </a:extLst>
+          </p:cNvPr>
+          <p:cNvSpPr>
+            <a:spLocks noChangeAspect="1"/>
+          </p:cNvSpPr>
           <p:nvPr/>
         </p:nvSpPr>
         <p:spPr>
           <a:xfrm>
-            <a:off x="3351470" y="1590876"/>
-            <a:ext cx="3240666" cy="1470072"/>
-          </a:xfrm>
-          <a:prstGeom prst="roundRect">
-            <a:avLst/>
-          </a:prstGeom>
-          <a:solidFill>
-            <a:schemeClr val="bg1">
-              <a:lumMod val="95000"/>
-            </a:schemeClr>
-          </a:solidFill>
-          <a:ln w="3175">
-            <a:solidFill>
-              <a:schemeClr val="tx2"/>
-            </a:solidFill>
-            <a:prstDash val="dashDot"/>
-          </a:ln>
-        </p:spPr>
-        <p:style>
-          <a:lnRef idx="2">
-            <a:schemeClr val="accent1">
-              <a:shade val="50000"/>
-            </a:schemeClr>
-          </a:lnRef>
-          <a:fillRef idx="1">
-            <a:schemeClr val="accent1"/>
-          </a:fillRef>
-          <a:effectRef idx="0">
-            <a:schemeClr val="accent1"/>
-          </a:effectRef>
-          <a:fontRef idx="minor">
-            <a:schemeClr val="lt1"/>
-          </a:fontRef>
-        </p:style>
-        <p:txBody>
-          <a:bodyPr rtlCol="0" anchor="b"/>
-          <a:lstStyle/>
-          <a:p>
-            <a:pPr algn="ctr">
-              <a:spcBef>
-                <a:spcPts val="600"/>
-              </a:spcBef>
-            </a:pPr>
-            <a:r>
-              <a:rPr lang="en-US" sz="2000" dirty="0">
-                <a:solidFill>
-                  <a:schemeClr val="tx1"/>
-                </a:solidFill>
-              </a:rPr>
-              <a:t>Assess and safely rollout </a:t>
-            </a:r>
-            <a:r>
-              <a:rPr lang="en-US" sz="2000" b="1" dirty="0">
-                <a:solidFill>
-                  <a:srgbClr val="7A004A"/>
-                </a:solidFill>
-              </a:rPr>
-              <a:t>winning version of app</a:t>
-            </a:r>
-          </a:p>
-        </p:txBody>
-      </p:sp>
-      <p:pic>
-        <p:nvPicPr>
-          <p:cNvPr id="56" name="Graphic 55" descr="Web design with solid fill">
-            <a:extLst>
-              <a:ext uri="{FF2B5EF4-FFF2-40B4-BE49-F238E27FC236}">
-                <a16:creationId xmlns:a16="http://schemas.microsoft.com/office/drawing/2014/main" id="{933FE7C0-EFE4-E748-80EB-5B8F9CE692D3}"/>
-              </a:ext>
-            </a:extLst>
-          </p:cNvPr>
-          <p:cNvPicPr>
-            <a:picLocks noChangeAspect="1"/>
-          </p:cNvPicPr>
-          <p:nvPr/>
-        </p:nvPicPr>
-        <p:blipFill>
-          <a:blip r:embed="rId3">
-            <a:extLst>
-              <a:ext uri="{96DAC541-7B7A-43D3-8B79-37D633B846F1}">
-                <asvg:svgBlip xmlns:asvg="http://schemas.microsoft.com/office/drawing/2016/SVG/main" r:embed="rId4"/>
-              </a:ext>
-            </a:extLst>
-          </a:blip>
-          <a:stretch>
-            <a:fillRect/>
-          </a:stretch>
-        </p:blipFill>
-        <p:spPr>
-          <a:xfrm flipH="1">
-            <a:off x="3878416" y="1706187"/>
-            <a:ext cx="623353" cy="623353"/>
-          </a:xfrm>
-          <a:prstGeom prst="rect">
-            <a:avLst/>
-          </a:prstGeom>
-        </p:spPr>
-      </p:pic>
-      <p:pic>
-        <p:nvPicPr>
-          <p:cNvPr id="57" name="Graphic 56" descr="Web design with solid fill">
-            <a:extLst>
-              <a:ext uri="{FF2B5EF4-FFF2-40B4-BE49-F238E27FC236}">
-                <a16:creationId xmlns:a16="http://schemas.microsoft.com/office/drawing/2014/main" id="{219D90D1-487F-F44F-ACA7-FA7099F46721}"/>
-              </a:ext>
-            </a:extLst>
-          </p:cNvPr>
-          <p:cNvPicPr>
-            <a:picLocks noChangeAspect="1"/>
-          </p:cNvPicPr>
-          <p:nvPr/>
-        </p:nvPicPr>
-        <p:blipFill>
-          <a:blip r:embed="rId5">
-            <a:extLst>
-              <a:ext uri="{96DAC541-7B7A-43D3-8B79-37D633B846F1}">
-                <asvg:svgBlip xmlns:asvg="http://schemas.microsoft.com/office/drawing/2016/SVG/main" r:embed="rId6"/>
-              </a:ext>
-            </a:extLst>
-          </a:blip>
-          <a:stretch>
-            <a:fillRect/>
-          </a:stretch>
-        </p:blipFill>
-        <p:spPr>
-          <a:xfrm flipH="1">
-            <a:off x="4440359" y="1706187"/>
-            <a:ext cx="623353" cy="623353"/>
-          </a:xfrm>
-          <a:prstGeom prst="rect">
-            <a:avLst/>
-          </a:prstGeom>
-        </p:spPr>
-      </p:pic>
-      <p:pic>
-        <p:nvPicPr>
-          <p:cNvPr id="58" name="Graphic 57" descr="Web design with solid fill">
-            <a:extLst>
-              <a:ext uri="{FF2B5EF4-FFF2-40B4-BE49-F238E27FC236}">
-                <a16:creationId xmlns:a16="http://schemas.microsoft.com/office/drawing/2014/main" id="{EE0C47ED-9847-B447-B385-88A98D59CD95}"/>
-              </a:ext>
-            </a:extLst>
-          </p:cNvPr>
-          <p:cNvPicPr>
-            <a:picLocks noChangeAspect="1"/>
-          </p:cNvPicPr>
-          <p:nvPr/>
-        </p:nvPicPr>
-        <p:blipFill>
-          <a:blip r:embed="rId7">
-            <a:extLst>
-              <a:ext uri="{96DAC541-7B7A-43D3-8B79-37D633B846F1}">
-                <asvg:svgBlip xmlns:asvg="http://schemas.microsoft.com/office/drawing/2016/SVG/main" r:embed="rId8"/>
-              </a:ext>
-            </a:extLst>
-          </a:blip>
-          <a:stretch>
-            <a:fillRect/>
-          </a:stretch>
-        </p:blipFill>
-        <p:spPr>
-          <a:xfrm flipH="1">
-            <a:off x="4991791" y="1706187"/>
-            <a:ext cx="623353" cy="623353"/>
-          </a:xfrm>
-          <a:prstGeom prst="rect">
-            <a:avLst/>
-          </a:prstGeom>
-        </p:spPr>
-      </p:pic>
-      <p:pic>
-        <p:nvPicPr>
-          <p:cNvPr id="59" name="Picture 58" descr="A picture containing food&#10;&#10;Description automatically generated">
-            <a:extLst>
-              <a:ext uri="{FF2B5EF4-FFF2-40B4-BE49-F238E27FC236}">
-                <a16:creationId xmlns:a16="http://schemas.microsoft.com/office/drawing/2014/main" id="{8BA5EFE8-E3DF-4347-B933-DDF12CCB5740}"/>
-              </a:ext>
-            </a:extLst>
-          </p:cNvPr>
-          <p:cNvPicPr>
-            <a:picLocks noChangeAspect="1"/>
-          </p:cNvPicPr>
-          <p:nvPr/>
-        </p:nvPicPr>
-        <p:blipFill>
-          <a:blip r:embed="rId9">
-            <a:extLst>
-              <a:ext uri="{837473B0-CC2E-450A-ABE3-18F120FF3D39}">
-                <a1611:picAttrSrcUrl xmlns:a1611="http://schemas.microsoft.com/office/drawing/2016/11/main" r:id="rId10"/>
-              </a:ext>
-            </a:extLst>
-          </a:blip>
-          <a:stretch>
-            <a:fillRect/>
-          </a:stretch>
-        </p:blipFill>
-        <p:spPr>
-          <a:xfrm>
-            <a:off x="3351213" y="4082036"/>
-            <a:ext cx="837897" cy="837897"/>
-          </a:xfrm>
-          <a:prstGeom prst="rect">
-            <a:avLst/>
-          </a:prstGeom>
-          <a:ln w="25400">
-            <a:noFill/>
-          </a:ln>
-          <a:effectLst>
-            <a:outerShdw blurRad="50800" dist="50800" dir="5400000" algn="ctr" rotWithShape="0">
-              <a:srgbClr val="000000">
-                <a:alpha val="66000"/>
-              </a:srgbClr>
-            </a:outerShdw>
-          </a:effectLst>
-        </p:spPr>
-      </p:pic>
-      <p:cxnSp>
-        <p:nvCxnSpPr>
-          <p:cNvPr id="60" name="Straight Arrow Connector 59">
-            <a:extLst>
-              <a:ext uri="{FF2B5EF4-FFF2-40B4-BE49-F238E27FC236}">
-                <a16:creationId xmlns:a16="http://schemas.microsoft.com/office/drawing/2014/main" id="{1935F318-E22E-3A42-A6E3-5B2CABA50FFD}"/>
-              </a:ext>
-            </a:extLst>
-          </p:cNvPr>
-          <p:cNvCxnSpPr>
-            <a:cxnSpLocks/>
-            <a:stCxn id="59" idx="3"/>
-            <a:endCxn id="54" idx="1"/>
-          </p:cNvCxnSpPr>
-          <p:nvPr/>
-        </p:nvCxnSpPr>
-        <p:spPr>
-          <a:xfrm>
-            <a:off x="4189110" y="4500985"/>
-            <a:ext cx="392187" cy="1620"/>
-          </a:xfrm>
-          <a:prstGeom prst="straightConnector1">
-            <a:avLst/>
-          </a:prstGeom>
-          <a:ln w="25400">
-            <a:solidFill>
-              <a:schemeClr val="bg2">
-                <a:lumMod val="75000"/>
-              </a:schemeClr>
-            </a:solidFill>
-            <a:tailEnd type="stealth" w="lg" len="lg"/>
-          </a:ln>
-          <a:effectLst/>
-        </p:spPr>
-        <p:style>
-          <a:lnRef idx="1">
-            <a:schemeClr val="accent1"/>
-          </a:lnRef>
-          <a:fillRef idx="0">
-            <a:schemeClr val="accent1"/>
-          </a:fillRef>
-          <a:effectRef idx="0">
-            <a:schemeClr val="accent1"/>
-          </a:effectRef>
-          <a:fontRef idx="minor">
-            <a:schemeClr val="tx1"/>
-          </a:fontRef>
-        </p:style>
-      </p:cxnSp>
-      <p:pic>
-        <p:nvPicPr>
-          <p:cNvPr id="64" name="Graphic 63" descr="Thumbs up sign with solid fill">
-            <a:extLst>
-              <a:ext uri="{FF2B5EF4-FFF2-40B4-BE49-F238E27FC236}">
-                <a16:creationId xmlns:a16="http://schemas.microsoft.com/office/drawing/2014/main" id="{C0E98AFB-054E-8A4C-A1AB-25514E625570}"/>
-              </a:ext>
-            </a:extLst>
-          </p:cNvPr>
-          <p:cNvPicPr>
-            <a:picLocks noChangeAspect="1"/>
-          </p:cNvPicPr>
-          <p:nvPr/>
-        </p:nvPicPr>
-        <p:blipFill>
-          <a:blip r:embed="rId11">
-            <a:extLst>
-              <a:ext uri="{96DAC541-7B7A-43D3-8B79-37D633B846F1}">
-                <asvg:svgBlip xmlns:asvg="http://schemas.microsoft.com/office/drawing/2016/SVG/main" r:embed="rId12"/>
-              </a:ext>
-            </a:extLst>
-          </a:blip>
-          <a:stretch>
-            <a:fillRect/>
-          </a:stretch>
-        </p:blipFill>
-        <p:spPr>
-          <a:xfrm>
-            <a:off x="5589384" y="1733180"/>
-            <a:ext cx="506616" cy="506616"/>
-          </a:xfrm>
-          <a:prstGeom prst="rect">
-            <a:avLst/>
-          </a:prstGeom>
-        </p:spPr>
-      </p:pic>
-      <p:sp>
-        <p:nvSpPr>
-          <p:cNvPr id="66" name="Rounded Rectangle 65">
-            <a:extLst>
-              <a:ext uri="{FF2B5EF4-FFF2-40B4-BE49-F238E27FC236}">
-                <a16:creationId xmlns:a16="http://schemas.microsoft.com/office/drawing/2014/main" id="{935B8836-293C-384B-B78E-F7AC03540A17}"/>
-              </a:ext>
-            </a:extLst>
-          </p:cNvPr>
-          <p:cNvSpPr/>
-          <p:nvPr/>
-        </p:nvSpPr>
-        <p:spPr>
-          <a:xfrm>
-            <a:off x="6983370" y="1590877"/>
-            <a:ext cx="3590038" cy="1470073"/>
-          </a:xfrm>
-          <a:prstGeom prst="roundRect">
-            <a:avLst/>
-          </a:prstGeom>
-          <a:solidFill>
-            <a:schemeClr val="bg1">
-              <a:lumMod val="95000"/>
-            </a:schemeClr>
-          </a:solidFill>
-          <a:ln w="3175">
-            <a:solidFill>
-              <a:schemeClr val="tx2"/>
-            </a:solidFill>
-            <a:prstDash val="dashDot"/>
-          </a:ln>
-        </p:spPr>
-        <p:style>
-          <a:lnRef idx="2">
-            <a:schemeClr val="accent1">
-              <a:shade val="50000"/>
-            </a:schemeClr>
-          </a:lnRef>
-          <a:fillRef idx="1">
-            <a:schemeClr val="accent1"/>
-          </a:fillRef>
-          <a:effectRef idx="0">
-            <a:schemeClr val="accent1"/>
-          </a:effectRef>
-          <a:fontRef idx="minor">
-            <a:schemeClr val="lt1"/>
-          </a:fontRef>
-        </p:style>
-        <p:txBody>
-          <a:bodyPr rtlCol="0" anchor="b"/>
-          <a:lstStyle/>
-          <a:p>
-            <a:pPr algn="ctr">
-              <a:spcBef>
-                <a:spcPts val="600"/>
-              </a:spcBef>
-            </a:pPr>
-            <a:r>
-              <a:rPr lang="en-US" sz="2000" dirty="0">
-                <a:solidFill>
-                  <a:schemeClr val="tx1"/>
-                </a:solidFill>
-              </a:rPr>
-              <a:t>Use</a:t>
-            </a:r>
-            <a:r>
-              <a:rPr lang="en-US" sz="2000" b="1" dirty="0">
-                <a:solidFill>
-                  <a:srgbClr val="7A004A"/>
-                </a:solidFill>
-              </a:rPr>
-              <a:t> built-in </a:t>
-            </a:r>
-            <a:r>
-              <a:rPr lang="en-US" sz="2000">
-                <a:solidFill>
-                  <a:schemeClr val="tx1"/>
-                </a:solidFill>
-              </a:rPr>
-              <a:t>metrics or </a:t>
-            </a:r>
-            <a:r>
-              <a:rPr lang="en-US" sz="2000" b="1" dirty="0">
-                <a:solidFill>
-                  <a:srgbClr val="7A004A"/>
-                </a:solidFill>
-              </a:rPr>
-              <a:t>custom </a:t>
-            </a:r>
-            <a:r>
-              <a:rPr lang="en-US" sz="2000" dirty="0">
-                <a:solidFill>
-                  <a:schemeClr val="tx1"/>
-                </a:solidFill>
-              </a:rPr>
-              <a:t>metrics</a:t>
-            </a:r>
-            <a:r>
-              <a:rPr lang="en-US" sz="2000" b="1" dirty="0">
-                <a:solidFill>
-                  <a:srgbClr val="7A004A"/>
-                </a:solidFill>
-              </a:rPr>
-              <a:t> </a:t>
-            </a:r>
-            <a:r>
-              <a:rPr lang="en-US" sz="2000" dirty="0">
-                <a:solidFill>
-                  <a:schemeClr val="tx1"/>
-                </a:solidFill>
-              </a:rPr>
-              <a:t>from</a:t>
-            </a:r>
-            <a:r>
-              <a:rPr lang="en-US" sz="2000" b="1" dirty="0">
-                <a:solidFill>
-                  <a:srgbClr val="7A004A"/>
-                </a:solidFill>
-              </a:rPr>
-              <a:t> any DB</a:t>
-            </a:r>
-            <a:endParaRPr lang="en-US" sz="2000" dirty="0">
-              <a:solidFill>
-                <a:schemeClr val="tx1"/>
-              </a:solidFill>
-            </a:endParaRPr>
-          </a:p>
-        </p:txBody>
-      </p:sp>
-      <p:cxnSp>
-        <p:nvCxnSpPr>
-          <p:cNvPr id="67" name="Straight Arrow Connector 66">
-            <a:extLst>
-              <a:ext uri="{FF2B5EF4-FFF2-40B4-BE49-F238E27FC236}">
-                <a16:creationId xmlns:a16="http://schemas.microsoft.com/office/drawing/2014/main" id="{4A8D0EB1-2E0D-A44B-801E-F70098B7B1BA}"/>
-              </a:ext>
-            </a:extLst>
-          </p:cNvPr>
-          <p:cNvCxnSpPr>
-            <a:cxnSpLocks/>
-            <a:stCxn id="55" idx="3"/>
-            <a:endCxn id="66" idx="1"/>
-          </p:cNvCxnSpPr>
-          <p:nvPr/>
-        </p:nvCxnSpPr>
-        <p:spPr>
-          <a:xfrm>
-            <a:off x="6592136" y="2325912"/>
-            <a:ext cx="391234" cy="2"/>
-          </a:xfrm>
-          <a:prstGeom prst="straightConnector1">
-            <a:avLst/>
-          </a:prstGeom>
-          <a:ln w="25400">
-            <a:solidFill>
-              <a:schemeClr val="bg2">
-                <a:lumMod val="75000"/>
-              </a:schemeClr>
-            </a:solidFill>
-            <a:prstDash val="sysDot"/>
-            <a:tailEnd type="stealth" w="lg" len="lg"/>
-          </a:ln>
-          <a:effectLst/>
-        </p:spPr>
-        <p:style>
-          <a:lnRef idx="1">
-            <a:schemeClr val="accent1"/>
-          </a:lnRef>
-          <a:fillRef idx="0">
-            <a:schemeClr val="accent1"/>
-          </a:fillRef>
-          <a:effectRef idx="0">
-            <a:schemeClr val="accent1"/>
-          </a:effectRef>
-          <a:fontRef idx="minor">
-            <a:schemeClr val="tx1"/>
-          </a:fontRef>
-        </p:style>
-      </p:cxnSp>
-      <p:cxnSp>
-        <p:nvCxnSpPr>
-          <p:cNvPr id="68" name="Elbow Connector 67">
-            <a:extLst>
-              <a:ext uri="{FF2B5EF4-FFF2-40B4-BE49-F238E27FC236}">
-                <a16:creationId xmlns:a16="http://schemas.microsoft.com/office/drawing/2014/main" id="{6DF5325F-B6E0-1A4C-A5C9-8E092EF290BF}"/>
-              </a:ext>
-            </a:extLst>
-          </p:cNvPr>
-          <p:cNvCxnSpPr>
-            <a:cxnSpLocks/>
-            <a:stCxn id="45" idx="0"/>
-            <a:endCxn id="55" idx="2"/>
-          </p:cNvCxnSpPr>
-          <p:nvPr/>
-        </p:nvCxnSpPr>
-        <p:spPr>
-          <a:xfrm rot="16200000" flipV="1">
-            <a:off x="6003496" y="2029256"/>
-            <a:ext cx="538975" cy="2602359"/>
-          </a:xfrm>
-          <a:prstGeom prst="bentConnector3">
-            <a:avLst>
-              <a:gd name="adj1" fmla="val 50000"/>
-            </a:avLst>
-          </a:prstGeom>
-          <a:ln w="25400">
-            <a:solidFill>
-              <a:schemeClr val="bg2">
-                <a:lumMod val="75000"/>
-              </a:schemeClr>
-            </a:solidFill>
-            <a:prstDash val="sysDot"/>
-            <a:tailEnd type="stealth" w="lg" len="lg"/>
-          </a:ln>
-          <a:effectLst/>
-        </p:spPr>
-        <p:style>
-          <a:lnRef idx="1">
-            <a:schemeClr val="accent1"/>
-          </a:lnRef>
-          <a:fillRef idx="0">
-            <a:schemeClr val="accent1"/>
-          </a:fillRef>
-          <a:effectRef idx="0">
-            <a:schemeClr val="accent1"/>
-          </a:effectRef>
-          <a:fontRef idx="minor">
-            <a:schemeClr val="tx1"/>
-          </a:fontRef>
-        </p:style>
-      </p:cxnSp>
-      <p:cxnSp>
-        <p:nvCxnSpPr>
-          <p:cNvPr id="70" name="Elbow Connector 69">
-            <a:extLst>
-              <a:ext uri="{FF2B5EF4-FFF2-40B4-BE49-F238E27FC236}">
-                <a16:creationId xmlns:a16="http://schemas.microsoft.com/office/drawing/2014/main" id="{7FE42E7F-240E-DB42-A92E-75F439AB14A9}"/>
-              </a:ext>
-            </a:extLst>
-          </p:cNvPr>
-          <p:cNvCxnSpPr>
-            <a:cxnSpLocks/>
-            <a:stCxn id="66" idx="2"/>
-            <a:endCxn id="45" idx="0"/>
-          </p:cNvCxnSpPr>
-          <p:nvPr/>
-        </p:nvCxnSpPr>
-        <p:spPr>
-          <a:xfrm rot="5400000">
-            <a:off x="7906790" y="2728323"/>
-            <a:ext cx="538973" cy="1204227"/>
-          </a:xfrm>
-          <a:prstGeom prst="bentConnector3">
-            <a:avLst>
-              <a:gd name="adj1" fmla="val 50000"/>
-            </a:avLst>
-          </a:prstGeom>
-          <a:ln w="25400">
-            <a:solidFill>
-              <a:schemeClr val="bg2">
-                <a:lumMod val="75000"/>
-              </a:schemeClr>
-            </a:solidFill>
-            <a:prstDash val="sysDot"/>
-            <a:tailEnd type="stealth" w="lg" len="lg"/>
-          </a:ln>
-          <a:effectLst/>
-        </p:spPr>
-        <p:style>
-          <a:lnRef idx="1">
-            <a:schemeClr val="accent1"/>
-          </a:lnRef>
-          <a:fillRef idx="0">
-            <a:schemeClr val="accent1"/>
-          </a:fillRef>
-          <a:effectRef idx="0">
-            <a:schemeClr val="accent1"/>
-          </a:effectRef>
-          <a:fontRef idx="minor">
-            <a:schemeClr val="tx1"/>
-          </a:fontRef>
-        </p:style>
-      </p:cxnSp>
-      <p:pic>
-        <p:nvPicPr>
-          <p:cNvPr id="71" name="Picture 70" descr="Logo, icon&#10;&#10;Description automatically generated">
-            <a:extLst>
-              <a:ext uri="{FF2B5EF4-FFF2-40B4-BE49-F238E27FC236}">
-                <a16:creationId xmlns:a16="http://schemas.microsoft.com/office/drawing/2014/main" id="{D6933246-7CF9-5D47-BE26-2C984D62F3E8}"/>
-              </a:ext>
-            </a:extLst>
-          </p:cNvPr>
-          <p:cNvPicPr>
-            <a:picLocks noChangeAspect="1"/>
-          </p:cNvPicPr>
-          <p:nvPr/>
-        </p:nvPicPr>
-        <p:blipFill>
-          <a:blip r:embed="rId13">
-            <a:extLst>
-              <a:ext uri="{837473B0-CC2E-450A-ABE3-18F120FF3D39}">
-                <a1611:picAttrSrcUrl xmlns:a1611="http://schemas.microsoft.com/office/drawing/2016/11/main" r:id="rId14"/>
-              </a:ext>
-            </a:extLst>
-          </a:blip>
-          <a:stretch>
-            <a:fillRect/>
-          </a:stretch>
-        </p:blipFill>
-        <p:spPr>
-          <a:xfrm>
-            <a:off x="8382435" y="1755828"/>
-            <a:ext cx="469190" cy="485240"/>
-          </a:xfrm>
-          <a:prstGeom prst="rect">
-            <a:avLst/>
-          </a:prstGeom>
-        </p:spPr>
-      </p:pic>
-      <p:pic>
-        <p:nvPicPr>
-          <p:cNvPr id="72" name="Picture 71" descr="Icon&#10;&#10;Description automatically generated">
-            <a:extLst>
-              <a:ext uri="{FF2B5EF4-FFF2-40B4-BE49-F238E27FC236}">
-                <a16:creationId xmlns:a16="http://schemas.microsoft.com/office/drawing/2014/main" id="{92AD9B42-8D43-424D-917D-A87E4F85C6AC}"/>
-              </a:ext>
-            </a:extLst>
-          </p:cNvPr>
-          <p:cNvPicPr>
-            <a:picLocks noChangeAspect="1"/>
-          </p:cNvPicPr>
-          <p:nvPr/>
-        </p:nvPicPr>
-        <p:blipFill>
-          <a:blip r:embed="rId15">
-            <a:extLst>
-              <a:ext uri="{837473B0-CC2E-450A-ABE3-18F120FF3D39}">
-                <a1611:picAttrSrcUrl xmlns:a1611="http://schemas.microsoft.com/office/drawing/2016/11/main" r:id="rId16"/>
-              </a:ext>
-            </a:extLst>
-          </a:blip>
-          <a:stretch>
-            <a:fillRect/>
-          </a:stretch>
-        </p:blipFill>
-        <p:spPr>
-          <a:xfrm>
-            <a:off x="8888838" y="1755828"/>
-            <a:ext cx="576312" cy="485240"/>
-          </a:xfrm>
-          <a:prstGeom prst="rect">
-            <a:avLst/>
-          </a:prstGeom>
-        </p:spPr>
-      </p:pic>
-      <p:pic>
-        <p:nvPicPr>
-          <p:cNvPr id="73" name="Picture 72" descr="Icon&#10;&#10;Description automatically generated">
-            <a:extLst>
-              <a:ext uri="{FF2B5EF4-FFF2-40B4-BE49-F238E27FC236}">
-                <a16:creationId xmlns:a16="http://schemas.microsoft.com/office/drawing/2014/main" id="{7E26FC70-58D1-1D44-A68E-06075863FBAA}"/>
-              </a:ext>
-            </a:extLst>
-          </p:cNvPr>
-          <p:cNvPicPr>
-            <a:picLocks noChangeAspect="1"/>
-          </p:cNvPicPr>
-          <p:nvPr/>
-        </p:nvPicPr>
-        <p:blipFill>
-          <a:blip r:embed="rId17">
-            <a:extLst>
-              <a:ext uri="{837473B0-CC2E-450A-ABE3-18F120FF3D39}">
-                <a1611:picAttrSrcUrl xmlns:a1611="http://schemas.microsoft.com/office/drawing/2016/11/main" r:id="rId18"/>
-              </a:ext>
-            </a:extLst>
-          </a:blip>
-          <a:stretch>
-            <a:fillRect/>
-          </a:stretch>
-        </p:blipFill>
-        <p:spPr>
-          <a:xfrm>
-            <a:off x="9512873" y="1755829"/>
-            <a:ext cx="465279" cy="485239"/>
-          </a:xfrm>
-          <a:prstGeom prst="rect">
-            <a:avLst/>
-          </a:prstGeom>
-        </p:spPr>
-      </p:pic>
-      <p:pic>
-        <p:nvPicPr>
-          <p:cNvPr id="74" name="Picture 73" descr="Shape&#10;&#10;Description automatically generated">
-            <a:extLst>
-              <a:ext uri="{FF2B5EF4-FFF2-40B4-BE49-F238E27FC236}">
-                <a16:creationId xmlns:a16="http://schemas.microsoft.com/office/drawing/2014/main" id="{0A3FF311-3331-1D4B-9992-268EBC6DB0AF}"/>
-              </a:ext>
-            </a:extLst>
-          </p:cNvPr>
-          <p:cNvPicPr>
-            <a:picLocks noChangeAspect="1"/>
-          </p:cNvPicPr>
-          <p:nvPr/>
-        </p:nvPicPr>
-        <p:blipFill>
-          <a:blip r:embed="rId19">
-            <a:extLst>
-              <a:ext uri="{837473B0-CC2E-450A-ABE3-18F120FF3D39}">
-                <a1611:picAttrSrcUrl xmlns:a1611="http://schemas.microsoft.com/office/drawing/2016/11/main" r:id="rId20"/>
-              </a:ext>
-            </a:extLst>
-          </a:blip>
-          <a:stretch>
-            <a:fillRect/>
-          </a:stretch>
-        </p:blipFill>
-        <p:spPr>
-          <a:xfrm>
-            <a:off x="10004852" y="1755828"/>
-            <a:ext cx="467334" cy="485240"/>
-          </a:xfrm>
-          <a:prstGeom prst="rect">
-            <a:avLst/>
-          </a:prstGeom>
-        </p:spPr>
-      </p:pic>
-      <p:pic>
-        <p:nvPicPr>
-          <p:cNvPr id="27" name="Graphic 26">
-            <a:extLst>
-              <a:ext uri="{FF2B5EF4-FFF2-40B4-BE49-F238E27FC236}">
-                <a16:creationId xmlns:a16="http://schemas.microsoft.com/office/drawing/2014/main" id="{8E64CE0A-A303-B24D-84CD-764C68816431}"/>
-              </a:ext>
-            </a:extLst>
-          </p:cNvPr>
-          <p:cNvPicPr>
-            <a:picLocks noChangeAspect="1"/>
-          </p:cNvPicPr>
-          <p:nvPr/>
-        </p:nvPicPr>
-        <p:blipFill>
-          <a:blip r:embed="rId21">
-            <a:extLst>
-              <a:ext uri="{96DAC541-7B7A-43D3-8B79-37D633B846F1}">
-                <asvg:svgBlip xmlns:asvg="http://schemas.microsoft.com/office/drawing/2016/SVG/main" r:embed="rId22"/>
-              </a:ext>
-            </a:extLst>
-          </a:blip>
-          <a:stretch>
-            <a:fillRect/>
-          </a:stretch>
-        </p:blipFill>
-        <p:spPr>
-          <a:xfrm>
-            <a:off x="7092180" y="1671748"/>
-            <a:ext cx="485240" cy="485240"/>
-          </a:xfrm>
-          <a:prstGeom prst="rect">
-            <a:avLst/>
-          </a:prstGeom>
-          <a:effectLst>
-            <a:outerShdw blurRad="50800" dist="50800" dir="5400000" algn="ctr" rotWithShape="0">
-              <a:srgbClr val="000000">
-                <a:alpha val="93000"/>
-              </a:srgbClr>
-            </a:outerShdw>
-          </a:effectLst>
-        </p:spPr>
-      </p:pic>
-      <p:sp>
-        <p:nvSpPr>
-          <p:cNvPr id="44" name="Rounded Rectangle 43">
-            <a:extLst>
-              <a:ext uri="{FF2B5EF4-FFF2-40B4-BE49-F238E27FC236}">
-                <a16:creationId xmlns:a16="http://schemas.microsoft.com/office/drawing/2014/main" id="{CCF2FE35-FD73-F240-96B7-60934C6C3CDD}"/>
-              </a:ext>
-            </a:extLst>
-          </p:cNvPr>
-          <p:cNvSpPr/>
-          <p:nvPr/>
-        </p:nvSpPr>
-        <p:spPr>
-          <a:xfrm>
-            <a:off x="5123254" y="3176259"/>
-            <a:ext cx="4908331" cy="1960534"/>
-          </a:xfrm>
-          <a:prstGeom prst="roundRect">
-            <a:avLst/>
-          </a:prstGeom>
-          <a:noFill/>
-          <a:ln>
-            <a:noFill/>
-          </a:ln>
-        </p:spPr>
-        <p:style>
-          <a:lnRef idx="2">
-            <a:schemeClr val="accent1">
-              <a:shade val="50000"/>
-            </a:schemeClr>
-          </a:lnRef>
-          <a:fillRef idx="1">
-            <a:schemeClr val="accent1"/>
-          </a:fillRef>
-          <a:effectRef idx="0">
-            <a:schemeClr val="accent1"/>
-          </a:effectRef>
-          <a:fontRef idx="minor">
-            <a:schemeClr val="lt1"/>
-          </a:fontRef>
-        </p:style>
-        <p:txBody>
-          <a:bodyPr rtlCol="0" anchor="ctr"/>
-          <a:lstStyle/>
-          <a:p>
-            <a:pPr algn="ctr"/>
-            <a:endParaRPr lang="en-US" dirty="0"/>
-          </a:p>
-        </p:txBody>
-      </p:sp>
-      <p:sp>
-        <p:nvSpPr>
-          <p:cNvPr id="45" name="Oval 44">
-            <a:extLst>
-              <a:ext uri="{FF2B5EF4-FFF2-40B4-BE49-F238E27FC236}">
-                <a16:creationId xmlns:a16="http://schemas.microsoft.com/office/drawing/2014/main" id="{7EA7BD02-DB63-9548-B6A6-786AF358FC92}"/>
-              </a:ext>
-            </a:extLst>
-          </p:cNvPr>
-          <p:cNvSpPr>
-            <a:spLocks noChangeAspect="1"/>
-          </p:cNvSpPr>
-          <p:nvPr/>
-        </p:nvSpPr>
-        <p:spPr>
-          <a:xfrm>
-            <a:off x="7016378" y="3599923"/>
+            <a:off x="5528064" y="2719254"/>
             <a:ext cx="1115568" cy="1118950"/>
           </a:xfrm>
           <a:prstGeom prst="ellipse">
@@ -4809,10 +4031,10 @@
           <p:nvPr/>
         </p:nvPicPr>
         <p:blipFill>
-          <a:blip r:embed="rId21">
+          <a:blip r:embed="rId3">
             <a:extLst>
               <a:ext uri="{96DAC541-7B7A-43D3-8B79-37D633B846F1}">
-                <asvg:svgBlip xmlns:asvg="http://schemas.microsoft.com/office/drawing/2016/SVG/main" r:embed="rId22"/>
+                <asvg:svgBlip xmlns:asvg="http://schemas.microsoft.com/office/drawing/2016/SVG/main" r:embed="rId4"/>
               </a:ext>
             </a:extLst>
           </a:blip>
@@ -4822,7 +4044,7 @@
         </p:blipFill>
         <p:spPr>
           <a:xfrm>
-            <a:off x="7199575" y="3772808"/>
+            <a:off x="5711261" y="2892139"/>
             <a:ext cx="746070" cy="746070"/>
           </a:xfrm>
           <a:prstGeom prst="rect">
@@ -4837,200 +4059,814 @@
           </a:effectLst>
         </p:spPr>
       </p:pic>
-      <p:pic>
-        <p:nvPicPr>
-          <p:cNvPr id="47" name="Picture 2" descr="Kubeflow">
-            <a:extLst>
-              <a:ext uri="{FF2B5EF4-FFF2-40B4-BE49-F238E27FC236}">
-                <a16:creationId xmlns:a16="http://schemas.microsoft.com/office/drawing/2014/main" id="{389C2893-5019-984C-AF25-A80B1A987175}"/>
-              </a:ext>
-            </a:extLst>
-          </p:cNvPr>
-          <p:cNvPicPr>
-            <a:picLocks noChangeAspect="1" noChangeArrowheads="1"/>
-          </p:cNvPicPr>
+      <p:cxnSp>
+        <p:nvCxnSpPr>
+          <p:cNvPr id="11" name="Straight Arrow Connector 10">
+            <a:extLst>
+              <a:ext uri="{FF2B5EF4-FFF2-40B4-BE49-F238E27FC236}">
+                <a16:creationId xmlns:a16="http://schemas.microsoft.com/office/drawing/2014/main" id="{AE3F2490-BAFE-FA4F-BDCF-8A15FA2A350D}"/>
+              </a:ext>
+            </a:extLst>
+          </p:cNvPr>
+          <p:cNvCxnSpPr>
+            <a:cxnSpLocks/>
+            <a:stCxn id="45" idx="6"/>
+          </p:cNvCxnSpPr>
           <p:nvPr/>
-        </p:nvPicPr>
-        <p:blipFill>
-          <a:blip r:embed="rId23">
-            <a:extLst>
-              <a:ext uri="{28A0092B-C50C-407E-A947-70E740481C1C}">
-                <a14:useLocalDpi xmlns:a14="http://schemas.microsoft.com/office/drawing/2010/main" val="0"/>
-              </a:ext>
-            </a:extLst>
-          </a:blip>
-          <a:srcRect/>
-          <a:stretch>
-            <a:fillRect/>
-          </a:stretch>
-        </p:blipFill>
-        <p:spPr bwMode="auto">
+        </p:nvCxnSpPr>
+        <p:spPr>
+          <a:xfrm>
+            <a:off x="6643632" y="3278729"/>
+            <a:ext cx="2935170" cy="0"/>
+          </a:xfrm>
+          <a:prstGeom prst="straightConnector1">
+            <a:avLst/>
+          </a:prstGeom>
+          <a:ln w="31750">
+            <a:gradFill>
+              <a:gsLst>
+                <a:gs pos="0">
+                  <a:schemeClr val="bg1"/>
+                </a:gs>
+                <a:gs pos="100000">
+                  <a:srgbClr val="B70703"/>
+                </a:gs>
+              </a:gsLst>
+              <a:lin ang="0" scaled="0"/>
+            </a:gradFill>
+            <a:tailEnd type="none"/>
+          </a:ln>
+        </p:spPr>
+        <p:style>
+          <a:lnRef idx="1">
+            <a:schemeClr val="accent1"/>
+          </a:lnRef>
+          <a:fillRef idx="0">
+            <a:schemeClr val="accent1"/>
+          </a:fillRef>
+          <a:effectRef idx="0">
+            <a:schemeClr val="accent1"/>
+          </a:effectRef>
+          <a:fontRef idx="minor">
+            <a:schemeClr val="tx1"/>
+          </a:fontRef>
+        </p:style>
+      </p:cxnSp>
+      <p:cxnSp>
+        <p:nvCxnSpPr>
+          <p:cNvPr id="15" name="Elbow Connector 14">
+            <a:extLst>
+              <a:ext uri="{FF2B5EF4-FFF2-40B4-BE49-F238E27FC236}">
+                <a16:creationId xmlns:a16="http://schemas.microsoft.com/office/drawing/2014/main" id="{40DFEBA5-0FDE-8D44-A1A0-E608006418A1}"/>
+              </a:ext>
+            </a:extLst>
+          </p:cNvPr>
+          <p:cNvCxnSpPr>
+            <a:cxnSpLocks/>
+            <a:stCxn id="45" idx="7"/>
+          </p:cNvCxnSpPr>
+          <p:nvPr/>
+        </p:nvCxnSpPr>
+        <p:spPr>
+          <a:xfrm rot="5400000" flipH="1" flipV="1">
+            <a:off x="7865434" y="1169753"/>
+            <a:ext cx="328194" cy="3098541"/>
+          </a:xfrm>
+          <a:prstGeom prst="bentConnector2">
+            <a:avLst/>
+          </a:prstGeom>
+          <a:ln w="31750">
+            <a:gradFill>
+              <a:gsLst>
+                <a:gs pos="0">
+                  <a:schemeClr val="bg1"/>
+                </a:gs>
+                <a:gs pos="98000">
+                  <a:srgbClr val="B70703"/>
+                </a:gs>
+              </a:gsLst>
+              <a:lin ang="5400000" scaled="1"/>
+            </a:gradFill>
+          </a:ln>
+        </p:spPr>
+        <p:style>
+          <a:lnRef idx="1">
+            <a:schemeClr val="accent1"/>
+          </a:lnRef>
+          <a:fillRef idx="0">
+            <a:schemeClr val="accent1"/>
+          </a:fillRef>
+          <a:effectRef idx="0">
+            <a:schemeClr val="accent1"/>
+          </a:effectRef>
+          <a:fontRef idx="minor">
+            <a:schemeClr val="tx1"/>
+          </a:fontRef>
+        </p:style>
+      </p:cxnSp>
+      <p:cxnSp>
+        <p:nvCxnSpPr>
+          <p:cNvPr id="77" name="Elbow Connector 76">
+            <a:extLst>
+              <a:ext uri="{FF2B5EF4-FFF2-40B4-BE49-F238E27FC236}">
+                <a16:creationId xmlns:a16="http://schemas.microsoft.com/office/drawing/2014/main" id="{C96F1857-9DF0-F64B-B108-5E05445BEEE8}"/>
+              </a:ext>
+            </a:extLst>
+          </p:cNvPr>
+          <p:cNvCxnSpPr>
+            <a:cxnSpLocks/>
+            <a:stCxn id="45" idx="1"/>
+          </p:cNvCxnSpPr>
+          <p:nvPr/>
+        </p:nvCxnSpPr>
+        <p:spPr>
+          <a:xfrm rot="16200000" flipV="1">
+            <a:off x="4149913" y="1341597"/>
+            <a:ext cx="334246" cy="2748799"/>
+          </a:xfrm>
+          <a:prstGeom prst="bentConnector2">
+            <a:avLst/>
+          </a:prstGeom>
+          <a:ln w="31750">
+            <a:gradFill>
+              <a:gsLst>
+                <a:gs pos="0">
+                  <a:schemeClr val="bg1"/>
+                </a:gs>
+                <a:gs pos="99000">
+                  <a:srgbClr val="C00000"/>
+                </a:gs>
+              </a:gsLst>
+              <a:lin ang="5400000" scaled="1"/>
+            </a:gradFill>
+          </a:ln>
+        </p:spPr>
+        <p:style>
+          <a:lnRef idx="1">
+            <a:schemeClr val="accent1"/>
+          </a:lnRef>
+          <a:fillRef idx="0">
+            <a:schemeClr val="accent1"/>
+          </a:fillRef>
+          <a:effectRef idx="0">
+            <a:schemeClr val="accent1"/>
+          </a:effectRef>
+          <a:fontRef idx="minor">
+            <a:schemeClr val="tx1"/>
+          </a:fontRef>
+        </p:style>
+      </p:cxnSp>
+      <p:cxnSp>
+        <p:nvCxnSpPr>
+          <p:cNvPr id="78" name="Straight Arrow Connector 77">
+            <a:extLst>
+              <a:ext uri="{FF2B5EF4-FFF2-40B4-BE49-F238E27FC236}">
+                <a16:creationId xmlns:a16="http://schemas.microsoft.com/office/drawing/2014/main" id="{0442ED27-3243-AE4E-ADAC-0122C7D2199B}"/>
+              </a:ext>
+            </a:extLst>
+          </p:cNvPr>
+          <p:cNvCxnSpPr>
+            <a:cxnSpLocks/>
+          </p:cNvCxnSpPr>
+          <p:nvPr/>
+        </p:nvCxnSpPr>
+        <p:spPr>
           <a:xfrm flipH="1">
-            <a:off x="6439994" y="3642541"/>
-            <a:ext cx="379046" cy="373683"/>
+            <a:off x="2945219" y="3265174"/>
+            <a:ext cx="2582845" cy="7300"/>
+          </a:xfrm>
+          <a:prstGeom prst="straightConnector1">
+            <a:avLst/>
+          </a:prstGeom>
+          <a:ln w="31750">
+            <a:gradFill>
+              <a:gsLst>
+                <a:gs pos="0">
+                  <a:schemeClr val="bg1"/>
+                </a:gs>
+                <a:gs pos="100000">
+                  <a:srgbClr val="B70703"/>
+                </a:gs>
+              </a:gsLst>
+              <a:lin ang="0" scaled="0"/>
+            </a:gradFill>
+            <a:tailEnd type="none"/>
+          </a:ln>
+        </p:spPr>
+        <p:style>
+          <a:lnRef idx="1">
+            <a:schemeClr val="accent1"/>
+          </a:lnRef>
+          <a:fillRef idx="0">
+            <a:schemeClr val="accent1"/>
+          </a:fillRef>
+          <a:effectRef idx="0">
+            <a:schemeClr val="accent1"/>
+          </a:effectRef>
+          <a:fontRef idx="minor">
+            <a:schemeClr val="tx1"/>
+          </a:fontRef>
+        </p:style>
+      </p:cxnSp>
+      <p:cxnSp>
+        <p:nvCxnSpPr>
+          <p:cNvPr id="79" name="Elbow Connector 78">
+            <a:extLst>
+              <a:ext uri="{FF2B5EF4-FFF2-40B4-BE49-F238E27FC236}">
+                <a16:creationId xmlns:a16="http://schemas.microsoft.com/office/drawing/2014/main" id="{51299B17-C557-EA4C-8EE9-7C01A3ED72A7}"/>
+              </a:ext>
+            </a:extLst>
+          </p:cNvPr>
+          <p:cNvCxnSpPr>
+            <a:cxnSpLocks/>
+            <a:stCxn id="45" idx="3"/>
+          </p:cNvCxnSpPr>
+          <p:nvPr/>
+        </p:nvCxnSpPr>
+        <p:spPr>
+          <a:xfrm rot="5400000">
+            <a:off x="4148735" y="2468240"/>
+            <a:ext cx="336603" cy="2748799"/>
+          </a:xfrm>
+          <a:prstGeom prst="bentConnector2">
+            <a:avLst/>
+          </a:prstGeom>
+          <a:ln w="31750">
+            <a:gradFill>
+              <a:gsLst>
+                <a:gs pos="0">
+                  <a:schemeClr val="bg1"/>
+                </a:gs>
+                <a:gs pos="99000">
+                  <a:srgbClr val="B70703"/>
+                </a:gs>
+              </a:gsLst>
+              <a:lin ang="5400000" scaled="1"/>
+            </a:gradFill>
+          </a:ln>
+        </p:spPr>
+        <p:style>
+          <a:lnRef idx="1">
+            <a:schemeClr val="accent1"/>
+          </a:lnRef>
+          <a:fillRef idx="0">
+            <a:schemeClr val="accent1"/>
+          </a:fillRef>
+          <a:effectRef idx="0">
+            <a:schemeClr val="accent1"/>
+          </a:effectRef>
+          <a:fontRef idx="minor">
+            <a:schemeClr val="tx1"/>
+          </a:fontRef>
+        </p:style>
+      </p:cxnSp>
+      <p:cxnSp>
+        <p:nvCxnSpPr>
+          <p:cNvPr id="80" name="Elbow Connector 79">
+            <a:extLst>
+              <a:ext uri="{FF2B5EF4-FFF2-40B4-BE49-F238E27FC236}">
+                <a16:creationId xmlns:a16="http://schemas.microsoft.com/office/drawing/2014/main" id="{E6FB33E7-DF3D-0F4F-A80C-D16E25CB7737}"/>
+              </a:ext>
+            </a:extLst>
+          </p:cNvPr>
+          <p:cNvCxnSpPr>
+            <a:cxnSpLocks/>
+            <a:stCxn id="45" idx="5"/>
+          </p:cNvCxnSpPr>
+          <p:nvPr/>
+        </p:nvCxnSpPr>
+        <p:spPr>
+          <a:xfrm rot="16200000" flipH="1">
+            <a:off x="7862408" y="2292190"/>
+            <a:ext cx="334249" cy="3098543"/>
+          </a:xfrm>
+          <a:prstGeom prst="bentConnector2">
+            <a:avLst/>
+          </a:prstGeom>
+          <a:ln w="31750">
+            <a:gradFill>
+              <a:gsLst>
+                <a:gs pos="0">
+                  <a:schemeClr val="bg1"/>
+                </a:gs>
+                <a:gs pos="99000">
+                  <a:srgbClr val="B70703"/>
+                </a:gs>
+              </a:gsLst>
+              <a:lin ang="5400000" scaled="1"/>
+            </a:gradFill>
+          </a:ln>
+        </p:spPr>
+        <p:style>
+          <a:lnRef idx="1">
+            <a:schemeClr val="accent1"/>
+          </a:lnRef>
+          <a:fillRef idx="0">
+            <a:schemeClr val="accent1"/>
+          </a:fillRef>
+          <a:effectRef idx="0">
+            <a:schemeClr val="accent1"/>
+          </a:effectRef>
+          <a:fontRef idx="minor">
+            <a:schemeClr val="tx1"/>
+          </a:fontRef>
+        </p:style>
+      </p:cxnSp>
+      <p:sp>
+        <p:nvSpPr>
+          <p:cNvPr id="26" name="TextBox 25">
+            <a:extLst>
+              <a:ext uri="{FF2B5EF4-FFF2-40B4-BE49-F238E27FC236}">
+                <a16:creationId xmlns:a16="http://schemas.microsoft.com/office/drawing/2014/main" id="{00B0B6B7-226E-954C-98D8-33134757394E}"/>
+              </a:ext>
+            </a:extLst>
+          </p:cNvPr>
+          <p:cNvSpPr txBox="1"/>
+          <p:nvPr/>
+        </p:nvSpPr>
+        <p:spPr>
+          <a:xfrm>
+            <a:off x="2975388" y="2179542"/>
+            <a:ext cx="2455865" cy="369332"/>
           </a:xfrm>
           <a:prstGeom prst="rect">
             <a:avLst/>
           </a:prstGeom>
           <a:noFill/>
-          <a:extLst>
-            <a:ext uri="{909E8E84-426E-40DD-AFC4-6F175D3DCCD1}">
-              <a14:hiddenFill xmlns:a14="http://schemas.microsoft.com/office/drawing/2010/main">
-                <a:solidFill>
-                  <a:srgbClr val="FFFFFF"/>
-                </a:solidFill>
-              </a14:hiddenFill>
-            </a:ext>
-          </a:extLst>
+          <a:effectLst>
+            <a:outerShdw blurRad="50800" dist="38100" dir="2700000" algn="tl" rotWithShape="0">
+              <a:prstClr val="black">
+                <a:alpha val="40000"/>
+              </a:prstClr>
+            </a:outerShdw>
+          </a:effectLst>
         </p:spPr>
-      </p:pic>
-      <p:pic>
-        <p:nvPicPr>
-          <p:cNvPr id="48" name="Picture 8" descr="Istio">
-            <a:extLst>
-              <a:ext uri="{FF2B5EF4-FFF2-40B4-BE49-F238E27FC236}">
-                <a16:creationId xmlns:a16="http://schemas.microsoft.com/office/drawing/2014/main" id="{785E82C4-48FF-1446-A29D-E156749F2C55}"/>
-              </a:ext>
-            </a:extLst>
-          </p:cNvPr>
-          <p:cNvPicPr>
-            <a:picLocks noChangeAspect="1" noChangeArrowheads="1"/>
-          </p:cNvPicPr>
+        <p:txBody>
+          <a:bodyPr wrap="none" rtlCol="0">
+            <a:spAutoFit/>
+          </a:bodyPr>
+          <a:lstStyle/>
+          <a:p>
+            <a:r>
+              <a:rPr lang="en-US" dirty="0">
+                <a:gradFill>
+                  <a:gsLst>
+                    <a:gs pos="0">
+                      <a:schemeClr val="accent4">
+                        <a:lumMod val="20000"/>
+                        <a:lumOff val="80000"/>
+                      </a:schemeClr>
+                    </a:gs>
+                    <a:gs pos="99000">
+                      <a:schemeClr val="bg1"/>
+                    </a:gs>
+                  </a:gsLst>
+                  <a:lin ang="0" scaled="0"/>
+                </a:gradFill>
+                <a:effectLst>
+                  <a:outerShdw blurRad="50800" dist="38100" dir="2700000" algn="tl" rotWithShape="0">
+                    <a:schemeClr val="accent4">
+                      <a:lumMod val="75000"/>
+                      <a:alpha val="40000"/>
+                    </a:schemeClr>
+                  </a:outerShdw>
+                </a:effectLst>
+              </a:rPr>
+              <a:t>Declarative experiments</a:t>
+            </a:r>
+          </a:p>
+        </p:txBody>
+      </p:sp>
+      <p:sp>
+        <p:nvSpPr>
+          <p:cNvPr id="81" name="TextBox 80">
+            <a:extLst>
+              <a:ext uri="{FF2B5EF4-FFF2-40B4-BE49-F238E27FC236}">
+                <a16:creationId xmlns:a16="http://schemas.microsoft.com/office/drawing/2014/main" id="{2907230B-A103-7E4E-BD32-88729441759E}"/>
+              </a:ext>
+            </a:extLst>
+          </p:cNvPr>
+          <p:cNvSpPr txBox="1"/>
           <p:nvPr/>
-        </p:nvPicPr>
-        <p:blipFill>
-          <a:blip r:embed="rId24">
-            <a:extLst>
-              <a:ext uri="{28A0092B-C50C-407E-A947-70E740481C1C}">
-                <a14:useLocalDpi xmlns:a14="http://schemas.microsoft.com/office/drawing/2010/main" val="0"/>
-              </a:ext>
-            </a:extLst>
-          </a:blip>
-          <a:srcRect/>
-          <a:stretch>
-            <a:fillRect/>
-          </a:stretch>
-        </p:blipFill>
-        <p:spPr bwMode="auto">
+        </p:nvSpPr>
+        <p:spPr>
           <a:xfrm>
-            <a:off x="5123254" y="4145843"/>
-            <a:ext cx="364659" cy="364659"/>
+            <a:off x="7051599" y="2185594"/>
+            <a:ext cx="2450992" cy="369332"/>
           </a:xfrm>
           <a:prstGeom prst="rect">
             <a:avLst/>
           </a:prstGeom>
           <a:noFill/>
-          <a:extLst>
-            <a:ext uri="{909E8E84-426E-40DD-AFC4-6F175D3DCCD1}">
-              <a14:hiddenFill xmlns:a14="http://schemas.microsoft.com/office/drawing/2010/main">
-                <a:solidFill>
-                  <a:srgbClr val="FFFFFF"/>
-                </a:solidFill>
-              </a14:hiddenFill>
-            </a:ext>
-          </a:extLst>
+          <a:effectLst>
+            <a:outerShdw blurRad="50800" dist="38100" dir="2700000" algn="tl" rotWithShape="0">
+              <a:prstClr val="black">
+                <a:alpha val="40000"/>
+              </a:prstClr>
+            </a:outerShdw>
+          </a:effectLst>
         </p:spPr>
-      </p:pic>
-      <p:pic>
-        <p:nvPicPr>
-          <p:cNvPr id="49" name="Picture 2" descr="Use Ambassador Gateway with Knative Serving | by Justin Brûlotte |  Ambassador Labs">
-            <a:extLst>
-              <a:ext uri="{FF2B5EF4-FFF2-40B4-BE49-F238E27FC236}">
-                <a16:creationId xmlns:a16="http://schemas.microsoft.com/office/drawing/2014/main" id="{2CB49637-1FF7-3948-808E-4B44687FC126}"/>
-              </a:ext>
-            </a:extLst>
-          </p:cNvPr>
-          <p:cNvPicPr>
-            <a:picLocks noChangeAspect="1" noChangeArrowheads="1"/>
-          </p:cNvPicPr>
+        <p:txBody>
+          <a:bodyPr wrap="none" rtlCol="0">
+            <a:spAutoFit/>
+          </a:bodyPr>
+          <a:lstStyle/>
+          <a:p>
+            <a:r>
+              <a:rPr lang="en-US" dirty="0">
+                <a:gradFill>
+                  <a:gsLst>
+                    <a:gs pos="0">
+                      <a:schemeClr val="bg1"/>
+                    </a:gs>
+                    <a:gs pos="100000">
+                      <a:schemeClr val="accent4">
+                        <a:lumMod val="20000"/>
+                        <a:lumOff val="80000"/>
+                      </a:schemeClr>
+                    </a:gs>
+                  </a:gsLst>
+                  <a:lin ang="0" scaled="0"/>
+                </a:gradFill>
+                <a:effectLst>
+                  <a:outerShdw blurRad="50800" dist="38100" dir="2700000" algn="tl" rotWithShape="0">
+                    <a:schemeClr val="accent4">
+                      <a:lumMod val="75000"/>
+                      <a:alpha val="40000"/>
+                    </a:schemeClr>
+                  </a:outerShdw>
+                </a:effectLst>
+              </a:rPr>
+              <a:t>Diverse app frameworks</a:t>
+            </a:r>
+          </a:p>
+        </p:txBody>
+      </p:sp>
+      <p:sp>
+        <p:nvSpPr>
+          <p:cNvPr id="83" name="TextBox 82">
+            <a:extLst>
+              <a:ext uri="{FF2B5EF4-FFF2-40B4-BE49-F238E27FC236}">
+                <a16:creationId xmlns:a16="http://schemas.microsoft.com/office/drawing/2014/main" id="{FAE2C051-4905-1C40-A8AC-6A1E1B9B0AC4}"/>
+              </a:ext>
+            </a:extLst>
+          </p:cNvPr>
+          <p:cNvSpPr txBox="1"/>
           <p:nvPr/>
-        </p:nvPicPr>
-        <p:blipFill>
-          <a:blip r:embed="rId25">
-            <a:extLst>
-              <a:ext uri="{28A0092B-C50C-407E-A947-70E740481C1C}">
-                <a14:useLocalDpi xmlns:a14="http://schemas.microsoft.com/office/drawing/2010/main" val="0"/>
-              </a:ext>
-            </a:extLst>
-          </a:blip>
-          <a:srcRect/>
-          <a:stretch>
-            <a:fillRect/>
-          </a:stretch>
-        </p:blipFill>
-        <p:spPr bwMode="auto">
+        </p:nvSpPr>
+        <p:spPr>
           <a:xfrm>
-            <a:off x="6261697" y="4209134"/>
-            <a:ext cx="458399" cy="370492"/>
+            <a:off x="6662133" y="2876764"/>
+            <a:ext cx="2880404" cy="369332"/>
           </a:xfrm>
           <a:prstGeom prst="rect">
             <a:avLst/>
           </a:prstGeom>
           <a:noFill/>
-          <a:extLst>
-            <a:ext uri="{909E8E84-426E-40DD-AFC4-6F175D3DCCD1}">
-              <a14:hiddenFill xmlns:a14="http://schemas.microsoft.com/office/drawing/2010/main">
-                <a:solidFill>
-                  <a:srgbClr val="FFFFFF"/>
-                </a:solidFill>
-              </a14:hiddenFill>
-            </a:ext>
-          </a:extLst>
+          <a:effectLst>
+            <a:outerShdw blurRad="50800" dist="38100" dir="2700000" algn="tl" rotWithShape="0">
+              <a:prstClr val="black">
+                <a:alpha val="40000"/>
+              </a:prstClr>
+            </a:outerShdw>
+          </a:effectLst>
         </p:spPr>
-      </p:pic>
-      <p:pic>
-        <p:nvPicPr>
-          <p:cNvPr id="50" name="Picture 2" descr="Seldon · GitHub">
-            <a:extLst>
-              <a:ext uri="{FF2B5EF4-FFF2-40B4-BE49-F238E27FC236}">
-                <a16:creationId xmlns:a16="http://schemas.microsoft.com/office/drawing/2014/main" id="{2DBAFBF3-8B27-B64F-8434-B41E33480A18}"/>
-              </a:ext>
-            </a:extLst>
-          </p:cNvPr>
-          <p:cNvPicPr>
-            <a:picLocks noChangeAspect="1" noChangeArrowheads="1"/>
-          </p:cNvPicPr>
+        <p:txBody>
+          <a:bodyPr wrap="none" rtlCol="0">
+            <a:spAutoFit/>
+          </a:bodyPr>
+          <a:lstStyle/>
+          <a:p>
+            <a:r>
+              <a:rPr lang="en-US" dirty="0">
+                <a:gradFill>
+                  <a:gsLst>
+                    <a:gs pos="0">
+                      <a:schemeClr val="bg1"/>
+                    </a:gs>
+                    <a:gs pos="0">
+                      <a:schemeClr val="bg1">
+                        <a:lumMod val="20000"/>
+                        <a:lumOff val="80000"/>
+                      </a:schemeClr>
+                    </a:gs>
+                    <a:gs pos="100000">
+                      <a:schemeClr val="accent4">
+                        <a:lumMod val="20000"/>
+                        <a:lumOff val="80000"/>
+                      </a:schemeClr>
+                    </a:gs>
+                  </a:gsLst>
+                  <a:lin ang="0" scaled="0"/>
+                </a:gradFill>
+                <a:effectLst>
+                  <a:outerShdw blurRad="50800" dist="38100" dir="2700000" algn="tl" rotWithShape="0">
+                    <a:schemeClr val="accent4">
+                      <a:lumMod val="75000"/>
+                      <a:alpha val="40000"/>
+                    </a:schemeClr>
+                  </a:outerShdw>
+                </a:effectLst>
+              </a:rPr>
+              <a:t>Advanced traffic engineering</a:t>
+            </a:r>
+          </a:p>
+        </p:txBody>
+      </p:sp>
+      <p:sp>
+        <p:nvSpPr>
+          <p:cNvPr id="84" name="TextBox 83">
+            <a:extLst>
+              <a:ext uri="{FF2B5EF4-FFF2-40B4-BE49-F238E27FC236}">
+                <a16:creationId xmlns:a16="http://schemas.microsoft.com/office/drawing/2014/main" id="{4F6B134A-27C2-A744-BDF7-EB488EF3E173}"/>
+              </a:ext>
+            </a:extLst>
+          </p:cNvPr>
+          <p:cNvSpPr txBox="1"/>
           <p:nvPr/>
-        </p:nvPicPr>
-        <p:blipFill>
-          <a:blip r:embed="rId26">
-            <a:extLst>
-              <a:ext uri="{28A0092B-C50C-407E-A947-70E740481C1C}">
-                <a14:useLocalDpi xmlns:a14="http://schemas.microsoft.com/office/drawing/2010/main" val="0"/>
-              </a:ext>
-            </a:extLst>
-          </a:blip>
-          <a:srcRect/>
-          <a:stretch>
-            <a:fillRect/>
-          </a:stretch>
-        </p:blipFill>
-        <p:spPr bwMode="auto">
-          <a:xfrm flipH="1">
-            <a:off x="8255394" y="3635646"/>
-            <a:ext cx="370492" cy="370492"/>
+        </p:nvSpPr>
+        <p:spPr>
+          <a:xfrm>
+            <a:off x="2975388" y="3621808"/>
+            <a:ext cx="1449884" cy="369332"/>
           </a:xfrm>
           <a:prstGeom prst="rect">
             <a:avLst/>
           </a:prstGeom>
           <a:noFill/>
-          <a:extLst>
-            <a:ext uri="{909E8E84-426E-40DD-AFC4-6F175D3DCCD1}">
-              <a14:hiddenFill xmlns:a14="http://schemas.microsoft.com/office/drawing/2010/main">
-                <a:solidFill>
-                  <a:srgbClr val="FFFFFF"/>
-                </a:solidFill>
-              </a14:hiddenFill>
-            </a:ext>
-          </a:extLst>
+          <a:effectLst>
+            <a:outerShdw blurRad="50800" dist="38100" dir="2700000" algn="tl" rotWithShape="0">
+              <a:prstClr val="black">
+                <a:alpha val="40000"/>
+              </a:prstClr>
+            </a:outerShdw>
+          </a:effectLst>
         </p:spPr>
-      </p:pic>
+        <p:txBody>
+          <a:bodyPr wrap="none" rtlCol="0">
+            <a:spAutoFit/>
+          </a:bodyPr>
+          <a:lstStyle/>
+          <a:p>
+            <a:r>
+              <a:rPr lang="en-US" dirty="0">
+                <a:gradFill>
+                  <a:gsLst>
+                    <a:gs pos="0">
+                      <a:schemeClr val="accent4">
+                        <a:lumMod val="40000"/>
+                        <a:lumOff val="60000"/>
+                      </a:schemeClr>
+                    </a:gs>
+                    <a:gs pos="99000">
+                      <a:schemeClr val="bg1"/>
+                    </a:gs>
+                  </a:gsLst>
+                  <a:lin ang="0" scaled="0"/>
+                </a:gradFill>
+                <a:effectLst>
+                  <a:outerShdw blurRad="50800" dist="38100" dir="2700000" algn="tl" rotWithShape="0">
+                    <a:schemeClr val="accent4">
+                      <a:lumMod val="75000"/>
+                      <a:alpha val="40000"/>
+                    </a:schemeClr>
+                  </a:outerShdw>
+                </a:effectLst>
+              </a:rPr>
+              <a:t>CI/CD/GitOps</a:t>
+            </a:r>
+          </a:p>
+        </p:txBody>
+      </p:sp>
+      <p:sp>
+        <p:nvSpPr>
+          <p:cNvPr id="86" name="TextBox 85">
+            <a:extLst>
+              <a:ext uri="{FF2B5EF4-FFF2-40B4-BE49-F238E27FC236}">
+                <a16:creationId xmlns:a16="http://schemas.microsoft.com/office/drawing/2014/main" id="{3AF42E4E-4F2B-3444-9D30-D6A138BC1321}"/>
+              </a:ext>
+            </a:extLst>
+          </p:cNvPr>
+          <p:cNvSpPr txBox="1"/>
+          <p:nvPr/>
+        </p:nvSpPr>
+        <p:spPr>
+          <a:xfrm>
+            <a:off x="6502795" y="3628270"/>
+            <a:ext cx="2995051" cy="369332"/>
+          </a:xfrm>
+          <a:prstGeom prst="rect">
+            <a:avLst/>
+          </a:prstGeom>
+          <a:noFill/>
+          <a:effectLst>
+            <a:outerShdw blurRad="50800" dist="38100" dir="2700000" algn="tl" rotWithShape="0">
+              <a:prstClr val="black">
+                <a:alpha val="40000"/>
+              </a:prstClr>
+            </a:outerShdw>
+          </a:effectLst>
+        </p:spPr>
+        <p:txBody>
+          <a:bodyPr wrap="none" rtlCol="0">
+            <a:spAutoFit/>
+          </a:bodyPr>
+          <a:lstStyle/>
+          <a:p>
+            <a:r>
+              <a:rPr lang="en-US" dirty="0">
+                <a:gradFill>
+                  <a:gsLst>
+                    <a:gs pos="0">
+                      <a:schemeClr val="bg1"/>
+                    </a:gs>
+                    <a:gs pos="98000">
+                      <a:schemeClr val="accent4">
+                        <a:lumMod val="40000"/>
+                        <a:lumOff val="60000"/>
+                      </a:schemeClr>
+                    </a:gs>
+                  </a:gsLst>
+                  <a:lin ang="0" scaled="0"/>
+                </a:gradFill>
+                <a:effectLst>
+                  <a:outerShdw blurRad="50800" dist="38100" dir="2700000" algn="tl" rotWithShape="0">
+                    <a:schemeClr val="accent4">
+                      <a:lumMod val="75000"/>
+                      <a:alpha val="40000"/>
+                    </a:schemeClr>
+                  </a:outerShdw>
+                </a:effectLst>
+              </a:rPr>
+              <a:t>AI-driven &amp; statistically robust</a:t>
+            </a:r>
+          </a:p>
+        </p:txBody>
+      </p:sp>
+      <p:sp>
+        <p:nvSpPr>
+          <p:cNvPr id="87" name="TextBox 86">
+            <a:extLst>
+              <a:ext uri="{FF2B5EF4-FFF2-40B4-BE49-F238E27FC236}">
+                <a16:creationId xmlns:a16="http://schemas.microsoft.com/office/drawing/2014/main" id="{A14FFCA2-5CA7-AC47-8DEE-26F0528D2DA1}"/>
+              </a:ext>
+            </a:extLst>
+          </p:cNvPr>
+          <p:cNvSpPr txBox="1"/>
+          <p:nvPr/>
+        </p:nvSpPr>
+        <p:spPr>
+          <a:xfrm>
+            <a:off x="2939840" y="2889481"/>
+            <a:ext cx="2404504" cy="369332"/>
+          </a:xfrm>
+          <a:prstGeom prst="rect">
+            <a:avLst/>
+          </a:prstGeom>
+          <a:noFill/>
+          <a:effectLst>
+            <a:outerShdw blurRad="50800" dist="38100" dir="2700000" algn="tl" rotWithShape="0">
+              <a:prstClr val="black">
+                <a:alpha val="40000"/>
+              </a:prstClr>
+            </a:outerShdw>
+          </a:effectLst>
+        </p:spPr>
+        <p:txBody>
+          <a:bodyPr wrap="none" rtlCol="0">
+            <a:spAutoFit/>
+          </a:bodyPr>
+          <a:lstStyle/>
+          <a:p>
+            <a:r>
+              <a:rPr lang="en-US" dirty="0">
+                <a:gradFill>
+                  <a:gsLst>
+                    <a:gs pos="0">
+                      <a:schemeClr val="accent4">
+                        <a:lumMod val="20000"/>
+                        <a:lumOff val="80000"/>
+                      </a:schemeClr>
+                    </a:gs>
+                    <a:gs pos="99000">
+                      <a:schemeClr val="bg1"/>
+                    </a:gs>
+                  </a:gsLst>
+                  <a:lin ang="0" scaled="0"/>
+                </a:gradFill>
+                <a:effectLst>
+                  <a:outerShdw blurRad="50800" dist="38100" dir="2700000" algn="tl" rotWithShape="0">
+                    <a:schemeClr val="accent4">
+                      <a:lumMod val="75000"/>
+                      <a:alpha val="40000"/>
+                    </a:schemeClr>
+                  </a:outerShdw>
+                </a:effectLst>
+              </a:rPr>
+              <a:t>Built-in/Custom metrics</a:t>
+            </a:r>
+          </a:p>
+        </p:txBody>
+      </p:sp>
+    </p:spTree>
+    <p:extLst>
+      <p:ext uri="{BB962C8B-B14F-4D97-AF65-F5344CB8AC3E}">
+        <p14:creationId xmlns:p14="http://schemas.microsoft.com/office/powerpoint/2010/main" val="3897970776"/>
+      </p:ext>
+    </p:extLst>
+  </p:cSld>
+  <p:clrMapOvr>
+    <a:masterClrMapping/>
+  </p:clrMapOvr>
+</p:sld>
+</file>
+
+<file path=ppt/slides/slide2.xml><?xml version="1.0" encoding="utf-8"?>
+<p:sld xmlns:a="http://schemas.openxmlformats.org/drawingml/2006/main" xmlns:r="http://schemas.openxmlformats.org/officeDocument/2006/relationships" xmlns:p="http://schemas.openxmlformats.org/presentationml/2006/main">
+  <p:cSld>
+    <p:spTree>
+      <p:nvGrpSpPr>
+        <p:cNvPr id="1" name=""/>
+        <p:cNvGrpSpPr/>
+        <p:nvPr/>
+      </p:nvGrpSpPr>
+      <p:grpSpPr>
+        <a:xfrm>
+          <a:off x="0" y="0"/>
+          <a:ext cx="0" cy="0"/>
+          <a:chOff x="0" y="0"/>
+          <a:chExt cx="0" cy="0"/>
+        </a:xfrm>
+      </p:grpSpPr>
+      <p:sp>
+        <p:nvSpPr>
+          <p:cNvPr id="18" name="Oval 17">
+            <a:extLst>
+              <a:ext uri="{FF2B5EF4-FFF2-40B4-BE49-F238E27FC236}">
+                <a16:creationId xmlns:a16="http://schemas.microsoft.com/office/drawing/2014/main" id="{69CFBBAB-C673-6649-890C-A189EE928577}"/>
+              </a:ext>
+            </a:extLst>
+          </p:cNvPr>
+          <p:cNvSpPr>
+            <a:spLocks noChangeAspect="1"/>
+          </p:cNvSpPr>
+          <p:nvPr/>
+        </p:nvSpPr>
+        <p:spPr>
+          <a:xfrm>
+            <a:off x="5528064" y="2719254"/>
+            <a:ext cx="1115568" cy="1118950"/>
+          </a:xfrm>
+          <a:prstGeom prst="ellipse">
+            <a:avLst/>
+          </a:prstGeom>
+          <a:solidFill>
+            <a:schemeClr val="bg1"/>
+          </a:solidFill>
+          <a:ln>
+            <a:solidFill>
+              <a:srgbClr val="C00000"/>
+            </a:solidFill>
+          </a:ln>
+          <a:effectLst>
+            <a:outerShdw blurRad="50800" dist="38100" dir="2700000" algn="tl" rotWithShape="0">
+              <a:prstClr val="black">
+                <a:alpha val="40000"/>
+              </a:prstClr>
+            </a:outerShdw>
+          </a:effectLst>
+        </p:spPr>
+        <p:style>
+          <a:lnRef idx="2">
+            <a:schemeClr val="accent1">
+              <a:shade val="50000"/>
+            </a:schemeClr>
+          </a:lnRef>
+          <a:fillRef idx="1">
+            <a:schemeClr val="accent1"/>
+          </a:fillRef>
+          <a:effectRef idx="0">
+            <a:schemeClr val="accent1"/>
+          </a:effectRef>
+          <a:fontRef idx="minor">
+            <a:schemeClr val="lt1"/>
+          </a:fontRef>
+        </p:style>
+        <p:txBody>
+          <a:bodyPr rtlCol="0" anchor="ctr"/>
+          <a:lstStyle/>
+          <a:p>
+            <a:pPr algn="ctr"/>
+            <a:endParaRPr lang="en-US" dirty="0"/>
+          </a:p>
+        </p:txBody>
+      </p:sp>
       <p:pic>
         <p:nvPicPr>
-          <p:cNvPr id="51" name="Picture 50" descr="A picture containing icon&#10;&#10;Description automatically generated">
-            <a:extLst>
-              <a:ext uri="{FF2B5EF4-FFF2-40B4-BE49-F238E27FC236}">
-                <a16:creationId xmlns:a16="http://schemas.microsoft.com/office/drawing/2014/main" id="{D4361B31-6C12-754F-A56E-4EE7668AA9C9}"/>
+          <p:cNvPr id="19" name="Graphic 18">
+            <a:extLst>
+              <a:ext uri="{FF2B5EF4-FFF2-40B4-BE49-F238E27FC236}">
+                <a16:creationId xmlns:a16="http://schemas.microsoft.com/office/drawing/2014/main" id="{3505C14F-6235-5348-81C2-2A318AF8D176}"/>
               </a:ext>
             </a:extLst>
           </p:cNvPr>
@@ -5040,10 +4876,10 @@
           <p:nvPr/>
         </p:nvPicPr>
         <p:blipFill>
-          <a:blip r:embed="rId27">
-            <a:extLst>
-              <a:ext uri="{837473B0-CC2E-450A-ABE3-18F120FF3D39}">
-                <a1611:picAttrSrcUrl xmlns:a1611="http://schemas.microsoft.com/office/drawing/2016/11/main" r:id="rId28"/>
+          <a:blip r:embed="rId3">
+            <a:extLst>
+              <a:ext uri="{96DAC541-7B7A-43D3-8B79-37D633B846F1}">
+                <asvg:svgBlip xmlns:asvg="http://schemas.microsoft.com/office/drawing/2016/SVG/main" r:embed="rId4"/>
               </a:ext>
             </a:extLst>
           </a:blip>
@@ -5053,353 +4889,734 @@
         </p:blipFill>
         <p:spPr>
           <a:xfrm>
-            <a:off x="8787103" y="4164162"/>
-            <a:ext cx="414281" cy="395639"/>
+            <a:off x="5711261" y="2892139"/>
+            <a:ext cx="746070" cy="746070"/>
           </a:xfrm>
           <a:prstGeom prst="rect">
             <a:avLst/>
           </a:prstGeom>
+          <a:effectLst>
+            <a:outerShdw blurRad="50800" dist="50800" dir="5400000" algn="ctr" rotWithShape="0">
+              <a:srgbClr val="000000">
+                <a:alpha val="93000"/>
+              </a:srgbClr>
+            </a:outerShdw>
+          </a:effectLst>
         </p:spPr>
       </p:pic>
-      <p:pic>
-        <p:nvPicPr>
-          <p:cNvPr id="52" name="Picture 51" descr="Logo, icon&#10;&#10;Description automatically generated">
-            <a:extLst>
-              <a:ext uri="{FF2B5EF4-FFF2-40B4-BE49-F238E27FC236}">
-                <a16:creationId xmlns:a16="http://schemas.microsoft.com/office/drawing/2014/main" id="{59F85DE6-DD4B-7A40-89DD-AF1EBB426103}"/>
-              </a:ext>
-            </a:extLst>
-          </p:cNvPr>
-          <p:cNvPicPr>
-            <a:picLocks noChangeAspect="1"/>
-          </p:cNvPicPr>
+      <p:cxnSp>
+        <p:nvCxnSpPr>
+          <p:cNvPr id="20" name="Straight Arrow Connector 19">
+            <a:extLst>
+              <a:ext uri="{FF2B5EF4-FFF2-40B4-BE49-F238E27FC236}">
+                <a16:creationId xmlns:a16="http://schemas.microsoft.com/office/drawing/2014/main" id="{3276E7CE-24C7-094F-A9F9-280707CE9E6D}"/>
+              </a:ext>
+            </a:extLst>
+          </p:cNvPr>
+          <p:cNvCxnSpPr>
+            <a:cxnSpLocks/>
+            <a:stCxn id="18" idx="6"/>
+          </p:cNvCxnSpPr>
           <p:nvPr/>
-        </p:nvPicPr>
-        <p:blipFill>
-          <a:blip r:embed="rId13">
-            <a:extLst>
-              <a:ext uri="{837473B0-CC2E-450A-ABE3-18F120FF3D39}">
-                <a1611:picAttrSrcUrl xmlns:a1611="http://schemas.microsoft.com/office/drawing/2016/11/main" r:id="rId14"/>
-              </a:ext>
-            </a:extLst>
-          </a:blip>
-          <a:stretch>
-            <a:fillRect/>
-          </a:stretch>
-        </p:blipFill>
+        </p:nvCxnSpPr>
         <p:spPr>
           <a:xfrm>
-            <a:off x="5698068" y="4266050"/>
-            <a:ext cx="351703" cy="363734"/>
+            <a:off x="6643632" y="3278729"/>
+            <a:ext cx="2935170" cy="0"/>
           </a:xfrm>
-          <a:prstGeom prst="rect">
+          <a:prstGeom prst="straightConnector1">
             <a:avLst/>
           </a:prstGeom>
+          <a:ln w="31750">
+            <a:gradFill>
+              <a:gsLst>
+                <a:gs pos="0">
+                  <a:schemeClr val="bg1"/>
+                </a:gs>
+                <a:gs pos="100000">
+                  <a:srgbClr val="B70703"/>
+                </a:gs>
+              </a:gsLst>
+              <a:lin ang="0" scaled="0"/>
+            </a:gradFill>
+            <a:tailEnd type="none"/>
+          </a:ln>
         </p:spPr>
-      </p:pic>
-      <p:pic>
-        <p:nvPicPr>
-          <p:cNvPr id="53" name="Picture 52" descr="Icon&#10;&#10;Description automatically generated">
-            <a:extLst>
-              <a:ext uri="{FF2B5EF4-FFF2-40B4-BE49-F238E27FC236}">
-                <a16:creationId xmlns:a16="http://schemas.microsoft.com/office/drawing/2014/main" id="{A73C011B-41FE-664C-AB74-8CC00AF7D57C}"/>
-              </a:ext>
-            </a:extLst>
-          </p:cNvPr>
-          <p:cNvPicPr>
-            <a:picLocks noChangeAspect="1"/>
-          </p:cNvPicPr>
+        <p:style>
+          <a:lnRef idx="1">
+            <a:schemeClr val="accent1"/>
+          </a:lnRef>
+          <a:fillRef idx="0">
+            <a:schemeClr val="accent1"/>
+          </a:fillRef>
+          <a:effectRef idx="0">
+            <a:schemeClr val="accent1"/>
+          </a:effectRef>
+          <a:fontRef idx="minor">
+            <a:schemeClr val="tx1"/>
+          </a:fontRef>
+        </p:style>
+      </p:cxnSp>
+      <p:cxnSp>
+        <p:nvCxnSpPr>
+          <p:cNvPr id="21" name="Elbow Connector 20">
+            <a:extLst>
+              <a:ext uri="{FF2B5EF4-FFF2-40B4-BE49-F238E27FC236}">
+                <a16:creationId xmlns:a16="http://schemas.microsoft.com/office/drawing/2014/main" id="{803057C1-4F62-5347-AC1B-2EFD08228B48}"/>
+              </a:ext>
+            </a:extLst>
+          </p:cNvPr>
+          <p:cNvCxnSpPr>
+            <a:cxnSpLocks/>
+            <a:stCxn id="18" idx="7"/>
+          </p:cNvCxnSpPr>
           <p:nvPr/>
-        </p:nvPicPr>
-        <p:blipFill>
-          <a:blip r:embed="rId15">
-            <a:extLst>
-              <a:ext uri="{837473B0-CC2E-450A-ABE3-18F120FF3D39}">
-                <a1611:picAttrSrcUrl xmlns:a1611="http://schemas.microsoft.com/office/drawing/2016/11/main" r:id="rId16"/>
-              </a:ext>
-            </a:extLst>
-          </a:blip>
-          <a:stretch>
-            <a:fillRect/>
-          </a:stretch>
-        </p:blipFill>
+        </p:nvCxnSpPr>
+        <p:spPr>
+          <a:xfrm rot="5400000" flipH="1" flipV="1">
+            <a:off x="7865434" y="1169753"/>
+            <a:ext cx="328194" cy="3098541"/>
+          </a:xfrm>
+          <a:prstGeom prst="bentConnector2">
+            <a:avLst/>
+          </a:prstGeom>
+          <a:ln w="31750">
+            <a:gradFill>
+              <a:gsLst>
+                <a:gs pos="0">
+                  <a:schemeClr val="bg1"/>
+                </a:gs>
+                <a:gs pos="98000">
+                  <a:srgbClr val="B70703"/>
+                </a:gs>
+              </a:gsLst>
+              <a:lin ang="5400000" scaled="1"/>
+            </a:gradFill>
+          </a:ln>
+        </p:spPr>
+        <p:style>
+          <a:lnRef idx="1">
+            <a:schemeClr val="accent1"/>
+          </a:lnRef>
+          <a:fillRef idx="0">
+            <a:schemeClr val="accent1"/>
+          </a:fillRef>
+          <a:effectRef idx="0">
+            <a:schemeClr val="accent1"/>
+          </a:effectRef>
+          <a:fontRef idx="minor">
+            <a:schemeClr val="tx1"/>
+          </a:fontRef>
+        </p:style>
+      </p:cxnSp>
+      <p:cxnSp>
+        <p:nvCxnSpPr>
+          <p:cNvPr id="22" name="Elbow Connector 21">
+            <a:extLst>
+              <a:ext uri="{FF2B5EF4-FFF2-40B4-BE49-F238E27FC236}">
+                <a16:creationId xmlns:a16="http://schemas.microsoft.com/office/drawing/2014/main" id="{5B54CCD1-92F4-5E42-B250-F2C7AAEF18FB}"/>
+              </a:ext>
+            </a:extLst>
+          </p:cNvPr>
+          <p:cNvCxnSpPr>
+            <a:cxnSpLocks/>
+            <a:stCxn id="18" idx="1"/>
+          </p:cNvCxnSpPr>
+          <p:nvPr/>
+        </p:nvCxnSpPr>
+        <p:spPr>
+          <a:xfrm rot="16200000" flipV="1">
+            <a:off x="4149913" y="1341597"/>
+            <a:ext cx="334246" cy="2748799"/>
+          </a:xfrm>
+          <a:prstGeom prst="bentConnector2">
+            <a:avLst/>
+          </a:prstGeom>
+          <a:ln w="31750">
+            <a:gradFill>
+              <a:gsLst>
+                <a:gs pos="0">
+                  <a:schemeClr val="bg1"/>
+                </a:gs>
+                <a:gs pos="99000">
+                  <a:srgbClr val="C00000"/>
+                </a:gs>
+              </a:gsLst>
+              <a:lin ang="5400000" scaled="1"/>
+            </a:gradFill>
+          </a:ln>
+        </p:spPr>
+        <p:style>
+          <a:lnRef idx="1">
+            <a:schemeClr val="accent1"/>
+          </a:lnRef>
+          <a:fillRef idx="0">
+            <a:schemeClr val="accent1"/>
+          </a:fillRef>
+          <a:effectRef idx="0">
+            <a:schemeClr val="accent1"/>
+          </a:effectRef>
+          <a:fontRef idx="minor">
+            <a:schemeClr val="tx1"/>
+          </a:fontRef>
+        </p:style>
+      </p:cxnSp>
+      <p:cxnSp>
+        <p:nvCxnSpPr>
+          <p:cNvPr id="23" name="Straight Arrow Connector 22">
+            <a:extLst>
+              <a:ext uri="{FF2B5EF4-FFF2-40B4-BE49-F238E27FC236}">
+                <a16:creationId xmlns:a16="http://schemas.microsoft.com/office/drawing/2014/main" id="{0209A820-D829-6845-9D94-58A3C37B0F76}"/>
+              </a:ext>
+            </a:extLst>
+          </p:cNvPr>
+          <p:cNvCxnSpPr>
+            <a:cxnSpLocks/>
+          </p:cNvCxnSpPr>
+          <p:nvPr/>
+        </p:nvCxnSpPr>
+        <p:spPr>
+          <a:xfrm flipH="1">
+            <a:off x="2945219" y="3265174"/>
+            <a:ext cx="2582845" cy="7300"/>
+          </a:xfrm>
+          <a:prstGeom prst="straightConnector1">
+            <a:avLst/>
+          </a:prstGeom>
+          <a:ln w="31750">
+            <a:gradFill>
+              <a:gsLst>
+                <a:gs pos="0">
+                  <a:schemeClr val="bg1"/>
+                </a:gs>
+                <a:gs pos="100000">
+                  <a:srgbClr val="B70703"/>
+                </a:gs>
+              </a:gsLst>
+              <a:lin ang="0" scaled="0"/>
+            </a:gradFill>
+            <a:tailEnd type="none"/>
+          </a:ln>
+        </p:spPr>
+        <p:style>
+          <a:lnRef idx="1">
+            <a:schemeClr val="accent1"/>
+          </a:lnRef>
+          <a:fillRef idx="0">
+            <a:schemeClr val="accent1"/>
+          </a:fillRef>
+          <a:effectRef idx="0">
+            <a:schemeClr val="accent1"/>
+          </a:effectRef>
+          <a:fontRef idx="minor">
+            <a:schemeClr val="tx1"/>
+          </a:fontRef>
+        </p:style>
+      </p:cxnSp>
+      <p:cxnSp>
+        <p:nvCxnSpPr>
+          <p:cNvPr id="24" name="Elbow Connector 23">
+            <a:extLst>
+              <a:ext uri="{FF2B5EF4-FFF2-40B4-BE49-F238E27FC236}">
+                <a16:creationId xmlns:a16="http://schemas.microsoft.com/office/drawing/2014/main" id="{D522808C-0B84-444B-9096-F51B0E4843B7}"/>
+              </a:ext>
+            </a:extLst>
+          </p:cNvPr>
+          <p:cNvCxnSpPr>
+            <a:cxnSpLocks/>
+            <a:stCxn id="18" idx="3"/>
+          </p:cNvCxnSpPr>
+          <p:nvPr/>
+        </p:nvCxnSpPr>
+        <p:spPr>
+          <a:xfrm rot="5400000">
+            <a:off x="4148735" y="2468240"/>
+            <a:ext cx="336603" cy="2748799"/>
+          </a:xfrm>
+          <a:prstGeom prst="bentConnector2">
+            <a:avLst/>
+          </a:prstGeom>
+          <a:ln w="31750">
+            <a:gradFill>
+              <a:gsLst>
+                <a:gs pos="0">
+                  <a:schemeClr val="bg1"/>
+                </a:gs>
+                <a:gs pos="99000">
+                  <a:srgbClr val="B70703"/>
+                </a:gs>
+              </a:gsLst>
+              <a:lin ang="5400000" scaled="1"/>
+            </a:gradFill>
+          </a:ln>
+        </p:spPr>
+        <p:style>
+          <a:lnRef idx="1">
+            <a:schemeClr val="accent1"/>
+          </a:lnRef>
+          <a:fillRef idx="0">
+            <a:schemeClr val="accent1"/>
+          </a:fillRef>
+          <a:effectRef idx="0">
+            <a:schemeClr val="accent1"/>
+          </a:effectRef>
+          <a:fontRef idx="minor">
+            <a:schemeClr val="tx1"/>
+          </a:fontRef>
+        </p:style>
+      </p:cxnSp>
+      <p:cxnSp>
+        <p:nvCxnSpPr>
+          <p:cNvPr id="25" name="Elbow Connector 24">
+            <a:extLst>
+              <a:ext uri="{FF2B5EF4-FFF2-40B4-BE49-F238E27FC236}">
+                <a16:creationId xmlns:a16="http://schemas.microsoft.com/office/drawing/2014/main" id="{A5E8BD86-D478-A94F-8E1D-E88732B3B4CC}"/>
+              </a:ext>
+            </a:extLst>
+          </p:cNvPr>
+          <p:cNvCxnSpPr>
+            <a:cxnSpLocks/>
+            <a:stCxn id="18" idx="5"/>
+          </p:cNvCxnSpPr>
+          <p:nvPr/>
+        </p:nvCxnSpPr>
+        <p:spPr>
+          <a:xfrm rot="16200000" flipH="1">
+            <a:off x="7862408" y="2292190"/>
+            <a:ext cx="334249" cy="3098543"/>
+          </a:xfrm>
+          <a:prstGeom prst="bentConnector2">
+            <a:avLst/>
+          </a:prstGeom>
+          <a:ln w="31750">
+            <a:gradFill>
+              <a:gsLst>
+                <a:gs pos="0">
+                  <a:schemeClr val="bg1"/>
+                </a:gs>
+                <a:gs pos="99000">
+                  <a:srgbClr val="B70703"/>
+                </a:gs>
+              </a:gsLst>
+              <a:lin ang="5400000" scaled="1"/>
+            </a:gradFill>
+          </a:ln>
+        </p:spPr>
+        <p:style>
+          <a:lnRef idx="1">
+            <a:schemeClr val="accent1"/>
+          </a:lnRef>
+          <a:fillRef idx="0">
+            <a:schemeClr val="accent1"/>
+          </a:fillRef>
+          <a:effectRef idx="0">
+            <a:schemeClr val="accent1"/>
+          </a:effectRef>
+          <a:fontRef idx="minor">
+            <a:schemeClr val="tx1"/>
+          </a:fontRef>
+        </p:style>
+      </p:cxnSp>
+      <p:sp>
+        <p:nvSpPr>
+          <p:cNvPr id="27" name="TextBox 26">
+            <a:extLst>
+              <a:ext uri="{FF2B5EF4-FFF2-40B4-BE49-F238E27FC236}">
+                <a16:creationId xmlns:a16="http://schemas.microsoft.com/office/drawing/2014/main" id="{FE418F4E-889D-6D4D-B71B-75C94662A6F5}"/>
+              </a:ext>
+            </a:extLst>
+          </p:cNvPr>
+          <p:cNvSpPr txBox="1"/>
+          <p:nvPr/>
+        </p:nvSpPr>
         <p:spPr>
           <a:xfrm>
-            <a:off x="4746086" y="3638688"/>
-            <a:ext cx="432001" cy="363734"/>
-          </a:xfrm>
-          <a:prstGeom prst="rect">
-            <a:avLst/>
-          </a:prstGeom>
-        </p:spPr>
-      </p:pic>
-      <p:pic>
-        <p:nvPicPr>
-          <p:cNvPr id="61" name="Picture 60" descr="Icon&#10;&#10;Description automatically generated">
-            <a:extLst>
-              <a:ext uri="{FF2B5EF4-FFF2-40B4-BE49-F238E27FC236}">
-                <a16:creationId xmlns:a16="http://schemas.microsoft.com/office/drawing/2014/main" id="{9B15B0F3-8B0E-C449-9A45-A621AB30DEBB}"/>
-              </a:ext>
-            </a:extLst>
-          </p:cNvPr>
-          <p:cNvPicPr>
-            <a:picLocks noChangeAspect="1"/>
-          </p:cNvPicPr>
-          <p:nvPr/>
-        </p:nvPicPr>
-        <p:blipFill>
-          <a:blip r:embed="rId17">
-            <a:extLst>
-              <a:ext uri="{837473B0-CC2E-450A-ABE3-18F120FF3D39}">
-                <a1611:picAttrSrcUrl xmlns:a1611="http://schemas.microsoft.com/office/drawing/2016/11/main" r:id="rId18"/>
-              </a:ext>
-            </a:extLst>
-          </a:blip>
-          <a:stretch>
-            <a:fillRect/>
-          </a:stretch>
-        </p:blipFill>
-        <p:spPr>
-          <a:xfrm>
-            <a:off x="8233080" y="4186491"/>
-            <a:ext cx="348771" cy="363733"/>
-          </a:xfrm>
-          <a:prstGeom prst="rect">
-            <a:avLst/>
-          </a:prstGeom>
-        </p:spPr>
-      </p:pic>
-      <p:pic>
-        <p:nvPicPr>
-          <p:cNvPr id="62" name="Picture 61" descr="Shape&#10;&#10;Description automatically generated">
-            <a:extLst>
-              <a:ext uri="{FF2B5EF4-FFF2-40B4-BE49-F238E27FC236}">
-                <a16:creationId xmlns:a16="http://schemas.microsoft.com/office/drawing/2014/main" id="{9357B8D7-BF10-E441-9448-631B776C286F}"/>
-              </a:ext>
-            </a:extLst>
-          </p:cNvPr>
-          <p:cNvPicPr>
-            <a:picLocks noChangeAspect="1"/>
-          </p:cNvPicPr>
-          <p:nvPr/>
-        </p:nvPicPr>
-        <p:blipFill>
-          <a:blip r:embed="rId19">
-            <a:extLst>
-              <a:ext uri="{837473B0-CC2E-450A-ABE3-18F120FF3D39}">
-                <a1611:picAttrSrcUrl xmlns:a1611="http://schemas.microsoft.com/office/drawing/2016/11/main" r:id="rId20"/>
-              </a:ext>
-            </a:extLst>
-          </a:blip>
-          <a:stretch>
-            <a:fillRect/>
-          </a:stretch>
-        </p:blipFill>
-        <p:spPr>
-          <a:xfrm>
-            <a:off x="9418415" y="4113038"/>
-            <a:ext cx="350312" cy="363734"/>
-          </a:xfrm>
-          <a:prstGeom prst="rect">
-            <a:avLst/>
-          </a:prstGeom>
-        </p:spPr>
-      </p:pic>
-      <p:pic>
-        <p:nvPicPr>
-          <p:cNvPr id="63" name="Picture 62" descr="Icon&#10;&#10;Description automatically generated">
-            <a:extLst>
-              <a:ext uri="{FF2B5EF4-FFF2-40B4-BE49-F238E27FC236}">
-                <a16:creationId xmlns:a16="http://schemas.microsoft.com/office/drawing/2014/main" id="{A82BE2EE-B831-1548-81BF-41D3ABF4BA3A}"/>
-              </a:ext>
-            </a:extLst>
-          </p:cNvPr>
-          <p:cNvPicPr>
-            <a:picLocks noChangeAspect="1"/>
-          </p:cNvPicPr>
-          <p:nvPr/>
-        </p:nvPicPr>
-        <p:blipFill>
-          <a:blip r:embed="rId29">
-            <a:extLst>
-              <a:ext uri="{837473B0-CC2E-450A-ABE3-18F120FF3D39}">
-                <a1611:picAttrSrcUrl xmlns:a1611="http://schemas.microsoft.com/office/drawing/2016/11/main" r:id="rId30"/>
-              </a:ext>
-            </a:extLst>
-          </a:blip>
-          <a:stretch>
-            <a:fillRect/>
-          </a:stretch>
-        </p:blipFill>
-        <p:spPr>
-          <a:xfrm>
-            <a:off x="5884641" y="3708492"/>
-            <a:ext cx="414283" cy="414283"/>
-          </a:xfrm>
-          <a:prstGeom prst="rect">
-            <a:avLst/>
-          </a:prstGeom>
-        </p:spPr>
-      </p:pic>
-      <p:pic>
-        <p:nvPicPr>
-          <p:cNvPr id="65" name="Picture 64" descr="Icon&#10;&#10;Description automatically generated">
-            <a:extLst>
-              <a:ext uri="{FF2B5EF4-FFF2-40B4-BE49-F238E27FC236}">
-                <a16:creationId xmlns:a16="http://schemas.microsoft.com/office/drawing/2014/main" id="{9CC186A5-C19E-C94C-B1CB-021EE7C62866}"/>
-              </a:ext>
-            </a:extLst>
-          </p:cNvPr>
-          <p:cNvPicPr>
-            <a:picLocks noChangeAspect="1"/>
-          </p:cNvPicPr>
-          <p:nvPr/>
-        </p:nvPicPr>
-        <p:blipFill>
-          <a:blip r:embed="rId31">
-            <a:extLst>
-              <a:ext uri="{837473B0-CC2E-450A-ABE3-18F120FF3D39}">
-                <a1611:picAttrSrcUrl xmlns:a1611="http://schemas.microsoft.com/office/drawing/2016/11/main" r:id="rId32"/>
-              </a:ext>
-            </a:extLst>
-          </a:blip>
-          <a:stretch>
-            <a:fillRect/>
-          </a:stretch>
-        </p:blipFill>
-        <p:spPr>
-          <a:xfrm>
-            <a:off x="5429486" y="3665895"/>
-            <a:ext cx="319795" cy="368185"/>
-          </a:xfrm>
-          <a:prstGeom prst="rect">
-            <a:avLst/>
-          </a:prstGeom>
-        </p:spPr>
-      </p:pic>
-      <p:pic>
-        <p:nvPicPr>
-          <p:cNvPr id="69" name="Picture 68" descr="Icon&#10;&#10;Description automatically generated">
-            <a:extLst>
-              <a:ext uri="{FF2B5EF4-FFF2-40B4-BE49-F238E27FC236}">
-                <a16:creationId xmlns:a16="http://schemas.microsoft.com/office/drawing/2014/main" id="{09B185C1-B8F3-494B-8C88-DD5A9CB11587}"/>
-              </a:ext>
-            </a:extLst>
-          </p:cNvPr>
-          <p:cNvPicPr>
-            <a:picLocks noChangeAspect="1"/>
-          </p:cNvPicPr>
-          <p:nvPr/>
-        </p:nvPicPr>
-        <p:blipFill>
-          <a:blip r:embed="rId33">
-            <a:extLst>
-              <a:ext uri="{837473B0-CC2E-450A-ABE3-18F120FF3D39}">
-                <a1611:picAttrSrcUrl xmlns:a1611="http://schemas.microsoft.com/office/drawing/2016/11/main" r:id="rId34"/>
-              </a:ext>
-            </a:extLst>
-          </a:blip>
-          <a:stretch>
-            <a:fillRect/>
-          </a:stretch>
-        </p:blipFill>
-        <p:spPr>
-          <a:xfrm>
-            <a:off x="8934253" y="3620631"/>
-            <a:ext cx="370492" cy="370492"/>
-          </a:xfrm>
-          <a:prstGeom prst="rect">
-            <a:avLst/>
-          </a:prstGeom>
-        </p:spPr>
-      </p:pic>
-      <p:pic>
-        <p:nvPicPr>
-          <p:cNvPr id="75" name="Picture 74" descr="Shape, icon&#10;&#10;Description automatically generated">
-            <a:extLst>
-              <a:ext uri="{FF2B5EF4-FFF2-40B4-BE49-F238E27FC236}">
-                <a16:creationId xmlns:a16="http://schemas.microsoft.com/office/drawing/2014/main" id="{750D57E5-CFCC-D845-9302-FAFBC2046000}"/>
-              </a:ext>
-            </a:extLst>
-          </p:cNvPr>
-          <p:cNvPicPr>
-            <a:picLocks noChangeAspect="1"/>
-          </p:cNvPicPr>
-          <p:nvPr/>
-        </p:nvPicPr>
-        <p:blipFill>
-          <a:blip r:embed="rId35">
-            <a:extLst>
-              <a:ext uri="{837473B0-CC2E-450A-ABE3-18F120FF3D39}">
-                <a1611:picAttrSrcUrl xmlns:a1611="http://schemas.microsoft.com/office/drawing/2016/11/main" r:id="rId36"/>
-              </a:ext>
-            </a:extLst>
-          </a:blip>
-          <a:stretch>
-            <a:fillRect/>
-          </a:stretch>
-        </p:blipFill>
-        <p:spPr>
-          <a:xfrm>
-            <a:off x="9975926" y="4006138"/>
-            <a:ext cx="249842" cy="370492"/>
-          </a:xfrm>
-          <a:prstGeom prst="rect">
-            <a:avLst/>
-          </a:prstGeom>
-        </p:spPr>
-      </p:pic>
-      <p:pic>
-        <p:nvPicPr>
-          <p:cNvPr id="76" name="Picture 4" descr="Litmus Chaos · GitHub">
-            <a:extLst>
-              <a:ext uri="{FF2B5EF4-FFF2-40B4-BE49-F238E27FC236}">
-                <a16:creationId xmlns:a16="http://schemas.microsoft.com/office/drawing/2014/main" id="{65923218-1257-E143-A4F2-798E8F479729}"/>
-              </a:ext>
-            </a:extLst>
-          </p:cNvPr>
-          <p:cNvPicPr>
-            <a:picLocks noChangeAspect="1" noChangeArrowheads="1"/>
-          </p:cNvPicPr>
-          <p:nvPr/>
-        </p:nvPicPr>
-        <p:blipFill>
-          <a:blip r:embed="rId37">
-            <a:extLst>
-              <a:ext uri="{28A0092B-C50C-407E-A947-70E740481C1C}">
-                <a14:useLocalDpi xmlns:a14="http://schemas.microsoft.com/office/drawing/2010/main" val="0"/>
-              </a:ext>
-            </a:extLst>
-          </a:blip>
-          <a:srcRect/>
-          <a:stretch>
-            <a:fillRect/>
-          </a:stretch>
-        </p:blipFill>
-        <p:spPr bwMode="auto">
-          <a:xfrm>
-            <a:off x="9507562" y="3668778"/>
-            <a:ext cx="321206" cy="321206"/>
+            <a:off x="2975388" y="2179542"/>
+            <a:ext cx="2455865" cy="369332"/>
           </a:xfrm>
           <a:prstGeom prst="rect">
             <a:avLst/>
           </a:prstGeom>
           <a:noFill/>
-          <a:extLst>
-            <a:ext uri="{909E8E84-426E-40DD-AFC4-6F175D3DCCD1}">
-              <a14:hiddenFill xmlns:a14="http://schemas.microsoft.com/office/drawing/2010/main">
-                <a:solidFill>
-                  <a:srgbClr val="FFFFFF"/>
-                </a:solidFill>
-              </a14:hiddenFill>
-            </a:ext>
-          </a:extLst>
+          <a:effectLst>
+            <a:outerShdw blurRad="50800" dist="38100" dir="2700000" algn="tl" rotWithShape="0">
+              <a:prstClr val="black">
+                <a:alpha val="40000"/>
+              </a:prstClr>
+            </a:outerShdw>
+          </a:effectLst>
         </p:spPr>
-      </p:pic>
+        <p:txBody>
+          <a:bodyPr wrap="none" rtlCol="0">
+            <a:spAutoFit/>
+          </a:bodyPr>
+          <a:lstStyle/>
+          <a:p>
+            <a:r>
+              <a:rPr lang="en-US" dirty="0">
+                <a:gradFill>
+                  <a:gsLst>
+                    <a:gs pos="0">
+                      <a:schemeClr val="accent4">
+                        <a:lumMod val="20000"/>
+                        <a:lumOff val="80000"/>
+                      </a:schemeClr>
+                    </a:gs>
+                    <a:gs pos="99000">
+                      <a:schemeClr val="bg1"/>
+                    </a:gs>
+                  </a:gsLst>
+                  <a:lin ang="0" scaled="0"/>
+                </a:gradFill>
+                <a:effectLst>
+                  <a:outerShdw blurRad="50800" dist="38100" dir="2700000" algn="tl" rotWithShape="0">
+                    <a:schemeClr val="accent4">
+                      <a:lumMod val="75000"/>
+                      <a:alpha val="40000"/>
+                    </a:schemeClr>
+                  </a:outerShdw>
+                </a:effectLst>
+              </a:rPr>
+              <a:t>Declarative experiments</a:t>
+            </a:r>
+          </a:p>
+        </p:txBody>
+      </p:sp>
+      <p:sp>
+        <p:nvSpPr>
+          <p:cNvPr id="28" name="TextBox 27">
+            <a:extLst>
+              <a:ext uri="{FF2B5EF4-FFF2-40B4-BE49-F238E27FC236}">
+                <a16:creationId xmlns:a16="http://schemas.microsoft.com/office/drawing/2014/main" id="{42322F4B-5B2F-1D41-9798-8F5041042580}"/>
+              </a:ext>
+            </a:extLst>
+          </p:cNvPr>
+          <p:cNvSpPr txBox="1"/>
+          <p:nvPr/>
+        </p:nvSpPr>
+        <p:spPr>
+          <a:xfrm>
+            <a:off x="7051599" y="2185594"/>
+            <a:ext cx="2450992" cy="369332"/>
+          </a:xfrm>
+          <a:prstGeom prst="rect">
+            <a:avLst/>
+          </a:prstGeom>
+          <a:noFill/>
+          <a:effectLst>
+            <a:outerShdw blurRad="50800" dist="38100" dir="2700000" algn="tl" rotWithShape="0">
+              <a:prstClr val="black">
+                <a:alpha val="40000"/>
+              </a:prstClr>
+            </a:outerShdw>
+          </a:effectLst>
+        </p:spPr>
+        <p:txBody>
+          <a:bodyPr wrap="none" rtlCol="0">
+            <a:spAutoFit/>
+          </a:bodyPr>
+          <a:lstStyle/>
+          <a:p>
+            <a:r>
+              <a:rPr lang="en-US" dirty="0">
+                <a:gradFill>
+                  <a:gsLst>
+                    <a:gs pos="0">
+                      <a:schemeClr val="bg1"/>
+                    </a:gs>
+                    <a:gs pos="100000">
+                      <a:schemeClr val="accent4">
+                        <a:lumMod val="20000"/>
+                        <a:lumOff val="80000"/>
+                      </a:schemeClr>
+                    </a:gs>
+                  </a:gsLst>
+                  <a:lin ang="0" scaled="0"/>
+                </a:gradFill>
+                <a:effectLst>
+                  <a:outerShdw blurRad="50800" dist="38100" dir="2700000" algn="tl" rotWithShape="0">
+                    <a:schemeClr val="accent4">
+                      <a:lumMod val="75000"/>
+                      <a:alpha val="40000"/>
+                    </a:schemeClr>
+                  </a:outerShdw>
+                </a:effectLst>
+              </a:rPr>
+              <a:t>Diverse app frameworks</a:t>
+            </a:r>
+          </a:p>
+        </p:txBody>
+      </p:sp>
+      <p:sp>
+        <p:nvSpPr>
+          <p:cNvPr id="29" name="TextBox 28">
+            <a:extLst>
+              <a:ext uri="{FF2B5EF4-FFF2-40B4-BE49-F238E27FC236}">
+                <a16:creationId xmlns:a16="http://schemas.microsoft.com/office/drawing/2014/main" id="{8186D894-8473-D447-BB47-D1FBB37C1F6A}"/>
+              </a:ext>
+            </a:extLst>
+          </p:cNvPr>
+          <p:cNvSpPr txBox="1"/>
+          <p:nvPr/>
+        </p:nvSpPr>
+        <p:spPr>
+          <a:xfrm>
+            <a:off x="6662133" y="2876764"/>
+            <a:ext cx="2880404" cy="369332"/>
+          </a:xfrm>
+          <a:prstGeom prst="rect">
+            <a:avLst/>
+          </a:prstGeom>
+          <a:noFill/>
+          <a:effectLst>
+            <a:outerShdw blurRad="50800" dist="38100" dir="2700000" algn="tl" rotWithShape="0">
+              <a:prstClr val="black">
+                <a:alpha val="40000"/>
+              </a:prstClr>
+            </a:outerShdw>
+          </a:effectLst>
+        </p:spPr>
+        <p:txBody>
+          <a:bodyPr wrap="none" rtlCol="0">
+            <a:spAutoFit/>
+          </a:bodyPr>
+          <a:lstStyle/>
+          <a:p>
+            <a:r>
+              <a:rPr lang="en-US" dirty="0">
+                <a:gradFill>
+                  <a:gsLst>
+                    <a:gs pos="0">
+                      <a:schemeClr val="bg1"/>
+                    </a:gs>
+                    <a:gs pos="0">
+                      <a:schemeClr val="bg1">
+                        <a:lumMod val="20000"/>
+                        <a:lumOff val="80000"/>
+                      </a:schemeClr>
+                    </a:gs>
+                    <a:gs pos="100000">
+                      <a:schemeClr val="accent4">
+                        <a:lumMod val="20000"/>
+                        <a:lumOff val="80000"/>
+                      </a:schemeClr>
+                    </a:gs>
+                  </a:gsLst>
+                  <a:lin ang="0" scaled="0"/>
+                </a:gradFill>
+                <a:effectLst>
+                  <a:outerShdw blurRad="50800" dist="38100" dir="2700000" algn="tl" rotWithShape="0">
+                    <a:schemeClr val="accent4">
+                      <a:lumMod val="75000"/>
+                      <a:alpha val="40000"/>
+                    </a:schemeClr>
+                  </a:outerShdw>
+                </a:effectLst>
+              </a:rPr>
+              <a:t>Advanced traffic engineering</a:t>
+            </a:r>
+          </a:p>
+        </p:txBody>
+      </p:sp>
+      <p:sp>
+        <p:nvSpPr>
+          <p:cNvPr id="30" name="TextBox 29">
+            <a:extLst>
+              <a:ext uri="{FF2B5EF4-FFF2-40B4-BE49-F238E27FC236}">
+                <a16:creationId xmlns:a16="http://schemas.microsoft.com/office/drawing/2014/main" id="{BB0C0ACC-EE27-F641-BFC6-F0061B867E0E}"/>
+              </a:ext>
+            </a:extLst>
+          </p:cNvPr>
+          <p:cNvSpPr txBox="1"/>
+          <p:nvPr/>
+        </p:nvSpPr>
+        <p:spPr>
+          <a:xfrm>
+            <a:off x="2975388" y="3621808"/>
+            <a:ext cx="1449884" cy="369332"/>
+          </a:xfrm>
+          <a:prstGeom prst="rect">
+            <a:avLst/>
+          </a:prstGeom>
+          <a:noFill/>
+          <a:effectLst>
+            <a:outerShdw blurRad="50800" dist="38100" dir="2700000" algn="tl" rotWithShape="0">
+              <a:prstClr val="black">
+                <a:alpha val="40000"/>
+              </a:prstClr>
+            </a:outerShdw>
+          </a:effectLst>
+        </p:spPr>
+        <p:txBody>
+          <a:bodyPr wrap="none" rtlCol="0">
+            <a:spAutoFit/>
+          </a:bodyPr>
+          <a:lstStyle/>
+          <a:p>
+            <a:r>
+              <a:rPr lang="en-US" dirty="0">
+                <a:gradFill>
+                  <a:gsLst>
+                    <a:gs pos="0">
+                      <a:schemeClr val="accent4">
+                        <a:lumMod val="40000"/>
+                        <a:lumOff val="60000"/>
+                      </a:schemeClr>
+                    </a:gs>
+                    <a:gs pos="99000">
+                      <a:schemeClr val="bg1"/>
+                    </a:gs>
+                  </a:gsLst>
+                  <a:lin ang="0" scaled="0"/>
+                </a:gradFill>
+                <a:effectLst>
+                  <a:outerShdw blurRad="50800" dist="38100" dir="2700000" algn="tl" rotWithShape="0">
+                    <a:schemeClr val="accent4">
+                      <a:lumMod val="75000"/>
+                      <a:alpha val="40000"/>
+                    </a:schemeClr>
+                  </a:outerShdw>
+                </a:effectLst>
+              </a:rPr>
+              <a:t>CI/CD/GitOps</a:t>
+            </a:r>
+          </a:p>
+        </p:txBody>
+      </p:sp>
+      <p:sp>
+        <p:nvSpPr>
+          <p:cNvPr id="31" name="TextBox 30">
+            <a:extLst>
+              <a:ext uri="{FF2B5EF4-FFF2-40B4-BE49-F238E27FC236}">
+                <a16:creationId xmlns:a16="http://schemas.microsoft.com/office/drawing/2014/main" id="{2A1E1B8F-C3E9-1B48-8A45-A2F25C4409AD}"/>
+              </a:ext>
+            </a:extLst>
+          </p:cNvPr>
+          <p:cNvSpPr txBox="1"/>
+          <p:nvPr/>
+        </p:nvSpPr>
+        <p:spPr>
+          <a:xfrm>
+            <a:off x="6502795" y="3628270"/>
+            <a:ext cx="2995051" cy="369332"/>
+          </a:xfrm>
+          <a:prstGeom prst="rect">
+            <a:avLst/>
+          </a:prstGeom>
+          <a:noFill/>
+          <a:effectLst>
+            <a:outerShdw blurRad="50800" dist="38100" dir="2700000" algn="tl" rotWithShape="0">
+              <a:prstClr val="black">
+                <a:alpha val="40000"/>
+              </a:prstClr>
+            </a:outerShdw>
+          </a:effectLst>
+        </p:spPr>
+        <p:txBody>
+          <a:bodyPr wrap="none" rtlCol="0">
+            <a:spAutoFit/>
+          </a:bodyPr>
+          <a:lstStyle/>
+          <a:p>
+            <a:r>
+              <a:rPr lang="en-US" dirty="0">
+                <a:gradFill>
+                  <a:gsLst>
+                    <a:gs pos="0">
+                      <a:schemeClr val="bg1"/>
+                    </a:gs>
+                    <a:gs pos="98000">
+                      <a:schemeClr val="accent4">
+                        <a:lumMod val="40000"/>
+                        <a:lumOff val="60000"/>
+                      </a:schemeClr>
+                    </a:gs>
+                  </a:gsLst>
+                  <a:lin ang="0" scaled="0"/>
+                </a:gradFill>
+                <a:effectLst>
+                  <a:outerShdw blurRad="50800" dist="38100" dir="2700000" algn="tl" rotWithShape="0">
+                    <a:schemeClr val="accent4">
+                      <a:lumMod val="75000"/>
+                      <a:alpha val="40000"/>
+                    </a:schemeClr>
+                  </a:outerShdw>
+                </a:effectLst>
+              </a:rPr>
+              <a:t>AI-driven &amp; statistically robust</a:t>
+            </a:r>
+          </a:p>
+        </p:txBody>
+      </p:sp>
+      <p:sp>
+        <p:nvSpPr>
+          <p:cNvPr id="32" name="TextBox 31">
+            <a:extLst>
+              <a:ext uri="{FF2B5EF4-FFF2-40B4-BE49-F238E27FC236}">
+                <a16:creationId xmlns:a16="http://schemas.microsoft.com/office/drawing/2014/main" id="{04764A98-9A1C-F34B-8249-A0FA61086CF4}"/>
+              </a:ext>
+            </a:extLst>
+          </p:cNvPr>
+          <p:cNvSpPr txBox="1"/>
+          <p:nvPr/>
+        </p:nvSpPr>
+        <p:spPr>
+          <a:xfrm>
+            <a:off x="2939840" y="2889481"/>
+            <a:ext cx="2404504" cy="369332"/>
+          </a:xfrm>
+          <a:prstGeom prst="rect">
+            <a:avLst/>
+          </a:prstGeom>
+          <a:noFill/>
+          <a:effectLst>
+            <a:outerShdw blurRad="50800" dist="38100" dir="2700000" algn="tl" rotWithShape="0">
+              <a:prstClr val="black">
+                <a:alpha val="40000"/>
+              </a:prstClr>
+            </a:outerShdw>
+          </a:effectLst>
+        </p:spPr>
+        <p:txBody>
+          <a:bodyPr wrap="none" rtlCol="0">
+            <a:spAutoFit/>
+          </a:bodyPr>
+          <a:lstStyle/>
+          <a:p>
+            <a:r>
+              <a:rPr lang="en-US" dirty="0">
+                <a:gradFill>
+                  <a:gsLst>
+                    <a:gs pos="0">
+                      <a:schemeClr val="accent4">
+                        <a:lumMod val="20000"/>
+                        <a:lumOff val="80000"/>
+                      </a:schemeClr>
+                    </a:gs>
+                    <a:gs pos="99000">
+                      <a:schemeClr val="bg1"/>
+                    </a:gs>
+                  </a:gsLst>
+                  <a:lin ang="0" scaled="0"/>
+                </a:gradFill>
+                <a:effectLst>
+                  <a:outerShdw blurRad="50800" dist="38100" dir="2700000" algn="tl" rotWithShape="0">
+                    <a:schemeClr val="accent4">
+                      <a:lumMod val="75000"/>
+                      <a:alpha val="40000"/>
+                    </a:schemeClr>
+                  </a:outerShdw>
+                </a:effectLst>
+              </a:rPr>
+              <a:t>Built-in/Custom metrics</a:t>
+            </a:r>
+          </a:p>
+        </p:txBody>
+      </p:sp>
     </p:spTree>
     <p:extLst>
       <p:ext uri="{BB962C8B-B14F-4D97-AF65-F5344CB8AC3E}">
-        <p14:creationId xmlns:p14="http://schemas.microsoft.com/office/powerpoint/2010/main" val="3897970776"/>
+        <p14:creationId xmlns:p14="http://schemas.microsoft.com/office/powerpoint/2010/main" val="2174649656"/>
       </p:ext>
     </p:extLst>
   </p:cSld>

</xml_diff>

<commit_message>
Deployed e0a5d5d to 0.7 with MkDocs 1.2.3 and mike 1.1.2
</commit_message>
<xml_diff>
--- a/0.7/images/src/illustration.pptx
+++ b/0.7/images/src/illustration.pptx
@@ -5,11 +5,14 @@
     <p:sldMasterId id="2147483648" r:id="rId1"/>
   </p:sldMasterIdLst>
   <p:notesMasterIdLst>
-    <p:notesMasterId r:id="rId4"/>
+    <p:notesMasterId r:id="rId7"/>
   </p:notesMasterIdLst>
   <p:sldIdLst>
     <p:sldId id="374" r:id="rId2"/>
     <p:sldId id="375" r:id="rId3"/>
+    <p:sldId id="376" r:id="rId4"/>
+    <p:sldId id="378" r:id="rId5"/>
+    <p:sldId id="379" r:id="rId6"/>
   </p:sldIdLst>
   <p:sldSz cx="12192000" cy="6858000"/>
   <p:notesSz cx="6858000" cy="9144000"/>
@@ -198,7 +201,7 @@
           <a:p>
             <a:fld id="{38B78CBE-37FA-D241-BB4C-CAC5D3B25F49}" type="datetimeFigureOut">
               <a:rPr lang="en-US" smtClean="0"/>
-              <a:t>9/26/21</a:t>
+              <a:t>10/14/21</a:t>
             </a:fld>
             <a:endParaRPr lang="en-US"/>
           </a:p>
@@ -633,6 +636,258 @@
 </p:notes>
 </file>
 
+<file path=ppt/notesSlides/notesSlide3.xml><?xml version="1.0" encoding="utf-8"?>
+<p:notes xmlns:a="http://schemas.openxmlformats.org/drawingml/2006/main" xmlns:r="http://schemas.openxmlformats.org/officeDocument/2006/relationships" xmlns:p="http://schemas.openxmlformats.org/presentationml/2006/main">
+  <p:cSld>
+    <p:spTree>
+      <p:nvGrpSpPr>
+        <p:cNvPr id="1" name=""/>
+        <p:cNvGrpSpPr/>
+        <p:nvPr/>
+      </p:nvGrpSpPr>
+      <p:grpSpPr>
+        <a:xfrm>
+          <a:off x="0" y="0"/>
+          <a:ext cx="0" cy="0"/>
+          <a:chOff x="0" y="0"/>
+          <a:chExt cx="0" cy="0"/>
+        </a:xfrm>
+      </p:grpSpPr>
+      <p:sp>
+        <p:nvSpPr>
+          <p:cNvPr id="2" name="Slide Image Placeholder 1"/>
+          <p:cNvSpPr>
+            <a:spLocks noGrp="1" noRot="1" noChangeAspect="1"/>
+          </p:cNvSpPr>
+          <p:nvPr>
+            <p:ph type="sldImg"/>
+          </p:nvPr>
+        </p:nvSpPr>
+        <p:spPr/>
+      </p:sp>
+      <p:sp>
+        <p:nvSpPr>
+          <p:cNvPr id="3" name="Notes Placeholder 2"/>
+          <p:cNvSpPr>
+            <a:spLocks noGrp="1"/>
+          </p:cNvSpPr>
+          <p:nvPr>
+            <p:ph type="body" idx="1"/>
+          </p:nvPr>
+        </p:nvSpPr>
+        <p:spPr/>
+        <p:txBody>
+          <a:bodyPr/>
+          <a:lstStyle/>
+          <a:p>
+            <a:endParaRPr lang="en-US" dirty="0"/>
+          </a:p>
+        </p:txBody>
+      </p:sp>
+      <p:sp>
+        <p:nvSpPr>
+          <p:cNvPr id="4" name="Slide Number Placeholder 3"/>
+          <p:cNvSpPr>
+            <a:spLocks noGrp="1"/>
+          </p:cNvSpPr>
+          <p:nvPr>
+            <p:ph type="sldNum" sz="quarter" idx="5"/>
+          </p:nvPr>
+        </p:nvSpPr>
+        <p:spPr/>
+        <p:txBody>
+          <a:bodyPr/>
+          <a:lstStyle/>
+          <a:p>
+            <a:fld id="{38344E6D-279C-6147-976F-4BE3F315D9D6}" type="slidenum">
+              <a:rPr lang="en-US" smtClean="0"/>
+              <a:t>3</a:t>
+            </a:fld>
+            <a:endParaRPr lang="en-US"/>
+          </a:p>
+        </p:txBody>
+      </p:sp>
+    </p:spTree>
+    <p:extLst>
+      <p:ext uri="{BB962C8B-B14F-4D97-AF65-F5344CB8AC3E}">
+        <p14:creationId xmlns:p14="http://schemas.microsoft.com/office/powerpoint/2010/main" val="1920320764"/>
+      </p:ext>
+    </p:extLst>
+  </p:cSld>
+  <p:clrMapOvr>
+    <a:masterClrMapping/>
+  </p:clrMapOvr>
+</p:notes>
+</file>
+
+<file path=ppt/notesSlides/notesSlide4.xml><?xml version="1.0" encoding="utf-8"?>
+<p:notes xmlns:a="http://schemas.openxmlformats.org/drawingml/2006/main" xmlns:r="http://schemas.openxmlformats.org/officeDocument/2006/relationships" xmlns:p="http://schemas.openxmlformats.org/presentationml/2006/main">
+  <p:cSld>
+    <p:spTree>
+      <p:nvGrpSpPr>
+        <p:cNvPr id="1" name=""/>
+        <p:cNvGrpSpPr/>
+        <p:nvPr/>
+      </p:nvGrpSpPr>
+      <p:grpSpPr>
+        <a:xfrm>
+          <a:off x="0" y="0"/>
+          <a:ext cx="0" cy="0"/>
+          <a:chOff x="0" y="0"/>
+          <a:chExt cx="0" cy="0"/>
+        </a:xfrm>
+      </p:grpSpPr>
+      <p:sp>
+        <p:nvSpPr>
+          <p:cNvPr id="2" name="Slide Image Placeholder 1"/>
+          <p:cNvSpPr>
+            <a:spLocks noGrp="1" noRot="1" noChangeAspect="1"/>
+          </p:cNvSpPr>
+          <p:nvPr>
+            <p:ph type="sldImg"/>
+          </p:nvPr>
+        </p:nvSpPr>
+        <p:spPr/>
+      </p:sp>
+      <p:sp>
+        <p:nvSpPr>
+          <p:cNvPr id="3" name="Notes Placeholder 2"/>
+          <p:cNvSpPr>
+            <a:spLocks noGrp="1"/>
+          </p:cNvSpPr>
+          <p:nvPr>
+            <p:ph type="body" idx="1"/>
+          </p:nvPr>
+        </p:nvSpPr>
+        <p:spPr/>
+        <p:txBody>
+          <a:bodyPr/>
+          <a:lstStyle/>
+          <a:p>
+            <a:endParaRPr lang="en-US" dirty="0"/>
+          </a:p>
+        </p:txBody>
+      </p:sp>
+      <p:sp>
+        <p:nvSpPr>
+          <p:cNvPr id="4" name="Slide Number Placeholder 3"/>
+          <p:cNvSpPr>
+            <a:spLocks noGrp="1"/>
+          </p:cNvSpPr>
+          <p:nvPr>
+            <p:ph type="sldNum" sz="quarter" idx="5"/>
+          </p:nvPr>
+        </p:nvSpPr>
+        <p:spPr/>
+        <p:txBody>
+          <a:bodyPr/>
+          <a:lstStyle/>
+          <a:p>
+            <a:fld id="{38344E6D-279C-6147-976F-4BE3F315D9D6}" type="slidenum">
+              <a:rPr lang="en-US" smtClean="0"/>
+              <a:t>4</a:t>
+            </a:fld>
+            <a:endParaRPr lang="en-US"/>
+          </a:p>
+        </p:txBody>
+      </p:sp>
+    </p:spTree>
+    <p:extLst>
+      <p:ext uri="{BB962C8B-B14F-4D97-AF65-F5344CB8AC3E}">
+        <p14:creationId xmlns:p14="http://schemas.microsoft.com/office/powerpoint/2010/main" val="1237927400"/>
+      </p:ext>
+    </p:extLst>
+  </p:cSld>
+  <p:clrMapOvr>
+    <a:masterClrMapping/>
+  </p:clrMapOvr>
+</p:notes>
+</file>
+
+<file path=ppt/notesSlides/notesSlide5.xml><?xml version="1.0" encoding="utf-8"?>
+<p:notes xmlns:a="http://schemas.openxmlformats.org/drawingml/2006/main" xmlns:r="http://schemas.openxmlformats.org/officeDocument/2006/relationships" xmlns:p="http://schemas.openxmlformats.org/presentationml/2006/main">
+  <p:cSld>
+    <p:spTree>
+      <p:nvGrpSpPr>
+        <p:cNvPr id="1" name=""/>
+        <p:cNvGrpSpPr/>
+        <p:nvPr/>
+      </p:nvGrpSpPr>
+      <p:grpSpPr>
+        <a:xfrm>
+          <a:off x="0" y="0"/>
+          <a:ext cx="0" cy="0"/>
+          <a:chOff x="0" y="0"/>
+          <a:chExt cx="0" cy="0"/>
+        </a:xfrm>
+      </p:grpSpPr>
+      <p:sp>
+        <p:nvSpPr>
+          <p:cNvPr id="2" name="Slide Image Placeholder 1"/>
+          <p:cNvSpPr>
+            <a:spLocks noGrp="1" noRot="1" noChangeAspect="1"/>
+          </p:cNvSpPr>
+          <p:nvPr>
+            <p:ph type="sldImg"/>
+          </p:nvPr>
+        </p:nvSpPr>
+        <p:spPr/>
+      </p:sp>
+      <p:sp>
+        <p:nvSpPr>
+          <p:cNvPr id="3" name="Notes Placeholder 2"/>
+          <p:cNvSpPr>
+            <a:spLocks noGrp="1"/>
+          </p:cNvSpPr>
+          <p:nvPr>
+            <p:ph type="body" idx="1"/>
+          </p:nvPr>
+        </p:nvSpPr>
+        <p:spPr/>
+        <p:txBody>
+          <a:bodyPr/>
+          <a:lstStyle/>
+          <a:p>
+            <a:endParaRPr lang="en-US" dirty="0"/>
+          </a:p>
+        </p:txBody>
+      </p:sp>
+      <p:sp>
+        <p:nvSpPr>
+          <p:cNvPr id="4" name="Slide Number Placeholder 3"/>
+          <p:cNvSpPr>
+            <a:spLocks noGrp="1"/>
+          </p:cNvSpPr>
+          <p:nvPr>
+            <p:ph type="sldNum" sz="quarter" idx="5"/>
+          </p:nvPr>
+        </p:nvSpPr>
+        <p:spPr/>
+        <p:txBody>
+          <a:bodyPr/>
+          <a:lstStyle/>
+          <a:p>
+            <a:fld id="{38344E6D-279C-6147-976F-4BE3F315D9D6}" type="slidenum">
+              <a:rPr lang="en-US" smtClean="0"/>
+              <a:t>5</a:t>
+            </a:fld>
+            <a:endParaRPr lang="en-US"/>
+          </a:p>
+        </p:txBody>
+      </p:sp>
+    </p:spTree>
+    <p:extLst>
+      <p:ext uri="{BB962C8B-B14F-4D97-AF65-F5344CB8AC3E}">
+        <p14:creationId xmlns:p14="http://schemas.microsoft.com/office/powerpoint/2010/main" val="2111761150"/>
+      </p:ext>
+    </p:extLst>
+  </p:cSld>
+  <p:clrMapOvr>
+    <a:masterClrMapping/>
+  </p:clrMapOvr>
+</p:notes>
+</file>
+
 <file path=ppt/slideLayouts/slideLayout1.xml><?xml version="1.0" encoding="utf-8"?>
 <p:sldLayout xmlns:a="http://schemas.openxmlformats.org/drawingml/2006/main" xmlns:r="http://schemas.openxmlformats.org/officeDocument/2006/relationships" xmlns:p="http://schemas.openxmlformats.org/presentationml/2006/main" type="title" preserve="1">
   <p:cSld name="Title Slide">
@@ -780,7 +1035,7 @@
           <a:p>
             <a:fld id="{708812C5-0212-FD42-A0D4-E2E8FF4E3AF5}" type="datetime1">
               <a:rPr lang="en-US" smtClean="0"/>
-              <a:t>9/26/21</a:t>
+              <a:t>10/14/21</a:t>
             </a:fld>
             <a:endParaRPr lang="en-US"/>
           </a:p>
@@ -981,7 +1236,7 @@
           <a:p>
             <a:fld id="{D232AC6F-41C3-B34B-9BAA-03ED2F3BC0F6}" type="datetime1">
               <a:rPr lang="en-US" smtClean="0"/>
-              <a:t>9/26/21</a:t>
+              <a:t>10/14/21</a:t>
             </a:fld>
             <a:endParaRPr lang="en-US"/>
           </a:p>
@@ -1192,7 +1447,7 @@
           <a:p>
             <a:fld id="{BEE140C2-F440-9D49-95CB-5965D64CC4A2}" type="datetime1">
               <a:rPr lang="en-US" smtClean="0"/>
-              <a:t>9/26/21</a:t>
+              <a:t>10/14/21</a:t>
             </a:fld>
             <a:endParaRPr lang="en-US"/>
           </a:p>
@@ -1393,7 +1648,7 @@
           <a:p>
             <a:fld id="{CC99F980-FB29-FD47-8508-150F73F1E8B0}" type="datetime1">
               <a:rPr lang="en-US" smtClean="0"/>
-              <a:t>9/26/21</a:t>
+              <a:t>10/14/21</a:t>
             </a:fld>
             <a:endParaRPr lang="en-US"/>
           </a:p>
@@ -1671,7 +1926,7 @@
           <a:p>
             <a:fld id="{D4510983-EA22-9643-8AC0-B3C6499B643B}" type="datetime1">
               <a:rPr lang="en-US" smtClean="0"/>
-              <a:t>9/26/21</a:t>
+              <a:t>10/14/21</a:t>
             </a:fld>
             <a:endParaRPr lang="en-US"/>
           </a:p>
@@ -1939,7 +2194,7 @@
           <a:p>
             <a:fld id="{D5A39195-967D-5D4E-8C6A-C99866996458}" type="datetime1">
               <a:rPr lang="en-US" smtClean="0"/>
-              <a:t>9/26/21</a:t>
+              <a:t>10/14/21</a:t>
             </a:fld>
             <a:endParaRPr lang="en-US"/>
           </a:p>
@@ -2354,7 +2609,7 @@
           <a:p>
             <a:fld id="{5AD771E9-C79D-684D-A158-5EB6E92DE947}" type="datetime1">
               <a:rPr lang="en-US" smtClean="0"/>
-              <a:t>9/26/21</a:t>
+              <a:t>10/14/21</a:t>
             </a:fld>
             <a:endParaRPr lang="en-US"/>
           </a:p>
@@ -2498,7 +2753,7 @@
           <a:p>
             <a:fld id="{693CA161-7E4C-5C4B-B799-DB602A0B9806}" type="datetime1">
               <a:rPr lang="en-US" smtClean="0"/>
-              <a:t>9/26/21</a:t>
+              <a:t>10/14/21</a:t>
             </a:fld>
             <a:endParaRPr lang="en-US"/>
           </a:p>
@@ -2614,7 +2869,7 @@
           <a:p>
             <a:fld id="{6D55FDF3-8BB2-6349-A5FA-057F3D78953D}" type="datetime1">
               <a:rPr lang="en-US" smtClean="0"/>
-              <a:t>9/26/21</a:t>
+              <a:t>10/14/21</a:t>
             </a:fld>
             <a:endParaRPr lang="en-US"/>
           </a:p>
@@ -2928,7 +3183,7 @@
           <a:p>
             <a:fld id="{EEDFACC0-3228-BA4B-942E-CEF38B0101FD}" type="datetime1">
               <a:rPr lang="en-US" smtClean="0"/>
-              <a:t>9/26/21</a:t>
+              <a:t>10/14/21</a:t>
             </a:fld>
             <a:endParaRPr lang="en-US"/>
           </a:p>
@@ -3219,7 +3474,7 @@
           <a:p>
             <a:fld id="{07EEEDBE-E24C-D140-B419-6D8D592D0F1C}" type="datetime1">
               <a:rPr lang="en-US" smtClean="0"/>
-              <a:t>9/26/21</a:t>
+              <a:t>10/14/21</a:t>
             </a:fld>
             <a:endParaRPr lang="en-US"/>
           </a:p>
@@ -3463,7 +3718,7 @@
           <a:p>
             <a:fld id="{E05781A2-A5EF-C54C-A3EF-F62483D37EDC}" type="datetime1">
               <a:rPr lang="en-US" smtClean="0"/>
-              <a:t>9/26/21</a:t>
+              <a:t>10/14/21</a:t>
             </a:fld>
             <a:endParaRPr lang="en-US"/>
           </a:p>
@@ -5617,6 +5872,2969 @@
     <p:extLst>
       <p:ext uri="{BB962C8B-B14F-4D97-AF65-F5344CB8AC3E}">
         <p14:creationId xmlns:p14="http://schemas.microsoft.com/office/powerpoint/2010/main" val="2174649656"/>
+      </p:ext>
+    </p:extLst>
+  </p:cSld>
+  <p:clrMapOvr>
+    <a:masterClrMapping/>
+  </p:clrMapOvr>
+</p:sld>
+</file>
+
+<file path=ppt/slides/slide3.xml><?xml version="1.0" encoding="utf-8"?>
+<p:sld xmlns:a="http://schemas.openxmlformats.org/drawingml/2006/main" xmlns:r="http://schemas.openxmlformats.org/officeDocument/2006/relationships" xmlns:p="http://schemas.openxmlformats.org/presentationml/2006/main">
+  <p:cSld>
+    <p:spTree>
+      <p:nvGrpSpPr>
+        <p:cNvPr id="1" name=""/>
+        <p:cNvGrpSpPr/>
+        <p:nvPr/>
+      </p:nvGrpSpPr>
+      <p:grpSpPr>
+        <a:xfrm>
+          <a:off x="0" y="0"/>
+          <a:ext cx="0" cy="0"/>
+          <a:chOff x="0" y="0"/>
+          <a:chExt cx="0" cy="0"/>
+        </a:xfrm>
+      </p:grpSpPr>
+      <p:sp>
+        <p:nvSpPr>
+          <p:cNvPr id="9" name="Rounded Rectangle 8">
+            <a:extLst>
+              <a:ext uri="{FF2B5EF4-FFF2-40B4-BE49-F238E27FC236}">
+                <a16:creationId xmlns:a16="http://schemas.microsoft.com/office/drawing/2014/main" id="{319D71A4-FD5D-BD48-844B-435B16760232}"/>
+              </a:ext>
+            </a:extLst>
+          </p:cNvPr>
+          <p:cNvSpPr/>
+          <p:nvPr/>
+        </p:nvSpPr>
+        <p:spPr>
+          <a:xfrm>
+            <a:off x="2438397" y="1933404"/>
+            <a:ext cx="7315200" cy="2690649"/>
+          </a:xfrm>
+          <a:prstGeom prst="roundRect">
+            <a:avLst/>
+          </a:prstGeom>
+          <a:gradFill>
+            <a:gsLst>
+              <a:gs pos="0">
+                <a:srgbClr val="C00000"/>
+              </a:gs>
+              <a:gs pos="100000">
+                <a:schemeClr val="accent1">
+                  <a:lumMod val="45000"/>
+                  <a:lumOff val="55000"/>
+                </a:schemeClr>
+              </a:gs>
+              <a:gs pos="100000">
+                <a:schemeClr val="accent1">
+                  <a:lumMod val="45000"/>
+                  <a:lumOff val="55000"/>
+                </a:schemeClr>
+              </a:gs>
+              <a:gs pos="100000">
+                <a:schemeClr val="tx2"/>
+              </a:gs>
+            </a:gsLst>
+            <a:lin ang="5400000" scaled="1"/>
+          </a:gradFill>
+        </p:spPr>
+        <p:style>
+          <a:lnRef idx="2">
+            <a:schemeClr val="accent1">
+              <a:shade val="50000"/>
+            </a:schemeClr>
+          </a:lnRef>
+          <a:fillRef idx="1">
+            <a:schemeClr val="accent1"/>
+          </a:fillRef>
+          <a:effectRef idx="0">
+            <a:schemeClr val="accent1"/>
+          </a:effectRef>
+          <a:fontRef idx="minor">
+            <a:schemeClr val="lt1"/>
+          </a:fontRef>
+        </p:style>
+        <p:txBody>
+          <a:bodyPr rtlCol="0" anchor="ctr"/>
+          <a:lstStyle/>
+          <a:p>
+            <a:pPr algn="ctr"/>
+            <a:endParaRPr lang="en-US"/>
+          </a:p>
+        </p:txBody>
+      </p:sp>
+      <p:sp>
+        <p:nvSpPr>
+          <p:cNvPr id="45" name="Oval 44">
+            <a:extLst>
+              <a:ext uri="{FF2B5EF4-FFF2-40B4-BE49-F238E27FC236}">
+                <a16:creationId xmlns:a16="http://schemas.microsoft.com/office/drawing/2014/main" id="{7EA7BD02-DB63-9548-B6A6-786AF358FC92}"/>
+              </a:ext>
+            </a:extLst>
+          </p:cNvPr>
+          <p:cNvSpPr>
+            <a:spLocks noChangeAspect="1"/>
+          </p:cNvSpPr>
+          <p:nvPr/>
+        </p:nvSpPr>
+        <p:spPr>
+          <a:xfrm>
+            <a:off x="5528064" y="2719254"/>
+            <a:ext cx="1115568" cy="1118950"/>
+          </a:xfrm>
+          <a:prstGeom prst="ellipse">
+            <a:avLst/>
+          </a:prstGeom>
+          <a:solidFill>
+            <a:schemeClr val="bg1"/>
+          </a:solidFill>
+          <a:ln>
+            <a:solidFill>
+              <a:srgbClr val="C00000"/>
+            </a:solidFill>
+          </a:ln>
+          <a:effectLst>
+            <a:outerShdw blurRad="50800" dist="38100" dir="2700000" algn="tl" rotWithShape="0">
+              <a:prstClr val="black">
+                <a:alpha val="40000"/>
+              </a:prstClr>
+            </a:outerShdw>
+          </a:effectLst>
+        </p:spPr>
+        <p:style>
+          <a:lnRef idx="2">
+            <a:schemeClr val="accent1">
+              <a:shade val="50000"/>
+            </a:schemeClr>
+          </a:lnRef>
+          <a:fillRef idx="1">
+            <a:schemeClr val="accent1"/>
+          </a:fillRef>
+          <a:effectRef idx="0">
+            <a:schemeClr val="accent1"/>
+          </a:effectRef>
+          <a:fontRef idx="minor">
+            <a:schemeClr val="lt1"/>
+          </a:fontRef>
+        </p:style>
+        <p:txBody>
+          <a:bodyPr rtlCol="0" anchor="ctr"/>
+          <a:lstStyle/>
+          <a:p>
+            <a:pPr algn="ctr"/>
+            <a:endParaRPr lang="en-US" dirty="0"/>
+          </a:p>
+        </p:txBody>
+      </p:sp>
+      <p:pic>
+        <p:nvPicPr>
+          <p:cNvPr id="46" name="Graphic 45">
+            <a:extLst>
+              <a:ext uri="{FF2B5EF4-FFF2-40B4-BE49-F238E27FC236}">
+                <a16:creationId xmlns:a16="http://schemas.microsoft.com/office/drawing/2014/main" id="{DB0AF4BA-07A2-6344-A68F-2AF45ACD2045}"/>
+              </a:ext>
+            </a:extLst>
+          </p:cNvPr>
+          <p:cNvPicPr>
+            <a:picLocks noChangeAspect="1"/>
+          </p:cNvPicPr>
+          <p:nvPr/>
+        </p:nvPicPr>
+        <p:blipFill>
+          <a:blip r:embed="rId3">
+            <a:extLst>
+              <a:ext uri="{96DAC541-7B7A-43D3-8B79-37D633B846F1}">
+                <asvg:svgBlip xmlns:asvg="http://schemas.microsoft.com/office/drawing/2016/SVG/main" r:embed="rId4"/>
+              </a:ext>
+            </a:extLst>
+          </a:blip>
+          <a:stretch>
+            <a:fillRect/>
+          </a:stretch>
+        </p:blipFill>
+        <p:spPr>
+          <a:xfrm>
+            <a:off x="5711261" y="2892139"/>
+            <a:ext cx="746070" cy="746070"/>
+          </a:xfrm>
+          <a:prstGeom prst="rect">
+            <a:avLst/>
+          </a:prstGeom>
+          <a:effectLst>
+            <a:outerShdw blurRad="50800" dist="50800" dir="5400000" algn="ctr" rotWithShape="0">
+              <a:srgbClr val="000000">
+                <a:alpha val="93000"/>
+              </a:srgbClr>
+            </a:outerShdw>
+          </a:effectLst>
+        </p:spPr>
+      </p:pic>
+      <p:cxnSp>
+        <p:nvCxnSpPr>
+          <p:cNvPr id="78" name="Straight Arrow Connector 77">
+            <a:extLst>
+              <a:ext uri="{FF2B5EF4-FFF2-40B4-BE49-F238E27FC236}">
+                <a16:creationId xmlns:a16="http://schemas.microsoft.com/office/drawing/2014/main" id="{0442ED27-3243-AE4E-ADAC-0122C7D2199B}"/>
+              </a:ext>
+            </a:extLst>
+          </p:cNvPr>
+          <p:cNvCxnSpPr>
+            <a:cxnSpLocks/>
+            <a:stCxn id="45" idx="1"/>
+          </p:cNvCxnSpPr>
+          <p:nvPr/>
+        </p:nvCxnSpPr>
+        <p:spPr>
+          <a:xfrm flipH="1">
+            <a:off x="2975388" y="2883120"/>
+            <a:ext cx="2716047" cy="0"/>
+          </a:xfrm>
+          <a:prstGeom prst="straightConnector1">
+            <a:avLst/>
+          </a:prstGeom>
+          <a:ln w="31750">
+            <a:gradFill>
+              <a:gsLst>
+                <a:gs pos="0">
+                  <a:schemeClr val="bg1"/>
+                </a:gs>
+                <a:gs pos="100000">
+                  <a:srgbClr val="B70703"/>
+                </a:gs>
+              </a:gsLst>
+              <a:lin ang="0" scaled="0"/>
+            </a:gradFill>
+            <a:tailEnd type="none"/>
+          </a:ln>
+        </p:spPr>
+        <p:style>
+          <a:lnRef idx="1">
+            <a:schemeClr val="accent1"/>
+          </a:lnRef>
+          <a:fillRef idx="0">
+            <a:schemeClr val="accent1"/>
+          </a:fillRef>
+          <a:effectRef idx="0">
+            <a:schemeClr val="accent1"/>
+          </a:effectRef>
+          <a:fontRef idx="minor">
+            <a:schemeClr val="tx1"/>
+          </a:fontRef>
+        </p:style>
+      </p:cxnSp>
+      <p:sp>
+        <p:nvSpPr>
+          <p:cNvPr id="26" name="TextBox 25">
+            <a:extLst>
+              <a:ext uri="{FF2B5EF4-FFF2-40B4-BE49-F238E27FC236}">
+                <a16:creationId xmlns:a16="http://schemas.microsoft.com/office/drawing/2014/main" id="{00B0B6B7-226E-954C-98D8-33134757394E}"/>
+              </a:ext>
+            </a:extLst>
+          </p:cNvPr>
+          <p:cNvSpPr txBox="1"/>
+          <p:nvPr/>
+        </p:nvSpPr>
+        <p:spPr>
+          <a:xfrm>
+            <a:off x="5085881" y="2083323"/>
+            <a:ext cx="2020233" cy="369332"/>
+          </a:xfrm>
+          <a:prstGeom prst="rect">
+            <a:avLst/>
+          </a:prstGeom>
+          <a:noFill/>
+          <a:effectLst>
+            <a:outerShdw blurRad="50800" dist="38100" dir="2700000" algn="tl" rotWithShape="0">
+              <a:prstClr val="black">
+                <a:alpha val="40000"/>
+              </a:prstClr>
+            </a:outerShdw>
+          </a:effectLst>
+        </p:spPr>
+        <p:txBody>
+          <a:bodyPr wrap="none" rtlCol="0">
+            <a:spAutoFit/>
+          </a:bodyPr>
+          <a:lstStyle/>
+          <a:p>
+            <a:r>
+              <a:rPr lang="en-US" dirty="0">
+                <a:gradFill>
+                  <a:gsLst>
+                    <a:gs pos="0">
+                      <a:schemeClr val="accent4">
+                        <a:lumMod val="20000"/>
+                        <a:lumOff val="80000"/>
+                      </a:schemeClr>
+                    </a:gs>
+                    <a:gs pos="99000">
+                      <a:schemeClr val="bg1"/>
+                    </a:gs>
+                  </a:gsLst>
+                  <a:lin ang="0" scaled="0"/>
+                </a:gradFill>
+                <a:effectLst>
+                  <a:outerShdw blurRad="50800" dist="38100" dir="2700000" algn="tl" rotWithShape="0">
+                    <a:schemeClr val="accent4">
+                      <a:lumMod val="75000"/>
+                      <a:alpha val="40000"/>
+                    </a:schemeClr>
+                  </a:outerShdw>
+                </a:effectLst>
+              </a:rPr>
+              <a:t>Progressive rollouts</a:t>
+            </a:r>
+          </a:p>
+        </p:txBody>
+      </p:sp>
+      <p:sp>
+        <p:nvSpPr>
+          <p:cNvPr id="84" name="TextBox 83">
+            <a:extLst>
+              <a:ext uri="{FF2B5EF4-FFF2-40B4-BE49-F238E27FC236}">
+                <a16:creationId xmlns:a16="http://schemas.microsoft.com/office/drawing/2014/main" id="{4F6B134A-27C2-A744-BDF7-EB488EF3E173}"/>
+              </a:ext>
+            </a:extLst>
+          </p:cNvPr>
+          <p:cNvSpPr txBox="1"/>
+          <p:nvPr/>
+        </p:nvSpPr>
+        <p:spPr>
+          <a:xfrm>
+            <a:off x="2975388" y="3300409"/>
+            <a:ext cx="1442767" cy="369332"/>
+          </a:xfrm>
+          <a:prstGeom prst="rect">
+            <a:avLst/>
+          </a:prstGeom>
+          <a:noFill/>
+          <a:effectLst>
+            <a:outerShdw blurRad="50800" dist="38100" dir="2700000" algn="tl" rotWithShape="0">
+              <a:prstClr val="black">
+                <a:alpha val="40000"/>
+              </a:prstClr>
+            </a:outerShdw>
+          </a:effectLst>
+        </p:spPr>
+        <p:txBody>
+          <a:bodyPr wrap="none" rtlCol="0">
+            <a:spAutoFit/>
+          </a:bodyPr>
+          <a:lstStyle/>
+          <a:p>
+            <a:r>
+              <a:rPr lang="en-US" dirty="0">
+                <a:gradFill>
+                  <a:gsLst>
+                    <a:gs pos="0">
+                      <a:schemeClr val="accent4">
+                        <a:lumMod val="40000"/>
+                        <a:lumOff val="60000"/>
+                      </a:schemeClr>
+                    </a:gs>
+                    <a:gs pos="99000">
+                      <a:schemeClr val="bg1"/>
+                    </a:gs>
+                  </a:gsLst>
+                  <a:lin ang="0" scaled="0"/>
+                </a:gradFill>
+                <a:effectLst>
+                  <a:outerShdw blurRad="50800" dist="38100" dir="2700000" algn="tl" rotWithShape="0">
+                    <a:schemeClr val="accent4">
+                      <a:lumMod val="75000"/>
+                      <a:alpha val="40000"/>
+                    </a:schemeClr>
+                  </a:outerShdw>
+                </a:effectLst>
+              </a:rPr>
+              <a:t>Chaos testing</a:t>
+            </a:r>
+          </a:p>
+        </p:txBody>
+      </p:sp>
+      <p:sp>
+        <p:nvSpPr>
+          <p:cNvPr id="86" name="TextBox 85">
+            <a:extLst>
+              <a:ext uri="{FF2B5EF4-FFF2-40B4-BE49-F238E27FC236}">
+                <a16:creationId xmlns:a16="http://schemas.microsoft.com/office/drawing/2014/main" id="{3AF42E4E-4F2B-3444-9D30-D6A138BC1321}"/>
+              </a:ext>
+            </a:extLst>
+          </p:cNvPr>
+          <p:cNvSpPr txBox="1"/>
+          <p:nvPr/>
+        </p:nvSpPr>
+        <p:spPr>
+          <a:xfrm>
+            <a:off x="4180023" y="4141054"/>
+            <a:ext cx="3808543" cy="369332"/>
+          </a:xfrm>
+          <a:prstGeom prst="rect">
+            <a:avLst/>
+          </a:prstGeom>
+          <a:noFill/>
+          <a:effectLst>
+            <a:outerShdw blurRad="50800" dist="38100" dir="2700000" algn="tl" rotWithShape="0">
+              <a:prstClr val="black">
+                <a:alpha val="40000"/>
+              </a:prstClr>
+            </a:outerShdw>
+          </a:effectLst>
+        </p:spPr>
+        <p:txBody>
+          <a:bodyPr wrap="none" rtlCol="0">
+            <a:spAutoFit/>
+          </a:bodyPr>
+          <a:lstStyle/>
+          <a:p>
+            <a:r>
+              <a:rPr lang="en-US" dirty="0">
+                <a:gradFill>
+                  <a:gsLst>
+                    <a:gs pos="0">
+                      <a:schemeClr val="bg1"/>
+                    </a:gs>
+                    <a:gs pos="98000">
+                      <a:schemeClr val="accent4">
+                        <a:lumMod val="40000"/>
+                        <a:lumOff val="60000"/>
+                      </a:schemeClr>
+                    </a:gs>
+                  </a:gsLst>
+                  <a:lin ang="0" scaled="0"/>
+                </a:gradFill>
+                <a:effectLst>
+                  <a:outerShdw blurRad="50800" dist="38100" dir="2700000" algn="tl" rotWithShape="0">
+                    <a:schemeClr val="accent4">
+                      <a:lumMod val="75000"/>
+                      <a:alpha val="40000"/>
+                    </a:schemeClr>
+                  </a:outerShdw>
+                </a:effectLst>
+              </a:rPr>
+              <a:t>State-of-the-art AI &amp; statistical analysis</a:t>
+            </a:r>
+          </a:p>
+        </p:txBody>
+      </p:sp>
+      <p:sp>
+        <p:nvSpPr>
+          <p:cNvPr id="87" name="TextBox 86">
+            <a:extLst>
+              <a:ext uri="{FF2B5EF4-FFF2-40B4-BE49-F238E27FC236}">
+                <a16:creationId xmlns:a16="http://schemas.microsoft.com/office/drawing/2014/main" id="{A14FFCA2-5CA7-AC47-8DEE-26F0528D2DA1}"/>
+              </a:ext>
+            </a:extLst>
+          </p:cNvPr>
+          <p:cNvSpPr txBox="1"/>
+          <p:nvPr/>
+        </p:nvSpPr>
+        <p:spPr>
+          <a:xfrm>
+            <a:off x="3545503" y="2480564"/>
+            <a:ext cx="1575816" cy="369332"/>
+          </a:xfrm>
+          <a:prstGeom prst="rect">
+            <a:avLst/>
+          </a:prstGeom>
+          <a:noFill/>
+          <a:effectLst>
+            <a:outerShdw blurRad="50800" dist="38100" dir="2700000" algn="tl" rotWithShape="0">
+              <a:prstClr val="black">
+                <a:alpha val="40000"/>
+              </a:prstClr>
+            </a:outerShdw>
+          </a:effectLst>
+        </p:spPr>
+        <p:txBody>
+          <a:bodyPr wrap="none" rtlCol="0">
+            <a:spAutoFit/>
+          </a:bodyPr>
+          <a:lstStyle/>
+          <a:p>
+            <a:r>
+              <a:rPr lang="en-US" dirty="0">
+                <a:gradFill>
+                  <a:gsLst>
+                    <a:gs pos="0">
+                      <a:schemeClr val="accent4">
+                        <a:lumMod val="20000"/>
+                        <a:lumOff val="80000"/>
+                      </a:schemeClr>
+                    </a:gs>
+                    <a:gs pos="99000">
+                      <a:schemeClr val="bg1"/>
+                    </a:gs>
+                  </a:gsLst>
+                  <a:lin ang="0" scaled="0"/>
+                </a:gradFill>
+                <a:effectLst>
+                  <a:outerShdw blurRad="50800" dist="38100" dir="2700000" algn="tl" rotWithShape="0">
+                    <a:schemeClr val="accent4">
+                      <a:lumMod val="75000"/>
+                      <a:alpha val="40000"/>
+                    </a:schemeClr>
+                  </a:outerShdw>
+                </a:effectLst>
+              </a:rPr>
+              <a:t>A/B(/n) testing</a:t>
+            </a:r>
+          </a:p>
+        </p:txBody>
+      </p:sp>
+      <p:cxnSp>
+        <p:nvCxnSpPr>
+          <p:cNvPr id="24" name="Straight Arrow Connector 23">
+            <a:extLst>
+              <a:ext uri="{FF2B5EF4-FFF2-40B4-BE49-F238E27FC236}">
+                <a16:creationId xmlns:a16="http://schemas.microsoft.com/office/drawing/2014/main" id="{B9D26F47-5E45-C548-8703-049CCF161E69}"/>
+              </a:ext>
+            </a:extLst>
+          </p:cNvPr>
+          <p:cNvCxnSpPr>
+            <a:cxnSpLocks/>
+            <a:stCxn id="45" idx="3"/>
+          </p:cNvCxnSpPr>
+          <p:nvPr/>
+        </p:nvCxnSpPr>
+        <p:spPr>
+          <a:xfrm flipH="1">
+            <a:off x="2975388" y="3674338"/>
+            <a:ext cx="2716047" cy="0"/>
+          </a:xfrm>
+          <a:prstGeom prst="straightConnector1">
+            <a:avLst/>
+          </a:prstGeom>
+          <a:ln w="31750">
+            <a:gradFill>
+              <a:gsLst>
+                <a:gs pos="0">
+                  <a:schemeClr val="bg1"/>
+                </a:gs>
+                <a:gs pos="100000">
+                  <a:srgbClr val="B70703"/>
+                </a:gs>
+              </a:gsLst>
+              <a:lin ang="0" scaled="0"/>
+            </a:gradFill>
+            <a:tailEnd type="none"/>
+          </a:ln>
+        </p:spPr>
+        <p:style>
+          <a:lnRef idx="1">
+            <a:schemeClr val="accent1"/>
+          </a:lnRef>
+          <a:fillRef idx="0">
+            <a:schemeClr val="accent1"/>
+          </a:fillRef>
+          <a:effectRef idx="0">
+            <a:schemeClr val="accent1"/>
+          </a:effectRef>
+          <a:fontRef idx="minor">
+            <a:schemeClr val="tx1"/>
+          </a:fontRef>
+        </p:style>
+      </p:cxnSp>
+      <p:cxnSp>
+        <p:nvCxnSpPr>
+          <p:cNvPr id="27" name="Straight Arrow Connector 26">
+            <a:extLst>
+              <a:ext uri="{FF2B5EF4-FFF2-40B4-BE49-F238E27FC236}">
+                <a16:creationId xmlns:a16="http://schemas.microsoft.com/office/drawing/2014/main" id="{5330E225-5DC0-6D4C-83F4-B6F53FA58B81}"/>
+              </a:ext>
+            </a:extLst>
+          </p:cNvPr>
+          <p:cNvCxnSpPr>
+            <a:cxnSpLocks/>
+            <a:stCxn id="45" idx="4"/>
+          </p:cNvCxnSpPr>
+          <p:nvPr/>
+        </p:nvCxnSpPr>
+        <p:spPr>
+          <a:xfrm flipH="1">
+            <a:off x="6084296" y="3838204"/>
+            <a:ext cx="1552" cy="258910"/>
+          </a:xfrm>
+          <a:prstGeom prst="straightConnector1">
+            <a:avLst/>
+          </a:prstGeom>
+          <a:ln w="31750">
+            <a:solidFill>
+              <a:schemeClr val="lt1">
+                <a:hueOff val="0"/>
+                <a:satOff val="0"/>
+                <a:lumOff val="0"/>
+              </a:schemeClr>
+            </a:solidFill>
+            <a:tailEnd type="none"/>
+          </a:ln>
+        </p:spPr>
+        <p:style>
+          <a:lnRef idx="1">
+            <a:schemeClr val="accent1"/>
+          </a:lnRef>
+          <a:fillRef idx="0">
+            <a:schemeClr val="accent1"/>
+          </a:fillRef>
+          <a:effectRef idx="0">
+            <a:schemeClr val="accent1"/>
+          </a:effectRef>
+          <a:fontRef idx="minor">
+            <a:schemeClr val="tx1"/>
+          </a:fontRef>
+        </p:style>
+      </p:cxnSp>
+      <p:cxnSp>
+        <p:nvCxnSpPr>
+          <p:cNvPr id="30" name="Straight Arrow Connector 29">
+            <a:extLst>
+              <a:ext uri="{FF2B5EF4-FFF2-40B4-BE49-F238E27FC236}">
+                <a16:creationId xmlns:a16="http://schemas.microsoft.com/office/drawing/2014/main" id="{7046775E-C39B-3444-98D7-1861DFAD2629}"/>
+              </a:ext>
+            </a:extLst>
+          </p:cNvPr>
+          <p:cNvCxnSpPr>
+            <a:cxnSpLocks/>
+          </p:cNvCxnSpPr>
+          <p:nvPr/>
+        </p:nvCxnSpPr>
+        <p:spPr>
+          <a:xfrm flipH="1">
+            <a:off x="6095999" y="2469809"/>
+            <a:ext cx="1552" cy="258910"/>
+          </a:xfrm>
+          <a:prstGeom prst="straightConnector1">
+            <a:avLst/>
+          </a:prstGeom>
+          <a:ln w="31750">
+            <a:solidFill>
+              <a:schemeClr val="lt1">
+                <a:hueOff val="0"/>
+                <a:satOff val="0"/>
+                <a:lumOff val="0"/>
+              </a:schemeClr>
+            </a:solidFill>
+            <a:tailEnd type="none"/>
+          </a:ln>
+        </p:spPr>
+        <p:style>
+          <a:lnRef idx="1">
+            <a:schemeClr val="accent1"/>
+          </a:lnRef>
+          <a:fillRef idx="0">
+            <a:schemeClr val="accent1"/>
+          </a:fillRef>
+          <a:effectRef idx="0">
+            <a:schemeClr val="accent1"/>
+          </a:effectRef>
+          <a:fontRef idx="minor">
+            <a:schemeClr val="tx1"/>
+          </a:fontRef>
+        </p:style>
+      </p:cxnSp>
+      <p:cxnSp>
+        <p:nvCxnSpPr>
+          <p:cNvPr id="31" name="Straight Arrow Connector 30">
+            <a:extLst>
+              <a:ext uri="{FF2B5EF4-FFF2-40B4-BE49-F238E27FC236}">
+                <a16:creationId xmlns:a16="http://schemas.microsoft.com/office/drawing/2014/main" id="{6F6EB244-A7B0-B645-B012-C7F92E43D308}"/>
+              </a:ext>
+            </a:extLst>
+          </p:cNvPr>
+          <p:cNvCxnSpPr>
+            <a:cxnSpLocks/>
+          </p:cNvCxnSpPr>
+          <p:nvPr/>
+        </p:nvCxnSpPr>
+        <p:spPr>
+          <a:xfrm flipH="1">
+            <a:off x="4737975" y="2446217"/>
+            <a:ext cx="2716047" cy="0"/>
+          </a:xfrm>
+          <a:prstGeom prst="straightConnector1">
+            <a:avLst/>
+          </a:prstGeom>
+          <a:ln w="31750">
+            <a:gradFill>
+              <a:gsLst>
+                <a:gs pos="49000">
+                  <a:schemeClr val="bg1"/>
+                </a:gs>
+                <a:gs pos="0">
+                  <a:srgbClr val="B70703"/>
+                </a:gs>
+                <a:gs pos="100000">
+                  <a:srgbClr val="B70703"/>
+                </a:gs>
+              </a:gsLst>
+              <a:lin ang="0" scaled="0"/>
+            </a:gradFill>
+            <a:tailEnd type="none"/>
+          </a:ln>
+        </p:spPr>
+        <p:style>
+          <a:lnRef idx="1">
+            <a:schemeClr val="accent1"/>
+          </a:lnRef>
+          <a:fillRef idx="0">
+            <a:schemeClr val="accent1"/>
+          </a:fillRef>
+          <a:effectRef idx="0">
+            <a:schemeClr val="accent1"/>
+          </a:effectRef>
+          <a:fontRef idx="minor">
+            <a:schemeClr val="tx1"/>
+          </a:fontRef>
+        </p:style>
+      </p:cxnSp>
+      <p:cxnSp>
+        <p:nvCxnSpPr>
+          <p:cNvPr id="32" name="Straight Arrow Connector 31">
+            <a:extLst>
+              <a:ext uri="{FF2B5EF4-FFF2-40B4-BE49-F238E27FC236}">
+                <a16:creationId xmlns:a16="http://schemas.microsoft.com/office/drawing/2014/main" id="{60FAE7CA-C26E-1C43-BACB-203469C347F9}"/>
+              </a:ext>
+            </a:extLst>
+          </p:cNvPr>
+          <p:cNvCxnSpPr>
+            <a:cxnSpLocks/>
+          </p:cNvCxnSpPr>
+          <p:nvPr/>
+        </p:nvCxnSpPr>
+        <p:spPr>
+          <a:xfrm flipH="1">
+            <a:off x="4726272" y="4110186"/>
+            <a:ext cx="2716047" cy="0"/>
+          </a:xfrm>
+          <a:prstGeom prst="straightConnector1">
+            <a:avLst/>
+          </a:prstGeom>
+          <a:ln w="31750">
+            <a:gradFill>
+              <a:gsLst>
+                <a:gs pos="49000">
+                  <a:schemeClr val="bg1"/>
+                </a:gs>
+                <a:gs pos="0">
+                  <a:srgbClr val="B70703"/>
+                </a:gs>
+                <a:gs pos="100000">
+                  <a:srgbClr val="B70703"/>
+                </a:gs>
+              </a:gsLst>
+              <a:lin ang="0" scaled="0"/>
+            </a:gradFill>
+            <a:tailEnd type="none"/>
+          </a:ln>
+        </p:spPr>
+        <p:style>
+          <a:lnRef idx="1">
+            <a:schemeClr val="accent1"/>
+          </a:lnRef>
+          <a:fillRef idx="0">
+            <a:schemeClr val="accent1"/>
+          </a:fillRef>
+          <a:effectRef idx="0">
+            <a:schemeClr val="accent1"/>
+          </a:effectRef>
+          <a:fontRef idx="minor">
+            <a:schemeClr val="tx1"/>
+          </a:fontRef>
+        </p:style>
+      </p:cxnSp>
+      <p:cxnSp>
+        <p:nvCxnSpPr>
+          <p:cNvPr id="33" name="Straight Arrow Connector 32">
+            <a:extLst>
+              <a:ext uri="{FF2B5EF4-FFF2-40B4-BE49-F238E27FC236}">
+                <a16:creationId xmlns:a16="http://schemas.microsoft.com/office/drawing/2014/main" id="{FD43408C-8FD1-2A45-BAFA-7C30E55C1B43}"/>
+              </a:ext>
+            </a:extLst>
+          </p:cNvPr>
+          <p:cNvCxnSpPr>
+            <a:cxnSpLocks/>
+            <a:stCxn id="45" idx="7"/>
+          </p:cNvCxnSpPr>
+          <p:nvPr/>
+        </p:nvCxnSpPr>
+        <p:spPr>
+          <a:xfrm flipV="1">
+            <a:off x="6480260" y="2876683"/>
+            <a:ext cx="2715768" cy="6437"/>
+          </a:xfrm>
+          <a:prstGeom prst="straightConnector1">
+            <a:avLst/>
+          </a:prstGeom>
+          <a:ln w="31750">
+            <a:gradFill>
+              <a:gsLst>
+                <a:gs pos="0">
+                  <a:schemeClr val="bg1"/>
+                </a:gs>
+                <a:gs pos="100000">
+                  <a:srgbClr val="B70703"/>
+                </a:gs>
+              </a:gsLst>
+              <a:lin ang="0" scaled="0"/>
+            </a:gradFill>
+            <a:tailEnd type="none"/>
+          </a:ln>
+        </p:spPr>
+        <p:style>
+          <a:lnRef idx="1">
+            <a:schemeClr val="accent1"/>
+          </a:lnRef>
+          <a:fillRef idx="0">
+            <a:schemeClr val="accent1"/>
+          </a:fillRef>
+          <a:effectRef idx="0">
+            <a:schemeClr val="accent1"/>
+          </a:effectRef>
+          <a:fontRef idx="minor">
+            <a:schemeClr val="tx1"/>
+          </a:fontRef>
+        </p:style>
+      </p:cxnSp>
+      <p:cxnSp>
+        <p:nvCxnSpPr>
+          <p:cNvPr id="36" name="Straight Arrow Connector 35">
+            <a:extLst>
+              <a:ext uri="{FF2B5EF4-FFF2-40B4-BE49-F238E27FC236}">
+                <a16:creationId xmlns:a16="http://schemas.microsoft.com/office/drawing/2014/main" id="{ED3C73B4-F988-764F-8F41-1E2C8D45CA10}"/>
+              </a:ext>
+            </a:extLst>
+          </p:cNvPr>
+          <p:cNvCxnSpPr>
+            <a:cxnSpLocks/>
+            <a:stCxn id="45" idx="5"/>
+          </p:cNvCxnSpPr>
+          <p:nvPr/>
+        </p:nvCxnSpPr>
+        <p:spPr>
+          <a:xfrm flipV="1">
+            <a:off x="6480260" y="3673284"/>
+            <a:ext cx="2715768" cy="1054"/>
+          </a:xfrm>
+          <a:prstGeom prst="straightConnector1">
+            <a:avLst/>
+          </a:prstGeom>
+          <a:ln w="31750">
+            <a:gradFill>
+              <a:gsLst>
+                <a:gs pos="0">
+                  <a:schemeClr val="bg1"/>
+                </a:gs>
+                <a:gs pos="100000">
+                  <a:srgbClr val="B70703"/>
+                </a:gs>
+              </a:gsLst>
+              <a:lin ang="0" scaled="0"/>
+            </a:gradFill>
+            <a:tailEnd type="none"/>
+          </a:ln>
+        </p:spPr>
+        <p:style>
+          <a:lnRef idx="1">
+            <a:schemeClr val="accent1"/>
+          </a:lnRef>
+          <a:fillRef idx="0">
+            <a:schemeClr val="accent1"/>
+          </a:fillRef>
+          <a:effectRef idx="0">
+            <a:schemeClr val="accent1"/>
+          </a:effectRef>
+          <a:fontRef idx="minor">
+            <a:schemeClr val="tx1"/>
+          </a:fontRef>
+        </p:style>
+      </p:cxnSp>
+      <p:sp>
+        <p:nvSpPr>
+          <p:cNvPr id="39" name="TextBox 38">
+            <a:extLst>
+              <a:ext uri="{FF2B5EF4-FFF2-40B4-BE49-F238E27FC236}">
+                <a16:creationId xmlns:a16="http://schemas.microsoft.com/office/drawing/2014/main" id="{2DE3CC12-59D6-9D49-9D9F-4D03B8689AA5}"/>
+              </a:ext>
+            </a:extLst>
+          </p:cNvPr>
+          <p:cNvSpPr txBox="1"/>
+          <p:nvPr/>
+        </p:nvSpPr>
+        <p:spPr>
+          <a:xfrm>
+            <a:off x="7083450" y="2507474"/>
+            <a:ext cx="1509388" cy="369332"/>
+          </a:xfrm>
+          <a:prstGeom prst="rect">
+            <a:avLst/>
+          </a:prstGeom>
+          <a:noFill/>
+          <a:effectLst>
+            <a:outerShdw blurRad="50800" dist="38100" dir="2700000" algn="tl" rotWithShape="0">
+              <a:prstClr val="black">
+                <a:alpha val="40000"/>
+              </a:prstClr>
+            </a:outerShdw>
+          </a:effectLst>
+        </p:spPr>
+        <p:txBody>
+          <a:bodyPr wrap="none" rtlCol="0">
+            <a:spAutoFit/>
+          </a:bodyPr>
+          <a:lstStyle/>
+          <a:p>
+            <a:r>
+              <a:rPr lang="en-US" dirty="0">
+                <a:gradFill>
+                  <a:gsLst>
+                    <a:gs pos="0">
+                      <a:schemeClr val="accent4">
+                        <a:lumMod val="20000"/>
+                        <a:lumOff val="80000"/>
+                      </a:schemeClr>
+                    </a:gs>
+                    <a:gs pos="99000">
+                      <a:schemeClr val="bg1"/>
+                    </a:gs>
+                  </a:gsLst>
+                  <a:lin ang="0" scaled="0"/>
+                </a:gradFill>
+                <a:effectLst>
+                  <a:outerShdw blurRad="50800" dist="38100" dir="2700000" algn="tl" rotWithShape="0">
+                    <a:schemeClr val="accent4">
+                      <a:lumMod val="75000"/>
+                      <a:alpha val="40000"/>
+                    </a:schemeClr>
+                  </a:outerShdw>
+                </a:effectLst>
+              </a:rPr>
+              <a:t>SLO validation</a:t>
+            </a:r>
+          </a:p>
+        </p:txBody>
+      </p:sp>
+      <p:sp>
+        <p:nvSpPr>
+          <p:cNvPr id="40" name="TextBox 39">
+            <a:extLst>
+              <a:ext uri="{FF2B5EF4-FFF2-40B4-BE49-F238E27FC236}">
+                <a16:creationId xmlns:a16="http://schemas.microsoft.com/office/drawing/2014/main" id="{242E5DE1-1E49-F44F-B81D-96319EC276E1}"/>
+              </a:ext>
+            </a:extLst>
+          </p:cNvPr>
+          <p:cNvSpPr txBox="1"/>
+          <p:nvPr/>
+        </p:nvSpPr>
+        <p:spPr>
+          <a:xfrm>
+            <a:off x="7868677" y="3278728"/>
+            <a:ext cx="1327351" cy="369332"/>
+          </a:xfrm>
+          <a:prstGeom prst="rect">
+            <a:avLst/>
+          </a:prstGeom>
+          <a:noFill/>
+          <a:effectLst>
+            <a:outerShdw blurRad="50800" dist="38100" dir="2700000" algn="tl" rotWithShape="0">
+              <a:prstClr val="black">
+                <a:alpha val="40000"/>
+              </a:prstClr>
+            </a:outerShdw>
+          </a:effectLst>
+        </p:spPr>
+        <p:txBody>
+          <a:bodyPr wrap="none" rtlCol="0">
+            <a:spAutoFit/>
+          </a:bodyPr>
+          <a:lstStyle/>
+          <a:p>
+            <a:r>
+              <a:rPr lang="en-US" dirty="0">
+                <a:gradFill>
+                  <a:gsLst>
+                    <a:gs pos="0">
+                      <a:schemeClr val="accent4">
+                        <a:lumMod val="40000"/>
+                        <a:lumOff val="60000"/>
+                      </a:schemeClr>
+                    </a:gs>
+                    <a:gs pos="99000">
+                      <a:schemeClr val="bg1"/>
+                    </a:gs>
+                  </a:gsLst>
+                  <a:lin ang="0" scaled="0"/>
+                </a:gradFill>
+                <a:effectLst>
+                  <a:outerShdw blurRad="50800" dist="38100" dir="2700000" algn="tl" rotWithShape="0">
+                    <a:schemeClr val="accent4">
+                      <a:lumMod val="75000"/>
+                      <a:alpha val="40000"/>
+                    </a:schemeClr>
+                  </a:outerShdw>
+                </a:effectLst>
+              </a:rPr>
+              <a:t>Load testing</a:t>
+            </a:r>
+          </a:p>
+        </p:txBody>
+      </p:sp>
+    </p:spTree>
+    <p:extLst>
+      <p:ext uri="{BB962C8B-B14F-4D97-AF65-F5344CB8AC3E}">
+        <p14:creationId xmlns:p14="http://schemas.microsoft.com/office/powerpoint/2010/main" val="1153916681"/>
+      </p:ext>
+    </p:extLst>
+  </p:cSld>
+  <p:clrMapOvr>
+    <a:masterClrMapping/>
+  </p:clrMapOvr>
+</p:sld>
+</file>
+
+<file path=ppt/slides/slide4.xml><?xml version="1.0" encoding="utf-8"?>
+<p:sld xmlns:a="http://schemas.openxmlformats.org/drawingml/2006/main" xmlns:r="http://schemas.openxmlformats.org/officeDocument/2006/relationships" xmlns:p="http://schemas.openxmlformats.org/presentationml/2006/main">
+  <p:cSld>
+    <p:spTree>
+      <p:nvGrpSpPr>
+        <p:cNvPr id="1" name=""/>
+        <p:cNvGrpSpPr/>
+        <p:nvPr/>
+      </p:nvGrpSpPr>
+      <p:grpSpPr>
+        <a:xfrm>
+          <a:off x="0" y="0"/>
+          <a:ext cx="0" cy="0"/>
+          <a:chOff x="0" y="0"/>
+          <a:chExt cx="0" cy="0"/>
+        </a:xfrm>
+      </p:grpSpPr>
+      <p:sp>
+        <p:nvSpPr>
+          <p:cNvPr id="45" name="Oval 44">
+            <a:extLst>
+              <a:ext uri="{FF2B5EF4-FFF2-40B4-BE49-F238E27FC236}">
+                <a16:creationId xmlns:a16="http://schemas.microsoft.com/office/drawing/2014/main" id="{7EA7BD02-DB63-9548-B6A6-786AF358FC92}"/>
+              </a:ext>
+            </a:extLst>
+          </p:cNvPr>
+          <p:cNvSpPr>
+            <a:spLocks noChangeAspect="1"/>
+          </p:cNvSpPr>
+          <p:nvPr/>
+        </p:nvSpPr>
+        <p:spPr>
+          <a:xfrm>
+            <a:off x="5528064" y="2719254"/>
+            <a:ext cx="1115568" cy="1118950"/>
+          </a:xfrm>
+          <a:prstGeom prst="ellipse">
+            <a:avLst/>
+          </a:prstGeom>
+          <a:solidFill>
+            <a:schemeClr val="bg1"/>
+          </a:solidFill>
+          <a:ln>
+            <a:solidFill>
+              <a:srgbClr val="C00000"/>
+            </a:solidFill>
+          </a:ln>
+          <a:effectLst>
+            <a:outerShdw blurRad="50800" dist="38100" dir="2700000" algn="tl" rotWithShape="0">
+              <a:prstClr val="black">
+                <a:alpha val="40000"/>
+              </a:prstClr>
+            </a:outerShdw>
+          </a:effectLst>
+        </p:spPr>
+        <p:style>
+          <a:lnRef idx="2">
+            <a:schemeClr val="accent1">
+              <a:shade val="50000"/>
+            </a:schemeClr>
+          </a:lnRef>
+          <a:fillRef idx="1">
+            <a:schemeClr val="accent1"/>
+          </a:fillRef>
+          <a:effectRef idx="0">
+            <a:schemeClr val="accent1"/>
+          </a:effectRef>
+          <a:fontRef idx="minor">
+            <a:schemeClr val="lt1"/>
+          </a:fontRef>
+        </p:style>
+        <p:txBody>
+          <a:bodyPr rtlCol="0" anchor="ctr"/>
+          <a:lstStyle/>
+          <a:p>
+            <a:pPr algn="ctr"/>
+            <a:endParaRPr lang="en-US" dirty="0"/>
+          </a:p>
+        </p:txBody>
+      </p:sp>
+      <p:pic>
+        <p:nvPicPr>
+          <p:cNvPr id="46" name="Graphic 45">
+            <a:extLst>
+              <a:ext uri="{FF2B5EF4-FFF2-40B4-BE49-F238E27FC236}">
+                <a16:creationId xmlns:a16="http://schemas.microsoft.com/office/drawing/2014/main" id="{DB0AF4BA-07A2-6344-A68F-2AF45ACD2045}"/>
+              </a:ext>
+            </a:extLst>
+          </p:cNvPr>
+          <p:cNvPicPr>
+            <a:picLocks noChangeAspect="1"/>
+          </p:cNvPicPr>
+          <p:nvPr/>
+        </p:nvPicPr>
+        <p:blipFill>
+          <a:blip r:embed="rId3">
+            <a:extLst>
+              <a:ext uri="{96DAC541-7B7A-43D3-8B79-37D633B846F1}">
+                <asvg:svgBlip xmlns:asvg="http://schemas.microsoft.com/office/drawing/2016/SVG/main" r:embed="rId4"/>
+              </a:ext>
+            </a:extLst>
+          </a:blip>
+          <a:stretch>
+            <a:fillRect/>
+          </a:stretch>
+        </p:blipFill>
+        <p:spPr>
+          <a:xfrm>
+            <a:off x="5711261" y="2892139"/>
+            <a:ext cx="746070" cy="746070"/>
+          </a:xfrm>
+          <a:prstGeom prst="rect">
+            <a:avLst/>
+          </a:prstGeom>
+          <a:effectLst>
+            <a:outerShdw blurRad="50800" dist="50800" dir="5400000" algn="ctr" rotWithShape="0">
+              <a:srgbClr val="000000">
+                <a:alpha val="93000"/>
+              </a:srgbClr>
+            </a:outerShdw>
+          </a:effectLst>
+        </p:spPr>
+      </p:pic>
+      <p:cxnSp>
+        <p:nvCxnSpPr>
+          <p:cNvPr id="78" name="Straight Arrow Connector 77">
+            <a:extLst>
+              <a:ext uri="{FF2B5EF4-FFF2-40B4-BE49-F238E27FC236}">
+                <a16:creationId xmlns:a16="http://schemas.microsoft.com/office/drawing/2014/main" id="{0442ED27-3243-AE4E-ADAC-0122C7D2199B}"/>
+              </a:ext>
+            </a:extLst>
+          </p:cNvPr>
+          <p:cNvCxnSpPr>
+            <a:cxnSpLocks/>
+            <a:stCxn id="45" idx="1"/>
+          </p:cNvCxnSpPr>
+          <p:nvPr/>
+        </p:nvCxnSpPr>
+        <p:spPr>
+          <a:xfrm flipH="1">
+            <a:off x="2975388" y="2883120"/>
+            <a:ext cx="2716047" cy="0"/>
+          </a:xfrm>
+          <a:prstGeom prst="straightConnector1">
+            <a:avLst/>
+          </a:prstGeom>
+          <a:ln w="31750">
+            <a:gradFill>
+              <a:gsLst>
+                <a:gs pos="0">
+                  <a:schemeClr val="bg1"/>
+                </a:gs>
+                <a:gs pos="100000">
+                  <a:srgbClr val="B70703"/>
+                </a:gs>
+              </a:gsLst>
+              <a:lin ang="0" scaled="0"/>
+            </a:gradFill>
+            <a:tailEnd type="none"/>
+          </a:ln>
+        </p:spPr>
+        <p:style>
+          <a:lnRef idx="1">
+            <a:schemeClr val="accent1"/>
+          </a:lnRef>
+          <a:fillRef idx="0">
+            <a:schemeClr val="accent1"/>
+          </a:fillRef>
+          <a:effectRef idx="0">
+            <a:schemeClr val="accent1"/>
+          </a:effectRef>
+          <a:fontRef idx="minor">
+            <a:schemeClr val="tx1"/>
+          </a:fontRef>
+        </p:style>
+      </p:cxnSp>
+      <p:sp>
+        <p:nvSpPr>
+          <p:cNvPr id="26" name="TextBox 25">
+            <a:extLst>
+              <a:ext uri="{FF2B5EF4-FFF2-40B4-BE49-F238E27FC236}">
+                <a16:creationId xmlns:a16="http://schemas.microsoft.com/office/drawing/2014/main" id="{00B0B6B7-226E-954C-98D8-33134757394E}"/>
+              </a:ext>
+            </a:extLst>
+          </p:cNvPr>
+          <p:cNvSpPr txBox="1"/>
+          <p:nvPr/>
+        </p:nvSpPr>
+        <p:spPr>
+          <a:xfrm>
+            <a:off x="5085881" y="2083323"/>
+            <a:ext cx="2020233" cy="369332"/>
+          </a:xfrm>
+          <a:prstGeom prst="rect">
+            <a:avLst/>
+          </a:prstGeom>
+          <a:noFill/>
+          <a:effectLst>
+            <a:outerShdw blurRad="50800" dist="38100" dir="2700000" algn="tl" rotWithShape="0">
+              <a:prstClr val="black">
+                <a:alpha val="40000"/>
+              </a:prstClr>
+            </a:outerShdw>
+          </a:effectLst>
+        </p:spPr>
+        <p:txBody>
+          <a:bodyPr wrap="none" rtlCol="0">
+            <a:spAutoFit/>
+          </a:bodyPr>
+          <a:lstStyle/>
+          <a:p>
+            <a:r>
+              <a:rPr lang="en-US" dirty="0">
+                <a:gradFill>
+                  <a:gsLst>
+                    <a:gs pos="0">
+                      <a:schemeClr val="accent4">
+                        <a:lumMod val="20000"/>
+                        <a:lumOff val="80000"/>
+                      </a:schemeClr>
+                    </a:gs>
+                    <a:gs pos="99000">
+                      <a:schemeClr val="bg1"/>
+                    </a:gs>
+                  </a:gsLst>
+                  <a:lin ang="0" scaled="0"/>
+                </a:gradFill>
+                <a:effectLst>
+                  <a:outerShdw blurRad="50800" dist="38100" dir="2700000" algn="tl" rotWithShape="0">
+                    <a:schemeClr val="accent4">
+                      <a:lumMod val="75000"/>
+                      <a:alpha val="40000"/>
+                    </a:schemeClr>
+                  </a:outerShdw>
+                </a:effectLst>
+              </a:rPr>
+              <a:t>Progressive rollouts</a:t>
+            </a:r>
+          </a:p>
+        </p:txBody>
+      </p:sp>
+      <p:sp>
+        <p:nvSpPr>
+          <p:cNvPr id="84" name="TextBox 83">
+            <a:extLst>
+              <a:ext uri="{FF2B5EF4-FFF2-40B4-BE49-F238E27FC236}">
+                <a16:creationId xmlns:a16="http://schemas.microsoft.com/office/drawing/2014/main" id="{4F6B134A-27C2-A744-BDF7-EB488EF3E173}"/>
+              </a:ext>
+            </a:extLst>
+          </p:cNvPr>
+          <p:cNvSpPr txBox="1"/>
+          <p:nvPr/>
+        </p:nvSpPr>
+        <p:spPr>
+          <a:xfrm>
+            <a:off x="2975388" y="3300409"/>
+            <a:ext cx="1442767" cy="369332"/>
+          </a:xfrm>
+          <a:prstGeom prst="rect">
+            <a:avLst/>
+          </a:prstGeom>
+          <a:noFill/>
+          <a:effectLst>
+            <a:outerShdw blurRad="50800" dist="38100" dir="2700000" algn="tl" rotWithShape="0">
+              <a:prstClr val="black">
+                <a:alpha val="40000"/>
+              </a:prstClr>
+            </a:outerShdw>
+          </a:effectLst>
+        </p:spPr>
+        <p:txBody>
+          <a:bodyPr wrap="none" rtlCol="0">
+            <a:spAutoFit/>
+          </a:bodyPr>
+          <a:lstStyle/>
+          <a:p>
+            <a:r>
+              <a:rPr lang="en-US" dirty="0">
+                <a:gradFill>
+                  <a:gsLst>
+                    <a:gs pos="0">
+                      <a:schemeClr val="accent4">
+                        <a:lumMod val="40000"/>
+                        <a:lumOff val="60000"/>
+                      </a:schemeClr>
+                    </a:gs>
+                    <a:gs pos="99000">
+                      <a:schemeClr val="bg1"/>
+                    </a:gs>
+                  </a:gsLst>
+                  <a:lin ang="0" scaled="0"/>
+                </a:gradFill>
+                <a:effectLst>
+                  <a:outerShdw blurRad="50800" dist="38100" dir="2700000" algn="tl" rotWithShape="0">
+                    <a:schemeClr val="accent4">
+                      <a:lumMod val="75000"/>
+                      <a:alpha val="40000"/>
+                    </a:schemeClr>
+                  </a:outerShdw>
+                </a:effectLst>
+              </a:rPr>
+              <a:t>Chaos testing</a:t>
+            </a:r>
+          </a:p>
+        </p:txBody>
+      </p:sp>
+      <p:sp>
+        <p:nvSpPr>
+          <p:cNvPr id="86" name="TextBox 85">
+            <a:extLst>
+              <a:ext uri="{FF2B5EF4-FFF2-40B4-BE49-F238E27FC236}">
+                <a16:creationId xmlns:a16="http://schemas.microsoft.com/office/drawing/2014/main" id="{3AF42E4E-4F2B-3444-9D30-D6A138BC1321}"/>
+              </a:ext>
+            </a:extLst>
+          </p:cNvPr>
+          <p:cNvSpPr txBox="1"/>
+          <p:nvPr/>
+        </p:nvSpPr>
+        <p:spPr>
+          <a:xfrm>
+            <a:off x="4180023" y="4141054"/>
+            <a:ext cx="3808543" cy="369332"/>
+          </a:xfrm>
+          <a:prstGeom prst="rect">
+            <a:avLst/>
+          </a:prstGeom>
+          <a:noFill/>
+          <a:effectLst>
+            <a:outerShdw blurRad="50800" dist="38100" dir="2700000" algn="tl" rotWithShape="0">
+              <a:prstClr val="black">
+                <a:alpha val="40000"/>
+              </a:prstClr>
+            </a:outerShdw>
+          </a:effectLst>
+        </p:spPr>
+        <p:txBody>
+          <a:bodyPr wrap="none" rtlCol="0">
+            <a:spAutoFit/>
+          </a:bodyPr>
+          <a:lstStyle/>
+          <a:p>
+            <a:r>
+              <a:rPr lang="en-US" dirty="0">
+                <a:gradFill>
+                  <a:gsLst>
+                    <a:gs pos="0">
+                      <a:schemeClr val="bg1"/>
+                    </a:gs>
+                    <a:gs pos="98000">
+                      <a:schemeClr val="accent4">
+                        <a:lumMod val="40000"/>
+                        <a:lumOff val="60000"/>
+                      </a:schemeClr>
+                    </a:gs>
+                  </a:gsLst>
+                  <a:lin ang="0" scaled="0"/>
+                </a:gradFill>
+                <a:effectLst>
+                  <a:outerShdw blurRad="50800" dist="38100" dir="2700000" algn="tl" rotWithShape="0">
+                    <a:schemeClr val="accent4">
+                      <a:lumMod val="75000"/>
+                      <a:alpha val="40000"/>
+                    </a:schemeClr>
+                  </a:outerShdw>
+                </a:effectLst>
+              </a:rPr>
+              <a:t>State-of-the-art AI &amp; statistical analysis</a:t>
+            </a:r>
+          </a:p>
+        </p:txBody>
+      </p:sp>
+      <p:sp>
+        <p:nvSpPr>
+          <p:cNvPr id="87" name="TextBox 86">
+            <a:extLst>
+              <a:ext uri="{FF2B5EF4-FFF2-40B4-BE49-F238E27FC236}">
+                <a16:creationId xmlns:a16="http://schemas.microsoft.com/office/drawing/2014/main" id="{A14FFCA2-5CA7-AC47-8DEE-26F0528D2DA1}"/>
+              </a:ext>
+            </a:extLst>
+          </p:cNvPr>
+          <p:cNvSpPr txBox="1"/>
+          <p:nvPr/>
+        </p:nvSpPr>
+        <p:spPr>
+          <a:xfrm>
+            <a:off x="3545503" y="2480564"/>
+            <a:ext cx="1575816" cy="369332"/>
+          </a:xfrm>
+          <a:prstGeom prst="rect">
+            <a:avLst/>
+          </a:prstGeom>
+          <a:noFill/>
+          <a:effectLst>
+            <a:outerShdw blurRad="50800" dist="38100" dir="2700000" algn="tl" rotWithShape="0">
+              <a:prstClr val="black">
+                <a:alpha val="40000"/>
+              </a:prstClr>
+            </a:outerShdw>
+          </a:effectLst>
+        </p:spPr>
+        <p:txBody>
+          <a:bodyPr wrap="none" rtlCol="0">
+            <a:spAutoFit/>
+          </a:bodyPr>
+          <a:lstStyle/>
+          <a:p>
+            <a:r>
+              <a:rPr lang="en-US" dirty="0">
+                <a:gradFill>
+                  <a:gsLst>
+                    <a:gs pos="0">
+                      <a:schemeClr val="accent4">
+                        <a:lumMod val="20000"/>
+                        <a:lumOff val="80000"/>
+                      </a:schemeClr>
+                    </a:gs>
+                    <a:gs pos="99000">
+                      <a:schemeClr val="bg1"/>
+                    </a:gs>
+                  </a:gsLst>
+                  <a:lin ang="0" scaled="0"/>
+                </a:gradFill>
+                <a:effectLst>
+                  <a:outerShdw blurRad="50800" dist="38100" dir="2700000" algn="tl" rotWithShape="0">
+                    <a:schemeClr val="accent4">
+                      <a:lumMod val="75000"/>
+                      <a:alpha val="40000"/>
+                    </a:schemeClr>
+                  </a:outerShdw>
+                </a:effectLst>
+              </a:rPr>
+              <a:t>A/B(/n) testing</a:t>
+            </a:r>
+          </a:p>
+        </p:txBody>
+      </p:sp>
+      <p:cxnSp>
+        <p:nvCxnSpPr>
+          <p:cNvPr id="24" name="Straight Arrow Connector 23">
+            <a:extLst>
+              <a:ext uri="{FF2B5EF4-FFF2-40B4-BE49-F238E27FC236}">
+                <a16:creationId xmlns:a16="http://schemas.microsoft.com/office/drawing/2014/main" id="{B9D26F47-5E45-C548-8703-049CCF161E69}"/>
+              </a:ext>
+            </a:extLst>
+          </p:cNvPr>
+          <p:cNvCxnSpPr>
+            <a:cxnSpLocks/>
+            <a:stCxn id="45" idx="3"/>
+          </p:cNvCxnSpPr>
+          <p:nvPr/>
+        </p:nvCxnSpPr>
+        <p:spPr>
+          <a:xfrm flipH="1">
+            <a:off x="2975388" y="3674338"/>
+            <a:ext cx="2716047" cy="0"/>
+          </a:xfrm>
+          <a:prstGeom prst="straightConnector1">
+            <a:avLst/>
+          </a:prstGeom>
+          <a:ln w="31750">
+            <a:gradFill>
+              <a:gsLst>
+                <a:gs pos="0">
+                  <a:schemeClr val="bg1"/>
+                </a:gs>
+                <a:gs pos="100000">
+                  <a:srgbClr val="B70703"/>
+                </a:gs>
+              </a:gsLst>
+              <a:lin ang="0" scaled="0"/>
+            </a:gradFill>
+            <a:tailEnd type="none"/>
+          </a:ln>
+        </p:spPr>
+        <p:style>
+          <a:lnRef idx="1">
+            <a:schemeClr val="accent1"/>
+          </a:lnRef>
+          <a:fillRef idx="0">
+            <a:schemeClr val="accent1"/>
+          </a:fillRef>
+          <a:effectRef idx="0">
+            <a:schemeClr val="accent1"/>
+          </a:effectRef>
+          <a:fontRef idx="minor">
+            <a:schemeClr val="tx1"/>
+          </a:fontRef>
+        </p:style>
+      </p:cxnSp>
+      <p:cxnSp>
+        <p:nvCxnSpPr>
+          <p:cNvPr id="27" name="Straight Arrow Connector 26">
+            <a:extLst>
+              <a:ext uri="{FF2B5EF4-FFF2-40B4-BE49-F238E27FC236}">
+                <a16:creationId xmlns:a16="http://schemas.microsoft.com/office/drawing/2014/main" id="{5330E225-5DC0-6D4C-83F4-B6F53FA58B81}"/>
+              </a:ext>
+            </a:extLst>
+          </p:cNvPr>
+          <p:cNvCxnSpPr>
+            <a:cxnSpLocks/>
+            <a:stCxn id="45" idx="4"/>
+          </p:cNvCxnSpPr>
+          <p:nvPr/>
+        </p:nvCxnSpPr>
+        <p:spPr>
+          <a:xfrm flipH="1">
+            <a:off x="6084296" y="3838204"/>
+            <a:ext cx="1552" cy="258910"/>
+          </a:xfrm>
+          <a:prstGeom prst="straightConnector1">
+            <a:avLst/>
+          </a:prstGeom>
+          <a:ln w="31750">
+            <a:solidFill>
+              <a:schemeClr val="lt1">
+                <a:hueOff val="0"/>
+                <a:satOff val="0"/>
+                <a:lumOff val="0"/>
+              </a:schemeClr>
+            </a:solidFill>
+            <a:tailEnd type="none"/>
+          </a:ln>
+        </p:spPr>
+        <p:style>
+          <a:lnRef idx="1">
+            <a:schemeClr val="accent1"/>
+          </a:lnRef>
+          <a:fillRef idx="0">
+            <a:schemeClr val="accent1"/>
+          </a:fillRef>
+          <a:effectRef idx="0">
+            <a:schemeClr val="accent1"/>
+          </a:effectRef>
+          <a:fontRef idx="minor">
+            <a:schemeClr val="tx1"/>
+          </a:fontRef>
+        </p:style>
+      </p:cxnSp>
+      <p:cxnSp>
+        <p:nvCxnSpPr>
+          <p:cNvPr id="30" name="Straight Arrow Connector 29">
+            <a:extLst>
+              <a:ext uri="{FF2B5EF4-FFF2-40B4-BE49-F238E27FC236}">
+                <a16:creationId xmlns:a16="http://schemas.microsoft.com/office/drawing/2014/main" id="{7046775E-C39B-3444-98D7-1861DFAD2629}"/>
+              </a:ext>
+            </a:extLst>
+          </p:cNvPr>
+          <p:cNvCxnSpPr>
+            <a:cxnSpLocks/>
+          </p:cNvCxnSpPr>
+          <p:nvPr/>
+        </p:nvCxnSpPr>
+        <p:spPr>
+          <a:xfrm flipH="1">
+            <a:off x="6095999" y="2469809"/>
+            <a:ext cx="1552" cy="258910"/>
+          </a:xfrm>
+          <a:prstGeom prst="straightConnector1">
+            <a:avLst/>
+          </a:prstGeom>
+          <a:ln w="31750">
+            <a:solidFill>
+              <a:schemeClr val="lt1">
+                <a:hueOff val="0"/>
+                <a:satOff val="0"/>
+                <a:lumOff val="0"/>
+              </a:schemeClr>
+            </a:solidFill>
+            <a:tailEnd type="none"/>
+          </a:ln>
+        </p:spPr>
+        <p:style>
+          <a:lnRef idx="1">
+            <a:schemeClr val="accent1"/>
+          </a:lnRef>
+          <a:fillRef idx="0">
+            <a:schemeClr val="accent1"/>
+          </a:fillRef>
+          <a:effectRef idx="0">
+            <a:schemeClr val="accent1"/>
+          </a:effectRef>
+          <a:fontRef idx="minor">
+            <a:schemeClr val="tx1"/>
+          </a:fontRef>
+        </p:style>
+      </p:cxnSp>
+      <p:cxnSp>
+        <p:nvCxnSpPr>
+          <p:cNvPr id="31" name="Straight Arrow Connector 30">
+            <a:extLst>
+              <a:ext uri="{FF2B5EF4-FFF2-40B4-BE49-F238E27FC236}">
+                <a16:creationId xmlns:a16="http://schemas.microsoft.com/office/drawing/2014/main" id="{6F6EB244-A7B0-B645-B012-C7F92E43D308}"/>
+              </a:ext>
+            </a:extLst>
+          </p:cNvPr>
+          <p:cNvCxnSpPr>
+            <a:cxnSpLocks/>
+          </p:cNvCxnSpPr>
+          <p:nvPr/>
+        </p:nvCxnSpPr>
+        <p:spPr>
+          <a:xfrm flipH="1">
+            <a:off x="4737975" y="2446217"/>
+            <a:ext cx="2716047" cy="0"/>
+          </a:xfrm>
+          <a:prstGeom prst="straightConnector1">
+            <a:avLst/>
+          </a:prstGeom>
+          <a:ln w="31750">
+            <a:gradFill>
+              <a:gsLst>
+                <a:gs pos="49000">
+                  <a:schemeClr val="bg1"/>
+                </a:gs>
+                <a:gs pos="0">
+                  <a:srgbClr val="B70703"/>
+                </a:gs>
+                <a:gs pos="100000">
+                  <a:srgbClr val="B70703"/>
+                </a:gs>
+              </a:gsLst>
+              <a:lin ang="0" scaled="0"/>
+            </a:gradFill>
+            <a:tailEnd type="none"/>
+          </a:ln>
+        </p:spPr>
+        <p:style>
+          <a:lnRef idx="1">
+            <a:schemeClr val="accent1"/>
+          </a:lnRef>
+          <a:fillRef idx="0">
+            <a:schemeClr val="accent1"/>
+          </a:fillRef>
+          <a:effectRef idx="0">
+            <a:schemeClr val="accent1"/>
+          </a:effectRef>
+          <a:fontRef idx="minor">
+            <a:schemeClr val="tx1"/>
+          </a:fontRef>
+        </p:style>
+      </p:cxnSp>
+      <p:cxnSp>
+        <p:nvCxnSpPr>
+          <p:cNvPr id="32" name="Straight Arrow Connector 31">
+            <a:extLst>
+              <a:ext uri="{FF2B5EF4-FFF2-40B4-BE49-F238E27FC236}">
+                <a16:creationId xmlns:a16="http://schemas.microsoft.com/office/drawing/2014/main" id="{60FAE7CA-C26E-1C43-BACB-203469C347F9}"/>
+              </a:ext>
+            </a:extLst>
+          </p:cNvPr>
+          <p:cNvCxnSpPr>
+            <a:cxnSpLocks/>
+          </p:cNvCxnSpPr>
+          <p:nvPr/>
+        </p:nvCxnSpPr>
+        <p:spPr>
+          <a:xfrm flipH="1">
+            <a:off x="4726272" y="4110186"/>
+            <a:ext cx="2716047" cy="0"/>
+          </a:xfrm>
+          <a:prstGeom prst="straightConnector1">
+            <a:avLst/>
+          </a:prstGeom>
+          <a:ln w="31750">
+            <a:gradFill>
+              <a:gsLst>
+                <a:gs pos="49000">
+                  <a:schemeClr val="bg1"/>
+                </a:gs>
+                <a:gs pos="0">
+                  <a:srgbClr val="B70703"/>
+                </a:gs>
+                <a:gs pos="100000">
+                  <a:srgbClr val="B70703"/>
+                </a:gs>
+              </a:gsLst>
+              <a:lin ang="0" scaled="0"/>
+            </a:gradFill>
+            <a:tailEnd type="none"/>
+          </a:ln>
+        </p:spPr>
+        <p:style>
+          <a:lnRef idx="1">
+            <a:schemeClr val="accent1"/>
+          </a:lnRef>
+          <a:fillRef idx="0">
+            <a:schemeClr val="accent1"/>
+          </a:fillRef>
+          <a:effectRef idx="0">
+            <a:schemeClr val="accent1"/>
+          </a:effectRef>
+          <a:fontRef idx="minor">
+            <a:schemeClr val="tx1"/>
+          </a:fontRef>
+        </p:style>
+      </p:cxnSp>
+      <p:cxnSp>
+        <p:nvCxnSpPr>
+          <p:cNvPr id="33" name="Straight Arrow Connector 32">
+            <a:extLst>
+              <a:ext uri="{FF2B5EF4-FFF2-40B4-BE49-F238E27FC236}">
+                <a16:creationId xmlns:a16="http://schemas.microsoft.com/office/drawing/2014/main" id="{FD43408C-8FD1-2A45-BAFA-7C30E55C1B43}"/>
+              </a:ext>
+            </a:extLst>
+          </p:cNvPr>
+          <p:cNvCxnSpPr>
+            <a:cxnSpLocks/>
+            <a:stCxn id="45" idx="7"/>
+          </p:cNvCxnSpPr>
+          <p:nvPr/>
+        </p:nvCxnSpPr>
+        <p:spPr>
+          <a:xfrm flipV="1">
+            <a:off x="6480260" y="2876683"/>
+            <a:ext cx="2715768" cy="6437"/>
+          </a:xfrm>
+          <a:prstGeom prst="straightConnector1">
+            <a:avLst/>
+          </a:prstGeom>
+          <a:ln w="31750">
+            <a:gradFill>
+              <a:gsLst>
+                <a:gs pos="0">
+                  <a:schemeClr val="bg1"/>
+                </a:gs>
+                <a:gs pos="100000">
+                  <a:srgbClr val="B70703"/>
+                </a:gs>
+              </a:gsLst>
+              <a:lin ang="0" scaled="0"/>
+            </a:gradFill>
+            <a:tailEnd type="none"/>
+          </a:ln>
+        </p:spPr>
+        <p:style>
+          <a:lnRef idx="1">
+            <a:schemeClr val="accent1"/>
+          </a:lnRef>
+          <a:fillRef idx="0">
+            <a:schemeClr val="accent1"/>
+          </a:fillRef>
+          <a:effectRef idx="0">
+            <a:schemeClr val="accent1"/>
+          </a:effectRef>
+          <a:fontRef idx="minor">
+            <a:schemeClr val="tx1"/>
+          </a:fontRef>
+        </p:style>
+      </p:cxnSp>
+      <p:cxnSp>
+        <p:nvCxnSpPr>
+          <p:cNvPr id="36" name="Straight Arrow Connector 35">
+            <a:extLst>
+              <a:ext uri="{FF2B5EF4-FFF2-40B4-BE49-F238E27FC236}">
+                <a16:creationId xmlns:a16="http://schemas.microsoft.com/office/drawing/2014/main" id="{ED3C73B4-F988-764F-8F41-1E2C8D45CA10}"/>
+              </a:ext>
+            </a:extLst>
+          </p:cNvPr>
+          <p:cNvCxnSpPr>
+            <a:cxnSpLocks/>
+            <a:stCxn id="45" idx="5"/>
+          </p:cNvCxnSpPr>
+          <p:nvPr/>
+        </p:nvCxnSpPr>
+        <p:spPr>
+          <a:xfrm flipV="1">
+            <a:off x="6480260" y="3673284"/>
+            <a:ext cx="2715768" cy="1054"/>
+          </a:xfrm>
+          <a:prstGeom prst="straightConnector1">
+            <a:avLst/>
+          </a:prstGeom>
+          <a:ln w="31750">
+            <a:gradFill>
+              <a:gsLst>
+                <a:gs pos="0">
+                  <a:schemeClr val="bg1"/>
+                </a:gs>
+                <a:gs pos="100000">
+                  <a:srgbClr val="B70703"/>
+                </a:gs>
+              </a:gsLst>
+              <a:lin ang="0" scaled="0"/>
+            </a:gradFill>
+            <a:tailEnd type="none"/>
+          </a:ln>
+        </p:spPr>
+        <p:style>
+          <a:lnRef idx="1">
+            <a:schemeClr val="accent1"/>
+          </a:lnRef>
+          <a:fillRef idx="0">
+            <a:schemeClr val="accent1"/>
+          </a:fillRef>
+          <a:effectRef idx="0">
+            <a:schemeClr val="accent1"/>
+          </a:effectRef>
+          <a:fontRef idx="minor">
+            <a:schemeClr val="tx1"/>
+          </a:fontRef>
+        </p:style>
+      </p:cxnSp>
+      <p:sp>
+        <p:nvSpPr>
+          <p:cNvPr id="39" name="TextBox 38">
+            <a:extLst>
+              <a:ext uri="{FF2B5EF4-FFF2-40B4-BE49-F238E27FC236}">
+                <a16:creationId xmlns:a16="http://schemas.microsoft.com/office/drawing/2014/main" id="{2DE3CC12-59D6-9D49-9D9F-4D03B8689AA5}"/>
+              </a:ext>
+            </a:extLst>
+          </p:cNvPr>
+          <p:cNvSpPr txBox="1"/>
+          <p:nvPr/>
+        </p:nvSpPr>
+        <p:spPr>
+          <a:xfrm>
+            <a:off x="7083450" y="2507474"/>
+            <a:ext cx="1509388" cy="369332"/>
+          </a:xfrm>
+          <a:prstGeom prst="rect">
+            <a:avLst/>
+          </a:prstGeom>
+          <a:noFill/>
+          <a:effectLst>
+            <a:outerShdw blurRad="50800" dist="38100" dir="2700000" algn="tl" rotWithShape="0">
+              <a:prstClr val="black">
+                <a:alpha val="40000"/>
+              </a:prstClr>
+            </a:outerShdw>
+          </a:effectLst>
+        </p:spPr>
+        <p:txBody>
+          <a:bodyPr wrap="none" rtlCol="0">
+            <a:spAutoFit/>
+          </a:bodyPr>
+          <a:lstStyle/>
+          <a:p>
+            <a:r>
+              <a:rPr lang="en-US" dirty="0">
+                <a:gradFill>
+                  <a:gsLst>
+                    <a:gs pos="0">
+                      <a:schemeClr val="accent4">
+                        <a:lumMod val="20000"/>
+                        <a:lumOff val="80000"/>
+                      </a:schemeClr>
+                    </a:gs>
+                    <a:gs pos="99000">
+                      <a:schemeClr val="bg1"/>
+                    </a:gs>
+                  </a:gsLst>
+                  <a:lin ang="0" scaled="0"/>
+                </a:gradFill>
+                <a:effectLst>
+                  <a:outerShdw blurRad="50800" dist="38100" dir="2700000" algn="tl" rotWithShape="0">
+                    <a:schemeClr val="accent4">
+                      <a:lumMod val="75000"/>
+                      <a:alpha val="40000"/>
+                    </a:schemeClr>
+                  </a:outerShdw>
+                </a:effectLst>
+              </a:rPr>
+              <a:t>SLO validation</a:t>
+            </a:r>
+          </a:p>
+        </p:txBody>
+      </p:sp>
+      <p:sp>
+        <p:nvSpPr>
+          <p:cNvPr id="40" name="TextBox 39">
+            <a:extLst>
+              <a:ext uri="{FF2B5EF4-FFF2-40B4-BE49-F238E27FC236}">
+                <a16:creationId xmlns:a16="http://schemas.microsoft.com/office/drawing/2014/main" id="{242E5DE1-1E49-F44F-B81D-96319EC276E1}"/>
+              </a:ext>
+            </a:extLst>
+          </p:cNvPr>
+          <p:cNvSpPr txBox="1"/>
+          <p:nvPr/>
+        </p:nvSpPr>
+        <p:spPr>
+          <a:xfrm>
+            <a:off x="7868677" y="3278728"/>
+            <a:ext cx="1327351" cy="369332"/>
+          </a:xfrm>
+          <a:prstGeom prst="rect">
+            <a:avLst/>
+          </a:prstGeom>
+          <a:noFill/>
+          <a:effectLst>
+            <a:outerShdw blurRad="50800" dist="38100" dir="2700000" algn="tl" rotWithShape="0">
+              <a:prstClr val="black">
+                <a:alpha val="40000"/>
+              </a:prstClr>
+            </a:outerShdw>
+          </a:effectLst>
+        </p:spPr>
+        <p:txBody>
+          <a:bodyPr wrap="none" rtlCol="0">
+            <a:spAutoFit/>
+          </a:bodyPr>
+          <a:lstStyle/>
+          <a:p>
+            <a:r>
+              <a:rPr lang="en-US" dirty="0">
+                <a:gradFill>
+                  <a:gsLst>
+                    <a:gs pos="0">
+                      <a:schemeClr val="accent4">
+                        <a:lumMod val="40000"/>
+                        <a:lumOff val="60000"/>
+                      </a:schemeClr>
+                    </a:gs>
+                    <a:gs pos="99000">
+                      <a:schemeClr val="bg1"/>
+                    </a:gs>
+                  </a:gsLst>
+                  <a:lin ang="0" scaled="0"/>
+                </a:gradFill>
+                <a:effectLst>
+                  <a:outerShdw blurRad="50800" dist="38100" dir="2700000" algn="tl" rotWithShape="0">
+                    <a:schemeClr val="accent4">
+                      <a:lumMod val="75000"/>
+                      <a:alpha val="40000"/>
+                    </a:schemeClr>
+                  </a:outerShdw>
+                </a:effectLst>
+              </a:rPr>
+              <a:t>Load testing</a:t>
+            </a:r>
+          </a:p>
+        </p:txBody>
+      </p:sp>
+    </p:spTree>
+    <p:extLst>
+      <p:ext uri="{BB962C8B-B14F-4D97-AF65-F5344CB8AC3E}">
+        <p14:creationId xmlns:p14="http://schemas.microsoft.com/office/powerpoint/2010/main" val="1325324565"/>
+      </p:ext>
+    </p:extLst>
+  </p:cSld>
+  <p:clrMapOvr>
+    <a:masterClrMapping/>
+  </p:clrMapOvr>
+</p:sld>
+</file>
+
+<file path=ppt/slides/slide5.xml><?xml version="1.0" encoding="utf-8"?>
+<p:sld xmlns:a="http://schemas.openxmlformats.org/drawingml/2006/main" xmlns:r="http://schemas.openxmlformats.org/officeDocument/2006/relationships" xmlns:p="http://schemas.openxmlformats.org/presentationml/2006/main">
+  <p:cSld>
+    <p:spTree>
+      <p:nvGrpSpPr>
+        <p:cNvPr id="1" name=""/>
+        <p:cNvGrpSpPr/>
+        <p:nvPr/>
+      </p:nvGrpSpPr>
+      <p:grpSpPr>
+        <a:xfrm>
+          <a:off x="0" y="0"/>
+          <a:ext cx="0" cy="0"/>
+          <a:chOff x="0" y="0"/>
+          <a:chExt cx="0" cy="0"/>
+        </a:xfrm>
+      </p:grpSpPr>
+      <p:sp>
+        <p:nvSpPr>
+          <p:cNvPr id="9" name="Rounded Rectangle 8">
+            <a:extLst>
+              <a:ext uri="{FF2B5EF4-FFF2-40B4-BE49-F238E27FC236}">
+                <a16:creationId xmlns:a16="http://schemas.microsoft.com/office/drawing/2014/main" id="{319D71A4-FD5D-BD48-844B-435B16760232}"/>
+              </a:ext>
+            </a:extLst>
+          </p:cNvPr>
+          <p:cNvSpPr/>
+          <p:nvPr/>
+        </p:nvSpPr>
+        <p:spPr>
+          <a:xfrm>
+            <a:off x="2438397" y="1933404"/>
+            <a:ext cx="7315200" cy="2690649"/>
+          </a:xfrm>
+          <a:prstGeom prst="roundRect">
+            <a:avLst/>
+          </a:prstGeom>
+          <a:gradFill>
+            <a:gsLst>
+              <a:gs pos="0">
+                <a:srgbClr val="C00000"/>
+              </a:gs>
+              <a:gs pos="100000">
+                <a:schemeClr val="tx2">
+                  <a:lumMod val="75000"/>
+                </a:schemeClr>
+              </a:gs>
+            </a:gsLst>
+            <a:lin ang="5400000" scaled="1"/>
+          </a:gradFill>
+        </p:spPr>
+        <p:style>
+          <a:lnRef idx="2">
+            <a:schemeClr val="accent1">
+              <a:shade val="50000"/>
+            </a:schemeClr>
+          </a:lnRef>
+          <a:fillRef idx="1">
+            <a:schemeClr val="accent1"/>
+          </a:fillRef>
+          <a:effectRef idx="0">
+            <a:schemeClr val="accent1"/>
+          </a:effectRef>
+          <a:fontRef idx="minor">
+            <a:schemeClr val="lt1"/>
+          </a:fontRef>
+        </p:style>
+        <p:txBody>
+          <a:bodyPr rtlCol="0" anchor="ctr"/>
+          <a:lstStyle/>
+          <a:p>
+            <a:pPr algn="ctr"/>
+            <a:endParaRPr lang="en-US" dirty="0"/>
+          </a:p>
+        </p:txBody>
+      </p:sp>
+      <p:sp>
+        <p:nvSpPr>
+          <p:cNvPr id="45" name="Oval 44">
+            <a:extLst>
+              <a:ext uri="{FF2B5EF4-FFF2-40B4-BE49-F238E27FC236}">
+                <a16:creationId xmlns:a16="http://schemas.microsoft.com/office/drawing/2014/main" id="{7EA7BD02-DB63-9548-B6A6-786AF358FC92}"/>
+              </a:ext>
+            </a:extLst>
+          </p:cNvPr>
+          <p:cNvSpPr>
+            <a:spLocks noChangeAspect="1"/>
+          </p:cNvSpPr>
+          <p:nvPr/>
+        </p:nvSpPr>
+        <p:spPr>
+          <a:xfrm>
+            <a:off x="5528064" y="2719254"/>
+            <a:ext cx="1115568" cy="1118950"/>
+          </a:xfrm>
+          <a:prstGeom prst="ellipse">
+            <a:avLst/>
+          </a:prstGeom>
+          <a:solidFill>
+            <a:schemeClr val="bg1"/>
+          </a:solidFill>
+          <a:ln>
+            <a:solidFill>
+              <a:srgbClr val="C00000"/>
+            </a:solidFill>
+          </a:ln>
+          <a:effectLst>
+            <a:outerShdw blurRad="50800" dist="38100" dir="2700000" algn="tl" rotWithShape="0">
+              <a:prstClr val="black">
+                <a:alpha val="40000"/>
+              </a:prstClr>
+            </a:outerShdw>
+          </a:effectLst>
+        </p:spPr>
+        <p:style>
+          <a:lnRef idx="2">
+            <a:schemeClr val="accent1">
+              <a:shade val="50000"/>
+            </a:schemeClr>
+          </a:lnRef>
+          <a:fillRef idx="1">
+            <a:schemeClr val="accent1"/>
+          </a:fillRef>
+          <a:effectRef idx="0">
+            <a:schemeClr val="accent1"/>
+          </a:effectRef>
+          <a:fontRef idx="minor">
+            <a:schemeClr val="lt1"/>
+          </a:fontRef>
+        </p:style>
+        <p:txBody>
+          <a:bodyPr rtlCol="0" anchor="ctr"/>
+          <a:lstStyle/>
+          <a:p>
+            <a:pPr algn="ctr"/>
+            <a:endParaRPr lang="en-US" dirty="0"/>
+          </a:p>
+        </p:txBody>
+      </p:sp>
+      <p:pic>
+        <p:nvPicPr>
+          <p:cNvPr id="46" name="Graphic 45">
+            <a:extLst>
+              <a:ext uri="{FF2B5EF4-FFF2-40B4-BE49-F238E27FC236}">
+                <a16:creationId xmlns:a16="http://schemas.microsoft.com/office/drawing/2014/main" id="{DB0AF4BA-07A2-6344-A68F-2AF45ACD2045}"/>
+              </a:ext>
+            </a:extLst>
+          </p:cNvPr>
+          <p:cNvPicPr>
+            <a:picLocks noChangeAspect="1"/>
+          </p:cNvPicPr>
+          <p:nvPr/>
+        </p:nvPicPr>
+        <p:blipFill>
+          <a:blip r:embed="rId3">
+            <a:extLst>
+              <a:ext uri="{96DAC541-7B7A-43D3-8B79-37D633B846F1}">
+                <asvg:svgBlip xmlns:asvg="http://schemas.microsoft.com/office/drawing/2016/SVG/main" r:embed="rId4"/>
+              </a:ext>
+            </a:extLst>
+          </a:blip>
+          <a:stretch>
+            <a:fillRect/>
+          </a:stretch>
+        </p:blipFill>
+        <p:spPr>
+          <a:xfrm>
+            <a:off x="5711261" y="2892139"/>
+            <a:ext cx="746070" cy="746070"/>
+          </a:xfrm>
+          <a:prstGeom prst="rect">
+            <a:avLst/>
+          </a:prstGeom>
+          <a:effectLst>
+            <a:outerShdw blurRad="50800" dist="50800" dir="5400000" algn="ctr" rotWithShape="0">
+              <a:srgbClr val="000000">
+                <a:alpha val="93000"/>
+              </a:srgbClr>
+            </a:outerShdw>
+          </a:effectLst>
+        </p:spPr>
+      </p:pic>
+      <p:cxnSp>
+        <p:nvCxnSpPr>
+          <p:cNvPr id="78" name="Straight Arrow Connector 77">
+            <a:extLst>
+              <a:ext uri="{FF2B5EF4-FFF2-40B4-BE49-F238E27FC236}">
+                <a16:creationId xmlns:a16="http://schemas.microsoft.com/office/drawing/2014/main" id="{0442ED27-3243-AE4E-ADAC-0122C7D2199B}"/>
+              </a:ext>
+            </a:extLst>
+          </p:cNvPr>
+          <p:cNvCxnSpPr>
+            <a:cxnSpLocks/>
+            <a:stCxn id="45" idx="1"/>
+          </p:cNvCxnSpPr>
+          <p:nvPr/>
+        </p:nvCxnSpPr>
+        <p:spPr>
+          <a:xfrm flipH="1">
+            <a:off x="2975388" y="2883120"/>
+            <a:ext cx="2716047" cy="0"/>
+          </a:xfrm>
+          <a:prstGeom prst="straightConnector1">
+            <a:avLst/>
+          </a:prstGeom>
+          <a:ln w="31750">
+            <a:gradFill>
+              <a:gsLst>
+                <a:gs pos="0">
+                  <a:schemeClr val="bg1"/>
+                </a:gs>
+                <a:gs pos="100000">
+                  <a:srgbClr val="B70703"/>
+                </a:gs>
+              </a:gsLst>
+              <a:lin ang="0" scaled="0"/>
+            </a:gradFill>
+            <a:tailEnd type="none"/>
+          </a:ln>
+        </p:spPr>
+        <p:style>
+          <a:lnRef idx="1">
+            <a:schemeClr val="accent1"/>
+          </a:lnRef>
+          <a:fillRef idx="0">
+            <a:schemeClr val="accent1"/>
+          </a:fillRef>
+          <a:effectRef idx="0">
+            <a:schemeClr val="accent1"/>
+          </a:effectRef>
+          <a:fontRef idx="minor">
+            <a:schemeClr val="tx1"/>
+          </a:fontRef>
+        </p:style>
+      </p:cxnSp>
+      <p:sp>
+        <p:nvSpPr>
+          <p:cNvPr id="26" name="TextBox 25">
+            <a:extLst>
+              <a:ext uri="{FF2B5EF4-FFF2-40B4-BE49-F238E27FC236}">
+                <a16:creationId xmlns:a16="http://schemas.microsoft.com/office/drawing/2014/main" id="{00B0B6B7-226E-954C-98D8-33134757394E}"/>
+              </a:ext>
+            </a:extLst>
+          </p:cNvPr>
+          <p:cNvSpPr txBox="1"/>
+          <p:nvPr/>
+        </p:nvSpPr>
+        <p:spPr>
+          <a:xfrm>
+            <a:off x="4791598" y="1978223"/>
+            <a:ext cx="2631554" cy="461665"/>
+          </a:xfrm>
+          <a:prstGeom prst="rect">
+            <a:avLst/>
+          </a:prstGeom>
+          <a:noFill/>
+          <a:effectLst>
+            <a:outerShdw blurRad="50800" dist="38100" dir="2700000" algn="tl" rotWithShape="0">
+              <a:prstClr val="black">
+                <a:alpha val="40000"/>
+              </a:prstClr>
+            </a:outerShdw>
+          </a:effectLst>
+        </p:spPr>
+        <p:txBody>
+          <a:bodyPr wrap="none" rtlCol="0">
+            <a:spAutoFit/>
+          </a:bodyPr>
+          <a:lstStyle/>
+          <a:p>
+            <a:r>
+              <a:rPr lang="en-US" sz="2400" dirty="0">
+                <a:gradFill>
+                  <a:gsLst>
+                    <a:gs pos="0">
+                      <a:schemeClr val="accent4">
+                        <a:lumMod val="20000"/>
+                        <a:lumOff val="80000"/>
+                      </a:schemeClr>
+                    </a:gs>
+                    <a:gs pos="99000">
+                      <a:schemeClr val="bg1"/>
+                    </a:gs>
+                  </a:gsLst>
+                  <a:lin ang="0" scaled="0"/>
+                </a:gradFill>
+                <a:effectLst>
+                  <a:outerShdw blurRad="50800" dist="38100" dir="2700000" algn="tl" rotWithShape="0">
+                    <a:schemeClr val="accent4">
+                      <a:lumMod val="75000"/>
+                      <a:alpha val="40000"/>
+                    </a:schemeClr>
+                  </a:outerShdw>
+                </a:effectLst>
+              </a:rPr>
+              <a:t>Progressive rollouts</a:t>
+            </a:r>
+          </a:p>
+        </p:txBody>
+      </p:sp>
+      <p:sp>
+        <p:nvSpPr>
+          <p:cNvPr id="84" name="TextBox 83">
+            <a:extLst>
+              <a:ext uri="{FF2B5EF4-FFF2-40B4-BE49-F238E27FC236}">
+                <a16:creationId xmlns:a16="http://schemas.microsoft.com/office/drawing/2014/main" id="{4F6B134A-27C2-A744-BDF7-EB488EF3E173}"/>
+              </a:ext>
+            </a:extLst>
+          </p:cNvPr>
+          <p:cNvSpPr txBox="1"/>
+          <p:nvPr/>
+        </p:nvSpPr>
+        <p:spPr>
+          <a:xfrm>
+            <a:off x="2975388" y="3217546"/>
+            <a:ext cx="1857816" cy="461665"/>
+          </a:xfrm>
+          <a:prstGeom prst="rect">
+            <a:avLst/>
+          </a:prstGeom>
+          <a:noFill/>
+          <a:effectLst>
+            <a:outerShdw blurRad="50800" dist="38100" dir="2700000" algn="tl" rotWithShape="0">
+              <a:prstClr val="black">
+                <a:alpha val="40000"/>
+              </a:prstClr>
+            </a:outerShdw>
+          </a:effectLst>
+        </p:spPr>
+        <p:txBody>
+          <a:bodyPr wrap="none" rtlCol="0">
+            <a:spAutoFit/>
+          </a:bodyPr>
+          <a:lstStyle/>
+          <a:p>
+            <a:r>
+              <a:rPr lang="en-US" sz="2400" dirty="0">
+                <a:gradFill>
+                  <a:gsLst>
+                    <a:gs pos="0">
+                      <a:schemeClr val="accent4">
+                        <a:lumMod val="40000"/>
+                        <a:lumOff val="60000"/>
+                      </a:schemeClr>
+                    </a:gs>
+                    <a:gs pos="99000">
+                      <a:schemeClr val="bg1"/>
+                    </a:gs>
+                  </a:gsLst>
+                  <a:lin ang="0" scaled="0"/>
+                </a:gradFill>
+                <a:effectLst>
+                  <a:outerShdw blurRad="50800" dist="38100" dir="2700000" algn="tl" rotWithShape="0">
+                    <a:schemeClr val="accent4">
+                      <a:lumMod val="75000"/>
+                      <a:alpha val="40000"/>
+                    </a:schemeClr>
+                  </a:outerShdw>
+                </a:effectLst>
+              </a:rPr>
+              <a:t>Chaos testing</a:t>
+            </a:r>
+          </a:p>
+        </p:txBody>
+      </p:sp>
+      <p:sp>
+        <p:nvSpPr>
+          <p:cNvPr id="86" name="TextBox 85">
+            <a:extLst>
+              <a:ext uri="{FF2B5EF4-FFF2-40B4-BE49-F238E27FC236}">
+                <a16:creationId xmlns:a16="http://schemas.microsoft.com/office/drawing/2014/main" id="{3AF42E4E-4F2B-3444-9D30-D6A138BC1321}"/>
+              </a:ext>
+            </a:extLst>
+          </p:cNvPr>
+          <p:cNvSpPr txBox="1"/>
+          <p:nvPr/>
+        </p:nvSpPr>
+        <p:spPr>
+          <a:xfrm>
+            <a:off x="3570429" y="4120034"/>
+            <a:ext cx="5014065" cy="461665"/>
+          </a:xfrm>
+          <a:prstGeom prst="rect">
+            <a:avLst/>
+          </a:prstGeom>
+          <a:noFill/>
+          <a:effectLst>
+            <a:outerShdw blurRad="50800" dist="38100" dir="2700000" algn="tl" rotWithShape="0">
+              <a:prstClr val="black">
+                <a:alpha val="40000"/>
+              </a:prstClr>
+            </a:outerShdw>
+          </a:effectLst>
+        </p:spPr>
+        <p:txBody>
+          <a:bodyPr wrap="none" rtlCol="0">
+            <a:spAutoFit/>
+          </a:bodyPr>
+          <a:lstStyle/>
+          <a:p>
+            <a:r>
+              <a:rPr lang="en-US" sz="2400" dirty="0">
+                <a:gradFill>
+                  <a:gsLst>
+                    <a:gs pos="0">
+                      <a:schemeClr val="bg1"/>
+                    </a:gs>
+                    <a:gs pos="98000">
+                      <a:schemeClr val="accent4">
+                        <a:lumMod val="40000"/>
+                        <a:lumOff val="60000"/>
+                      </a:schemeClr>
+                    </a:gs>
+                  </a:gsLst>
+                  <a:lin ang="0" scaled="0"/>
+                </a:gradFill>
+                <a:effectLst>
+                  <a:outerShdw blurRad="50800" dist="38100" dir="2700000" algn="tl" rotWithShape="0">
+                    <a:schemeClr val="accent4">
+                      <a:lumMod val="75000"/>
+                      <a:alpha val="40000"/>
+                    </a:schemeClr>
+                  </a:outerShdw>
+                </a:effectLst>
+              </a:rPr>
+              <a:t>State-of-the-art AI &amp; statistical analysis</a:t>
+            </a:r>
+          </a:p>
+        </p:txBody>
+      </p:sp>
+      <p:sp>
+        <p:nvSpPr>
+          <p:cNvPr id="87" name="TextBox 86">
+            <a:extLst>
+              <a:ext uri="{FF2B5EF4-FFF2-40B4-BE49-F238E27FC236}">
+                <a16:creationId xmlns:a16="http://schemas.microsoft.com/office/drawing/2014/main" id="{A14FFCA2-5CA7-AC47-8DEE-26F0528D2DA1}"/>
+              </a:ext>
+            </a:extLst>
+          </p:cNvPr>
+          <p:cNvSpPr txBox="1"/>
+          <p:nvPr/>
+        </p:nvSpPr>
+        <p:spPr>
+          <a:xfrm>
+            <a:off x="2956498" y="2427301"/>
+            <a:ext cx="2032544" cy="461665"/>
+          </a:xfrm>
+          <a:prstGeom prst="rect">
+            <a:avLst/>
+          </a:prstGeom>
+          <a:noFill/>
+          <a:effectLst>
+            <a:outerShdw blurRad="50800" dist="38100" dir="2700000" algn="tl" rotWithShape="0">
+              <a:prstClr val="black">
+                <a:alpha val="40000"/>
+              </a:prstClr>
+            </a:outerShdw>
+          </a:effectLst>
+        </p:spPr>
+        <p:txBody>
+          <a:bodyPr wrap="none" rtlCol="0">
+            <a:spAutoFit/>
+          </a:bodyPr>
+          <a:lstStyle/>
+          <a:p>
+            <a:r>
+              <a:rPr lang="en-US" sz="2400" dirty="0">
+                <a:gradFill>
+                  <a:gsLst>
+                    <a:gs pos="0">
+                      <a:schemeClr val="accent4">
+                        <a:lumMod val="20000"/>
+                        <a:lumOff val="80000"/>
+                      </a:schemeClr>
+                    </a:gs>
+                    <a:gs pos="99000">
+                      <a:schemeClr val="bg1"/>
+                    </a:gs>
+                  </a:gsLst>
+                  <a:lin ang="0" scaled="0"/>
+                </a:gradFill>
+                <a:effectLst>
+                  <a:outerShdw blurRad="50800" dist="38100" dir="2700000" algn="tl" rotWithShape="0">
+                    <a:schemeClr val="accent4">
+                      <a:lumMod val="75000"/>
+                      <a:alpha val="40000"/>
+                    </a:schemeClr>
+                  </a:outerShdw>
+                </a:effectLst>
+              </a:rPr>
+              <a:t>A/B(/n) testing</a:t>
+            </a:r>
+          </a:p>
+        </p:txBody>
+      </p:sp>
+      <p:cxnSp>
+        <p:nvCxnSpPr>
+          <p:cNvPr id="24" name="Straight Arrow Connector 23">
+            <a:extLst>
+              <a:ext uri="{FF2B5EF4-FFF2-40B4-BE49-F238E27FC236}">
+                <a16:creationId xmlns:a16="http://schemas.microsoft.com/office/drawing/2014/main" id="{B9D26F47-5E45-C548-8703-049CCF161E69}"/>
+              </a:ext>
+            </a:extLst>
+          </p:cNvPr>
+          <p:cNvCxnSpPr>
+            <a:cxnSpLocks/>
+            <a:stCxn id="45" idx="3"/>
+          </p:cNvCxnSpPr>
+          <p:nvPr/>
+        </p:nvCxnSpPr>
+        <p:spPr>
+          <a:xfrm flipH="1">
+            <a:off x="2975388" y="3674338"/>
+            <a:ext cx="2716047" cy="0"/>
+          </a:xfrm>
+          <a:prstGeom prst="straightConnector1">
+            <a:avLst/>
+          </a:prstGeom>
+          <a:ln w="31750">
+            <a:gradFill>
+              <a:gsLst>
+                <a:gs pos="0">
+                  <a:schemeClr val="bg1"/>
+                </a:gs>
+                <a:gs pos="100000">
+                  <a:srgbClr val="B70703"/>
+                </a:gs>
+              </a:gsLst>
+              <a:lin ang="0" scaled="0"/>
+            </a:gradFill>
+            <a:tailEnd type="none"/>
+          </a:ln>
+        </p:spPr>
+        <p:style>
+          <a:lnRef idx="1">
+            <a:schemeClr val="accent1"/>
+          </a:lnRef>
+          <a:fillRef idx="0">
+            <a:schemeClr val="accent1"/>
+          </a:fillRef>
+          <a:effectRef idx="0">
+            <a:schemeClr val="accent1"/>
+          </a:effectRef>
+          <a:fontRef idx="minor">
+            <a:schemeClr val="tx1"/>
+          </a:fontRef>
+        </p:style>
+      </p:cxnSp>
+      <p:cxnSp>
+        <p:nvCxnSpPr>
+          <p:cNvPr id="27" name="Straight Arrow Connector 26">
+            <a:extLst>
+              <a:ext uri="{FF2B5EF4-FFF2-40B4-BE49-F238E27FC236}">
+                <a16:creationId xmlns:a16="http://schemas.microsoft.com/office/drawing/2014/main" id="{5330E225-5DC0-6D4C-83F4-B6F53FA58B81}"/>
+              </a:ext>
+            </a:extLst>
+          </p:cNvPr>
+          <p:cNvCxnSpPr>
+            <a:cxnSpLocks/>
+            <a:stCxn id="45" idx="4"/>
+          </p:cNvCxnSpPr>
+          <p:nvPr/>
+        </p:nvCxnSpPr>
+        <p:spPr>
+          <a:xfrm flipH="1">
+            <a:off x="6084296" y="3838204"/>
+            <a:ext cx="1552" cy="258910"/>
+          </a:xfrm>
+          <a:prstGeom prst="straightConnector1">
+            <a:avLst/>
+          </a:prstGeom>
+          <a:ln w="31750">
+            <a:solidFill>
+              <a:schemeClr val="lt1">
+                <a:hueOff val="0"/>
+                <a:satOff val="0"/>
+                <a:lumOff val="0"/>
+              </a:schemeClr>
+            </a:solidFill>
+            <a:tailEnd type="none"/>
+          </a:ln>
+        </p:spPr>
+        <p:style>
+          <a:lnRef idx="1">
+            <a:schemeClr val="accent1"/>
+          </a:lnRef>
+          <a:fillRef idx="0">
+            <a:schemeClr val="accent1"/>
+          </a:fillRef>
+          <a:effectRef idx="0">
+            <a:schemeClr val="accent1"/>
+          </a:effectRef>
+          <a:fontRef idx="minor">
+            <a:schemeClr val="tx1"/>
+          </a:fontRef>
+        </p:style>
+      </p:cxnSp>
+      <p:cxnSp>
+        <p:nvCxnSpPr>
+          <p:cNvPr id="30" name="Straight Arrow Connector 29">
+            <a:extLst>
+              <a:ext uri="{FF2B5EF4-FFF2-40B4-BE49-F238E27FC236}">
+                <a16:creationId xmlns:a16="http://schemas.microsoft.com/office/drawing/2014/main" id="{7046775E-C39B-3444-98D7-1861DFAD2629}"/>
+              </a:ext>
+            </a:extLst>
+          </p:cNvPr>
+          <p:cNvCxnSpPr>
+            <a:cxnSpLocks/>
+          </p:cNvCxnSpPr>
+          <p:nvPr/>
+        </p:nvCxnSpPr>
+        <p:spPr>
+          <a:xfrm flipH="1">
+            <a:off x="6095999" y="2469809"/>
+            <a:ext cx="1552" cy="258910"/>
+          </a:xfrm>
+          <a:prstGeom prst="straightConnector1">
+            <a:avLst/>
+          </a:prstGeom>
+          <a:ln w="31750">
+            <a:solidFill>
+              <a:schemeClr val="lt1">
+                <a:hueOff val="0"/>
+                <a:satOff val="0"/>
+                <a:lumOff val="0"/>
+              </a:schemeClr>
+            </a:solidFill>
+            <a:tailEnd type="none"/>
+          </a:ln>
+        </p:spPr>
+        <p:style>
+          <a:lnRef idx="1">
+            <a:schemeClr val="accent1"/>
+          </a:lnRef>
+          <a:fillRef idx="0">
+            <a:schemeClr val="accent1"/>
+          </a:fillRef>
+          <a:effectRef idx="0">
+            <a:schemeClr val="accent1"/>
+          </a:effectRef>
+          <a:fontRef idx="minor">
+            <a:schemeClr val="tx1"/>
+          </a:fontRef>
+        </p:style>
+      </p:cxnSp>
+      <p:cxnSp>
+        <p:nvCxnSpPr>
+          <p:cNvPr id="31" name="Straight Arrow Connector 30">
+            <a:extLst>
+              <a:ext uri="{FF2B5EF4-FFF2-40B4-BE49-F238E27FC236}">
+                <a16:creationId xmlns:a16="http://schemas.microsoft.com/office/drawing/2014/main" id="{6F6EB244-A7B0-B645-B012-C7F92E43D308}"/>
+              </a:ext>
+            </a:extLst>
+          </p:cNvPr>
+          <p:cNvCxnSpPr>
+            <a:cxnSpLocks/>
+          </p:cNvCxnSpPr>
+          <p:nvPr/>
+        </p:nvCxnSpPr>
+        <p:spPr>
+          <a:xfrm flipH="1">
+            <a:off x="4737975" y="2446217"/>
+            <a:ext cx="2716047" cy="0"/>
+          </a:xfrm>
+          <a:prstGeom prst="straightConnector1">
+            <a:avLst/>
+          </a:prstGeom>
+          <a:ln w="31750">
+            <a:gradFill>
+              <a:gsLst>
+                <a:gs pos="49000">
+                  <a:schemeClr val="bg1"/>
+                </a:gs>
+                <a:gs pos="0">
+                  <a:srgbClr val="B70703"/>
+                </a:gs>
+                <a:gs pos="100000">
+                  <a:srgbClr val="B70703"/>
+                </a:gs>
+              </a:gsLst>
+              <a:lin ang="0" scaled="0"/>
+            </a:gradFill>
+            <a:tailEnd type="none"/>
+          </a:ln>
+        </p:spPr>
+        <p:style>
+          <a:lnRef idx="1">
+            <a:schemeClr val="accent1"/>
+          </a:lnRef>
+          <a:fillRef idx="0">
+            <a:schemeClr val="accent1"/>
+          </a:fillRef>
+          <a:effectRef idx="0">
+            <a:schemeClr val="accent1"/>
+          </a:effectRef>
+          <a:fontRef idx="minor">
+            <a:schemeClr val="tx1"/>
+          </a:fontRef>
+        </p:style>
+      </p:cxnSp>
+      <p:cxnSp>
+        <p:nvCxnSpPr>
+          <p:cNvPr id="32" name="Straight Arrow Connector 31">
+            <a:extLst>
+              <a:ext uri="{FF2B5EF4-FFF2-40B4-BE49-F238E27FC236}">
+                <a16:creationId xmlns:a16="http://schemas.microsoft.com/office/drawing/2014/main" id="{60FAE7CA-C26E-1C43-BACB-203469C347F9}"/>
+              </a:ext>
+            </a:extLst>
+          </p:cNvPr>
+          <p:cNvCxnSpPr>
+            <a:cxnSpLocks/>
+          </p:cNvCxnSpPr>
+          <p:nvPr/>
+        </p:nvCxnSpPr>
+        <p:spPr>
+          <a:xfrm flipH="1">
+            <a:off x="4726272" y="4110186"/>
+            <a:ext cx="2716047" cy="0"/>
+          </a:xfrm>
+          <a:prstGeom prst="straightConnector1">
+            <a:avLst/>
+          </a:prstGeom>
+          <a:ln w="31750">
+            <a:gradFill>
+              <a:gsLst>
+                <a:gs pos="49000">
+                  <a:schemeClr val="bg1"/>
+                </a:gs>
+                <a:gs pos="0">
+                  <a:srgbClr val="B70703"/>
+                </a:gs>
+                <a:gs pos="100000">
+                  <a:srgbClr val="B70703"/>
+                </a:gs>
+              </a:gsLst>
+              <a:lin ang="0" scaled="0"/>
+            </a:gradFill>
+            <a:tailEnd type="none"/>
+          </a:ln>
+        </p:spPr>
+        <p:style>
+          <a:lnRef idx="1">
+            <a:schemeClr val="accent1"/>
+          </a:lnRef>
+          <a:fillRef idx="0">
+            <a:schemeClr val="accent1"/>
+          </a:fillRef>
+          <a:effectRef idx="0">
+            <a:schemeClr val="accent1"/>
+          </a:effectRef>
+          <a:fontRef idx="minor">
+            <a:schemeClr val="tx1"/>
+          </a:fontRef>
+        </p:style>
+      </p:cxnSp>
+      <p:cxnSp>
+        <p:nvCxnSpPr>
+          <p:cNvPr id="33" name="Straight Arrow Connector 32">
+            <a:extLst>
+              <a:ext uri="{FF2B5EF4-FFF2-40B4-BE49-F238E27FC236}">
+                <a16:creationId xmlns:a16="http://schemas.microsoft.com/office/drawing/2014/main" id="{FD43408C-8FD1-2A45-BAFA-7C30E55C1B43}"/>
+              </a:ext>
+            </a:extLst>
+          </p:cNvPr>
+          <p:cNvCxnSpPr>
+            <a:cxnSpLocks/>
+            <a:stCxn id="45" idx="7"/>
+          </p:cNvCxnSpPr>
+          <p:nvPr/>
+        </p:nvCxnSpPr>
+        <p:spPr>
+          <a:xfrm flipV="1">
+            <a:off x="6480260" y="2876683"/>
+            <a:ext cx="2715768" cy="6437"/>
+          </a:xfrm>
+          <a:prstGeom prst="straightConnector1">
+            <a:avLst/>
+          </a:prstGeom>
+          <a:ln w="31750">
+            <a:gradFill>
+              <a:gsLst>
+                <a:gs pos="0">
+                  <a:schemeClr val="bg1"/>
+                </a:gs>
+                <a:gs pos="100000">
+                  <a:srgbClr val="B70703"/>
+                </a:gs>
+              </a:gsLst>
+              <a:lin ang="0" scaled="0"/>
+            </a:gradFill>
+            <a:tailEnd type="none"/>
+          </a:ln>
+        </p:spPr>
+        <p:style>
+          <a:lnRef idx="1">
+            <a:schemeClr val="accent1"/>
+          </a:lnRef>
+          <a:fillRef idx="0">
+            <a:schemeClr val="accent1"/>
+          </a:fillRef>
+          <a:effectRef idx="0">
+            <a:schemeClr val="accent1"/>
+          </a:effectRef>
+          <a:fontRef idx="minor">
+            <a:schemeClr val="tx1"/>
+          </a:fontRef>
+        </p:style>
+      </p:cxnSp>
+      <p:cxnSp>
+        <p:nvCxnSpPr>
+          <p:cNvPr id="36" name="Straight Arrow Connector 35">
+            <a:extLst>
+              <a:ext uri="{FF2B5EF4-FFF2-40B4-BE49-F238E27FC236}">
+                <a16:creationId xmlns:a16="http://schemas.microsoft.com/office/drawing/2014/main" id="{ED3C73B4-F988-764F-8F41-1E2C8D45CA10}"/>
+              </a:ext>
+            </a:extLst>
+          </p:cNvPr>
+          <p:cNvCxnSpPr>
+            <a:cxnSpLocks/>
+            <a:stCxn id="45" idx="5"/>
+          </p:cNvCxnSpPr>
+          <p:nvPr/>
+        </p:nvCxnSpPr>
+        <p:spPr>
+          <a:xfrm flipV="1">
+            <a:off x="6480260" y="3673284"/>
+            <a:ext cx="2715768" cy="1054"/>
+          </a:xfrm>
+          <a:prstGeom prst="straightConnector1">
+            <a:avLst/>
+          </a:prstGeom>
+          <a:ln w="31750">
+            <a:gradFill>
+              <a:gsLst>
+                <a:gs pos="0">
+                  <a:schemeClr val="bg1"/>
+                </a:gs>
+                <a:gs pos="100000">
+                  <a:srgbClr val="B70703"/>
+                </a:gs>
+              </a:gsLst>
+              <a:lin ang="0" scaled="0"/>
+            </a:gradFill>
+            <a:tailEnd type="none"/>
+          </a:ln>
+        </p:spPr>
+        <p:style>
+          <a:lnRef idx="1">
+            <a:schemeClr val="accent1"/>
+          </a:lnRef>
+          <a:fillRef idx="0">
+            <a:schemeClr val="accent1"/>
+          </a:fillRef>
+          <a:effectRef idx="0">
+            <a:schemeClr val="accent1"/>
+          </a:effectRef>
+          <a:fontRef idx="minor">
+            <a:schemeClr val="tx1"/>
+          </a:fontRef>
+        </p:style>
+      </p:cxnSp>
+      <p:sp>
+        <p:nvSpPr>
+          <p:cNvPr id="39" name="TextBox 38">
+            <a:extLst>
+              <a:ext uri="{FF2B5EF4-FFF2-40B4-BE49-F238E27FC236}">
+                <a16:creationId xmlns:a16="http://schemas.microsoft.com/office/drawing/2014/main" id="{2DE3CC12-59D6-9D49-9D9F-4D03B8689AA5}"/>
+              </a:ext>
+            </a:extLst>
+          </p:cNvPr>
+          <p:cNvSpPr txBox="1"/>
+          <p:nvPr/>
+        </p:nvSpPr>
+        <p:spPr>
+          <a:xfrm>
+            <a:off x="7272652" y="2409454"/>
+            <a:ext cx="1948290" cy="461665"/>
+          </a:xfrm>
+          <a:prstGeom prst="rect">
+            <a:avLst/>
+          </a:prstGeom>
+          <a:noFill/>
+          <a:effectLst>
+            <a:outerShdw blurRad="50800" dist="38100" dir="2700000" algn="tl" rotWithShape="0">
+              <a:prstClr val="black">
+                <a:alpha val="40000"/>
+              </a:prstClr>
+            </a:outerShdw>
+          </a:effectLst>
+        </p:spPr>
+        <p:txBody>
+          <a:bodyPr wrap="none" rtlCol="0">
+            <a:spAutoFit/>
+          </a:bodyPr>
+          <a:lstStyle/>
+          <a:p>
+            <a:r>
+              <a:rPr lang="en-US" sz="2400" dirty="0">
+                <a:gradFill>
+                  <a:gsLst>
+                    <a:gs pos="0">
+                      <a:schemeClr val="accent4">
+                        <a:lumMod val="20000"/>
+                        <a:lumOff val="80000"/>
+                      </a:schemeClr>
+                    </a:gs>
+                    <a:gs pos="99000">
+                      <a:schemeClr val="bg1"/>
+                    </a:gs>
+                  </a:gsLst>
+                  <a:lin ang="0" scaled="0"/>
+                </a:gradFill>
+                <a:effectLst>
+                  <a:outerShdw blurRad="50800" dist="38100" dir="2700000" algn="tl" rotWithShape="0">
+                    <a:schemeClr val="accent4">
+                      <a:lumMod val="75000"/>
+                      <a:alpha val="40000"/>
+                    </a:schemeClr>
+                  </a:outerShdw>
+                </a:effectLst>
+              </a:rPr>
+              <a:t>SLO validation</a:t>
+            </a:r>
+          </a:p>
+        </p:txBody>
+      </p:sp>
+      <p:sp>
+        <p:nvSpPr>
+          <p:cNvPr id="40" name="TextBox 39">
+            <a:extLst>
+              <a:ext uri="{FF2B5EF4-FFF2-40B4-BE49-F238E27FC236}">
+                <a16:creationId xmlns:a16="http://schemas.microsoft.com/office/drawing/2014/main" id="{242E5DE1-1E49-F44F-B81D-96319EC276E1}"/>
+              </a:ext>
+            </a:extLst>
+          </p:cNvPr>
+          <p:cNvSpPr txBox="1"/>
+          <p:nvPr/>
+        </p:nvSpPr>
+        <p:spPr>
+          <a:xfrm>
+            <a:off x="7437477" y="3204689"/>
+            <a:ext cx="1703928" cy="461665"/>
+          </a:xfrm>
+          <a:prstGeom prst="rect">
+            <a:avLst/>
+          </a:prstGeom>
+          <a:noFill/>
+          <a:effectLst>
+            <a:outerShdw blurRad="50800" dist="38100" dir="2700000" algn="tl" rotWithShape="0">
+              <a:prstClr val="black">
+                <a:alpha val="40000"/>
+              </a:prstClr>
+            </a:outerShdw>
+          </a:effectLst>
+        </p:spPr>
+        <p:txBody>
+          <a:bodyPr wrap="none" rtlCol="0">
+            <a:spAutoFit/>
+          </a:bodyPr>
+          <a:lstStyle/>
+          <a:p>
+            <a:r>
+              <a:rPr lang="en-US" sz="2400" dirty="0">
+                <a:gradFill>
+                  <a:gsLst>
+                    <a:gs pos="0">
+                      <a:schemeClr val="accent4">
+                        <a:lumMod val="40000"/>
+                        <a:lumOff val="60000"/>
+                      </a:schemeClr>
+                    </a:gs>
+                    <a:gs pos="99000">
+                      <a:schemeClr val="bg1"/>
+                    </a:gs>
+                  </a:gsLst>
+                  <a:lin ang="0" scaled="0"/>
+                </a:gradFill>
+                <a:effectLst>
+                  <a:outerShdw blurRad="50800" dist="38100" dir="2700000" algn="tl" rotWithShape="0">
+                    <a:schemeClr val="accent4">
+                      <a:lumMod val="75000"/>
+                      <a:alpha val="40000"/>
+                    </a:schemeClr>
+                  </a:outerShdw>
+                </a:effectLst>
+              </a:rPr>
+              <a:t>Load testing</a:t>
+            </a:r>
+          </a:p>
+        </p:txBody>
+      </p:sp>
+    </p:spTree>
+    <p:extLst>
+      <p:ext uri="{BB962C8B-B14F-4D97-AF65-F5344CB8AC3E}">
+        <p14:creationId xmlns:p14="http://schemas.microsoft.com/office/powerpoint/2010/main" val="3212434172"/>
       </p:ext>
     </p:extLst>
   </p:cSld>

</xml_diff>